<commit_message>
completed SAPL Dashboard asset mapping; continuing freespan module...
</commit_message>
<xml_diff>
--- a/docs/alan/Overview of Field (abet).pptx
+++ b/docs/alan/Overview of Field (abet).pptx
@@ -482,7 +482,7 @@
           <a:p>
             <a:fld id="{64A93199-28B3-44DB-8081-BB00A933B0E4}" type="datetimeFigureOut">
               <a:rPr lang="en-PH" smtClean="0"/>
-              <a:t>04/05/2021</a:t>
+              <a:t>05/05/2021</a:t>
             </a:fld>
             <a:endParaRPr lang="en-PH"/>
           </a:p>
@@ -546,35 +546,35 @@
           <a:p>
             <a:pPr lvl="0"/>
             <a:r>
-              <a:rPr lang="en-US" smtClean="0"/>
+              <a:rPr lang="en-US"/>
               <a:t>Edit Master text styles</a:t>
             </a:r>
           </a:p>
           <a:p>
             <a:pPr lvl="1"/>
             <a:r>
-              <a:rPr lang="en-US" smtClean="0"/>
+              <a:rPr lang="en-US"/>
               <a:t>Second level</a:t>
             </a:r>
           </a:p>
           <a:p>
             <a:pPr lvl="2"/>
             <a:r>
-              <a:rPr lang="en-US" smtClean="0"/>
+              <a:rPr lang="en-US"/>
               <a:t>Third level</a:t>
             </a:r>
           </a:p>
           <a:p>
             <a:pPr lvl="3"/>
             <a:r>
-              <a:rPr lang="en-US" smtClean="0"/>
+              <a:rPr lang="en-US"/>
               <a:t>Fourth level</a:t>
             </a:r>
           </a:p>
           <a:p>
             <a:pPr lvl="4"/>
             <a:r>
-              <a:rPr lang="en-US" smtClean="0"/>
+              <a:rPr lang="en-US"/>
               <a:t>Fifth level</a:t>
             </a:r>
             <a:endParaRPr lang="en-PH"/>
@@ -870,7 +870,7 @@
           <p:cNvPr id="2" name="Title 1">
             <a:extLst>
               <a:ext uri="{FF2B5EF4-FFF2-40B4-BE49-F238E27FC236}">
-                <a16:creationId xmlns:a16="http://schemas.microsoft.com/office/drawing/2014/main" xmlns="" id="{5A8BE693-C9A1-467B-9950-8215736808E3}"/>
+                <a16:creationId xmlns:a16="http://schemas.microsoft.com/office/drawing/2014/main" id="{5A8BE693-C9A1-467B-9950-8215736808E3}"/>
               </a:ext>
             </a:extLst>
           </p:cNvPr>
@@ -907,7 +907,7 @@
           <p:cNvPr id="3" name="Subtitle 2">
             <a:extLst>
               <a:ext uri="{FF2B5EF4-FFF2-40B4-BE49-F238E27FC236}">
-                <a16:creationId xmlns:a16="http://schemas.microsoft.com/office/drawing/2014/main" xmlns="" id="{EB15A62A-6D63-4C06-A14F-860F017DB0A4}"/>
+                <a16:creationId xmlns:a16="http://schemas.microsoft.com/office/drawing/2014/main" id="{EB15A62A-6D63-4C06-A14F-860F017DB0A4}"/>
               </a:ext>
             </a:extLst>
           </p:cNvPr>
@@ -977,7 +977,7 @@
           <p:cNvPr id="4" name="Date Placeholder 3">
             <a:extLst>
               <a:ext uri="{FF2B5EF4-FFF2-40B4-BE49-F238E27FC236}">
-                <a16:creationId xmlns:a16="http://schemas.microsoft.com/office/drawing/2014/main" xmlns="" id="{CA74EF96-4F0D-448E-A169-44301F321C2D}"/>
+                <a16:creationId xmlns:a16="http://schemas.microsoft.com/office/drawing/2014/main" id="{CA74EF96-4F0D-448E-A169-44301F321C2D}"/>
               </a:ext>
             </a:extLst>
           </p:cNvPr>
@@ -995,7 +995,7 @@
           <a:p>
             <a:fld id="{E2B7E7BF-E648-44D0-8C95-590A8081F280}" type="datetimeFigureOut">
               <a:rPr lang="en-US" smtClean="0"/>
-              <a:t>5/4/2021</a:t>
+              <a:t>5/5/2021</a:t>
             </a:fld>
             <a:endParaRPr lang="en-US"/>
           </a:p>
@@ -1006,7 +1006,7 @@
           <p:cNvPr id="5" name="Footer Placeholder 4">
             <a:extLst>
               <a:ext uri="{FF2B5EF4-FFF2-40B4-BE49-F238E27FC236}">
-                <a16:creationId xmlns:a16="http://schemas.microsoft.com/office/drawing/2014/main" xmlns="" id="{912D2A76-9F45-4C15-85C8-DD2D9AD6E2A0}"/>
+                <a16:creationId xmlns:a16="http://schemas.microsoft.com/office/drawing/2014/main" id="{912D2A76-9F45-4C15-85C8-DD2D9AD6E2A0}"/>
               </a:ext>
             </a:extLst>
           </p:cNvPr>
@@ -1031,7 +1031,7 @@
           <p:cNvPr id="6" name="Slide Number Placeholder 5">
             <a:extLst>
               <a:ext uri="{FF2B5EF4-FFF2-40B4-BE49-F238E27FC236}">
-                <a16:creationId xmlns:a16="http://schemas.microsoft.com/office/drawing/2014/main" xmlns="" id="{FC80D5E4-6F29-4543-BCB1-1CFCF9EB0122}"/>
+                <a16:creationId xmlns:a16="http://schemas.microsoft.com/office/drawing/2014/main" id="{FC80D5E4-6F29-4543-BCB1-1CFCF9EB0122}"/>
               </a:ext>
             </a:extLst>
           </p:cNvPr>
@@ -1090,7 +1090,7 @@
           <p:cNvPr id="2" name="Title 1">
             <a:extLst>
               <a:ext uri="{FF2B5EF4-FFF2-40B4-BE49-F238E27FC236}">
-                <a16:creationId xmlns:a16="http://schemas.microsoft.com/office/drawing/2014/main" xmlns="" id="{32ACA6C9-B7AE-4B6F-A6F9-F6B2F3F64AB7}"/>
+                <a16:creationId xmlns:a16="http://schemas.microsoft.com/office/drawing/2014/main" id="{32ACA6C9-B7AE-4B6F-A6F9-F6B2F3F64AB7}"/>
               </a:ext>
             </a:extLst>
           </p:cNvPr>
@@ -1118,7 +1118,7 @@
           <p:cNvPr id="3" name="Vertical Text Placeholder 2">
             <a:extLst>
               <a:ext uri="{FF2B5EF4-FFF2-40B4-BE49-F238E27FC236}">
-                <a16:creationId xmlns:a16="http://schemas.microsoft.com/office/drawing/2014/main" xmlns="" id="{66C9E398-2720-495E-BACA-6D277C0E5842}"/>
+                <a16:creationId xmlns:a16="http://schemas.microsoft.com/office/drawing/2014/main" id="{66C9E398-2720-495E-BACA-6D277C0E5842}"/>
               </a:ext>
             </a:extLst>
           </p:cNvPr>
@@ -1175,7 +1175,7 @@
           <p:cNvPr id="4" name="Date Placeholder 3">
             <a:extLst>
               <a:ext uri="{FF2B5EF4-FFF2-40B4-BE49-F238E27FC236}">
-                <a16:creationId xmlns:a16="http://schemas.microsoft.com/office/drawing/2014/main" xmlns="" id="{28A78485-F609-4774-A24A-6F1333F71D66}"/>
+                <a16:creationId xmlns:a16="http://schemas.microsoft.com/office/drawing/2014/main" id="{28A78485-F609-4774-A24A-6F1333F71D66}"/>
               </a:ext>
             </a:extLst>
           </p:cNvPr>
@@ -1193,7 +1193,7 @@
           <a:p>
             <a:fld id="{E2B7E7BF-E648-44D0-8C95-590A8081F280}" type="datetimeFigureOut">
               <a:rPr lang="en-US" smtClean="0"/>
-              <a:t>5/4/2021</a:t>
+              <a:t>5/5/2021</a:t>
             </a:fld>
             <a:endParaRPr lang="en-US"/>
           </a:p>
@@ -1204,7 +1204,7 @@
           <p:cNvPr id="5" name="Footer Placeholder 4">
             <a:extLst>
               <a:ext uri="{FF2B5EF4-FFF2-40B4-BE49-F238E27FC236}">
-                <a16:creationId xmlns:a16="http://schemas.microsoft.com/office/drawing/2014/main" xmlns="" id="{F2519296-04C3-47D7-AEB8-737FC79D6A09}"/>
+                <a16:creationId xmlns:a16="http://schemas.microsoft.com/office/drawing/2014/main" id="{F2519296-04C3-47D7-AEB8-737FC79D6A09}"/>
               </a:ext>
             </a:extLst>
           </p:cNvPr>
@@ -1229,7 +1229,7 @@
           <p:cNvPr id="6" name="Slide Number Placeholder 5">
             <a:extLst>
               <a:ext uri="{FF2B5EF4-FFF2-40B4-BE49-F238E27FC236}">
-                <a16:creationId xmlns:a16="http://schemas.microsoft.com/office/drawing/2014/main" xmlns="" id="{65C72B63-F617-4968-903E-FE3BA37D469C}"/>
+                <a16:creationId xmlns:a16="http://schemas.microsoft.com/office/drawing/2014/main" id="{65C72B63-F617-4968-903E-FE3BA37D469C}"/>
               </a:ext>
             </a:extLst>
           </p:cNvPr>
@@ -1288,7 +1288,7 @@
           <p:cNvPr id="2" name="Vertical Title 1">
             <a:extLst>
               <a:ext uri="{FF2B5EF4-FFF2-40B4-BE49-F238E27FC236}">
-                <a16:creationId xmlns:a16="http://schemas.microsoft.com/office/drawing/2014/main" xmlns="" id="{F2FFD4FA-DC82-4A2B-B6AD-998572C8E577}"/>
+                <a16:creationId xmlns:a16="http://schemas.microsoft.com/office/drawing/2014/main" id="{F2FFD4FA-DC82-4A2B-B6AD-998572C8E577}"/>
               </a:ext>
             </a:extLst>
           </p:cNvPr>
@@ -1321,7 +1321,7 @@
           <p:cNvPr id="3" name="Vertical Text Placeholder 2">
             <a:extLst>
               <a:ext uri="{FF2B5EF4-FFF2-40B4-BE49-F238E27FC236}">
-                <a16:creationId xmlns:a16="http://schemas.microsoft.com/office/drawing/2014/main" xmlns="" id="{9D18A1C7-1CF2-47DF-A551-F4885ED03426}"/>
+                <a16:creationId xmlns:a16="http://schemas.microsoft.com/office/drawing/2014/main" id="{9D18A1C7-1CF2-47DF-A551-F4885ED03426}"/>
               </a:ext>
             </a:extLst>
           </p:cNvPr>
@@ -1383,7 +1383,7 @@
           <p:cNvPr id="4" name="Date Placeholder 3">
             <a:extLst>
               <a:ext uri="{FF2B5EF4-FFF2-40B4-BE49-F238E27FC236}">
-                <a16:creationId xmlns:a16="http://schemas.microsoft.com/office/drawing/2014/main" xmlns="" id="{B8208D58-02C6-4438-B954-2458F1EBED7A}"/>
+                <a16:creationId xmlns:a16="http://schemas.microsoft.com/office/drawing/2014/main" id="{B8208D58-02C6-4438-B954-2458F1EBED7A}"/>
               </a:ext>
             </a:extLst>
           </p:cNvPr>
@@ -1401,7 +1401,7 @@
           <a:p>
             <a:fld id="{E2B7E7BF-E648-44D0-8C95-590A8081F280}" type="datetimeFigureOut">
               <a:rPr lang="en-US" smtClean="0"/>
-              <a:t>5/4/2021</a:t>
+              <a:t>5/5/2021</a:t>
             </a:fld>
             <a:endParaRPr lang="en-US"/>
           </a:p>
@@ -1412,7 +1412,7 @@
           <p:cNvPr id="5" name="Footer Placeholder 4">
             <a:extLst>
               <a:ext uri="{FF2B5EF4-FFF2-40B4-BE49-F238E27FC236}">
-                <a16:creationId xmlns:a16="http://schemas.microsoft.com/office/drawing/2014/main" xmlns="" id="{8B766C05-379A-451F-8BBB-5DC052EDD824}"/>
+                <a16:creationId xmlns:a16="http://schemas.microsoft.com/office/drawing/2014/main" id="{8B766C05-379A-451F-8BBB-5DC052EDD824}"/>
               </a:ext>
             </a:extLst>
           </p:cNvPr>
@@ -1437,7 +1437,7 @@
           <p:cNvPr id="6" name="Slide Number Placeholder 5">
             <a:extLst>
               <a:ext uri="{FF2B5EF4-FFF2-40B4-BE49-F238E27FC236}">
-                <a16:creationId xmlns:a16="http://schemas.microsoft.com/office/drawing/2014/main" xmlns="" id="{8FC87B10-2500-43C9-8D4F-A2102C27CC77}"/>
+                <a16:creationId xmlns:a16="http://schemas.microsoft.com/office/drawing/2014/main" id="{8FC87B10-2500-43C9-8D4F-A2102C27CC77}"/>
               </a:ext>
             </a:extLst>
           </p:cNvPr>
@@ -1496,7 +1496,7 @@
           <p:cNvPr id="2" name="Title 1">
             <a:extLst>
               <a:ext uri="{FF2B5EF4-FFF2-40B4-BE49-F238E27FC236}">
-                <a16:creationId xmlns:a16="http://schemas.microsoft.com/office/drawing/2014/main" xmlns="" id="{82C884C8-5A3C-447C-BC69-70DA80943319}"/>
+                <a16:creationId xmlns:a16="http://schemas.microsoft.com/office/drawing/2014/main" id="{82C884C8-5A3C-447C-BC69-70DA80943319}"/>
               </a:ext>
             </a:extLst>
           </p:cNvPr>
@@ -1524,7 +1524,7 @@
           <p:cNvPr id="3" name="Content Placeholder 2">
             <a:extLst>
               <a:ext uri="{FF2B5EF4-FFF2-40B4-BE49-F238E27FC236}">
-                <a16:creationId xmlns:a16="http://schemas.microsoft.com/office/drawing/2014/main" xmlns="" id="{97B5CD47-7B3F-4721-9522-25D5CA66541A}"/>
+                <a16:creationId xmlns:a16="http://schemas.microsoft.com/office/drawing/2014/main" id="{97B5CD47-7B3F-4721-9522-25D5CA66541A}"/>
               </a:ext>
             </a:extLst>
           </p:cNvPr>
@@ -1581,7 +1581,7 @@
           <p:cNvPr id="4" name="Date Placeholder 3">
             <a:extLst>
               <a:ext uri="{FF2B5EF4-FFF2-40B4-BE49-F238E27FC236}">
-                <a16:creationId xmlns:a16="http://schemas.microsoft.com/office/drawing/2014/main" xmlns="" id="{1C06EF1E-4BD7-4F43-809E-C5DD59DCA3E2}"/>
+                <a16:creationId xmlns:a16="http://schemas.microsoft.com/office/drawing/2014/main" id="{1C06EF1E-4BD7-4F43-809E-C5DD59DCA3E2}"/>
               </a:ext>
             </a:extLst>
           </p:cNvPr>
@@ -1599,7 +1599,7 @@
           <a:p>
             <a:fld id="{E2B7E7BF-E648-44D0-8C95-590A8081F280}" type="datetimeFigureOut">
               <a:rPr lang="en-US" smtClean="0"/>
-              <a:t>5/4/2021</a:t>
+              <a:t>5/5/2021</a:t>
             </a:fld>
             <a:endParaRPr lang="en-US"/>
           </a:p>
@@ -1610,7 +1610,7 @@
           <p:cNvPr id="5" name="Footer Placeholder 4">
             <a:extLst>
               <a:ext uri="{FF2B5EF4-FFF2-40B4-BE49-F238E27FC236}">
-                <a16:creationId xmlns:a16="http://schemas.microsoft.com/office/drawing/2014/main" xmlns="" id="{0021632D-42EE-48D3-BF90-63959CDDF6BA}"/>
+                <a16:creationId xmlns:a16="http://schemas.microsoft.com/office/drawing/2014/main" id="{0021632D-42EE-48D3-BF90-63959CDDF6BA}"/>
               </a:ext>
             </a:extLst>
           </p:cNvPr>
@@ -1635,7 +1635,7 @@
           <p:cNvPr id="6" name="Slide Number Placeholder 5">
             <a:extLst>
               <a:ext uri="{FF2B5EF4-FFF2-40B4-BE49-F238E27FC236}">
-                <a16:creationId xmlns:a16="http://schemas.microsoft.com/office/drawing/2014/main" xmlns="" id="{A5FB4654-C066-4DF3-9105-9EB6CCBE631D}"/>
+                <a16:creationId xmlns:a16="http://schemas.microsoft.com/office/drawing/2014/main" id="{A5FB4654-C066-4DF3-9105-9EB6CCBE631D}"/>
               </a:ext>
             </a:extLst>
           </p:cNvPr>
@@ -1694,7 +1694,7 @@
           <p:cNvPr id="2" name="Title 1">
             <a:extLst>
               <a:ext uri="{FF2B5EF4-FFF2-40B4-BE49-F238E27FC236}">
-                <a16:creationId xmlns:a16="http://schemas.microsoft.com/office/drawing/2014/main" xmlns="" id="{1E5C5315-2D1F-40AE-90C3-920EF53E61F8}"/>
+                <a16:creationId xmlns:a16="http://schemas.microsoft.com/office/drawing/2014/main" id="{1E5C5315-2D1F-40AE-90C3-920EF53E61F8}"/>
               </a:ext>
             </a:extLst>
           </p:cNvPr>
@@ -1731,7 +1731,7 @@
           <p:cNvPr id="3" name="Text Placeholder 2">
             <a:extLst>
               <a:ext uri="{FF2B5EF4-FFF2-40B4-BE49-F238E27FC236}">
-                <a16:creationId xmlns:a16="http://schemas.microsoft.com/office/drawing/2014/main" xmlns="" id="{AAFD32BF-40FC-42CC-9543-52AC1EE74CAA}"/>
+                <a16:creationId xmlns:a16="http://schemas.microsoft.com/office/drawing/2014/main" id="{AAFD32BF-40FC-42CC-9543-52AC1EE74CAA}"/>
               </a:ext>
             </a:extLst>
           </p:cNvPr>
@@ -1856,7 +1856,7 @@
           <p:cNvPr id="4" name="Date Placeholder 3">
             <a:extLst>
               <a:ext uri="{FF2B5EF4-FFF2-40B4-BE49-F238E27FC236}">
-                <a16:creationId xmlns:a16="http://schemas.microsoft.com/office/drawing/2014/main" xmlns="" id="{A41B9CAD-40C7-4EFC-AFFA-5056AD25FA11}"/>
+                <a16:creationId xmlns:a16="http://schemas.microsoft.com/office/drawing/2014/main" id="{A41B9CAD-40C7-4EFC-AFFA-5056AD25FA11}"/>
               </a:ext>
             </a:extLst>
           </p:cNvPr>
@@ -1874,7 +1874,7 @@
           <a:p>
             <a:fld id="{E2B7E7BF-E648-44D0-8C95-590A8081F280}" type="datetimeFigureOut">
               <a:rPr lang="en-US" smtClean="0"/>
-              <a:t>5/4/2021</a:t>
+              <a:t>5/5/2021</a:t>
             </a:fld>
             <a:endParaRPr lang="en-US"/>
           </a:p>
@@ -1885,7 +1885,7 @@
           <p:cNvPr id="5" name="Footer Placeholder 4">
             <a:extLst>
               <a:ext uri="{FF2B5EF4-FFF2-40B4-BE49-F238E27FC236}">
-                <a16:creationId xmlns:a16="http://schemas.microsoft.com/office/drawing/2014/main" xmlns="" id="{C005FD60-F0E4-4298-A0A8-0BE2A29E89D1}"/>
+                <a16:creationId xmlns:a16="http://schemas.microsoft.com/office/drawing/2014/main" id="{C005FD60-F0E4-4298-A0A8-0BE2A29E89D1}"/>
               </a:ext>
             </a:extLst>
           </p:cNvPr>
@@ -1910,7 +1910,7 @@
           <p:cNvPr id="6" name="Slide Number Placeholder 5">
             <a:extLst>
               <a:ext uri="{FF2B5EF4-FFF2-40B4-BE49-F238E27FC236}">
-                <a16:creationId xmlns:a16="http://schemas.microsoft.com/office/drawing/2014/main" xmlns="" id="{7BA8F703-ADC8-4A62-9F05-470D75FE4D13}"/>
+                <a16:creationId xmlns:a16="http://schemas.microsoft.com/office/drawing/2014/main" id="{7BA8F703-ADC8-4A62-9F05-470D75FE4D13}"/>
               </a:ext>
             </a:extLst>
           </p:cNvPr>
@@ -1969,7 +1969,7 @@
           <p:cNvPr id="2" name="Title 1">
             <a:extLst>
               <a:ext uri="{FF2B5EF4-FFF2-40B4-BE49-F238E27FC236}">
-                <a16:creationId xmlns:a16="http://schemas.microsoft.com/office/drawing/2014/main" xmlns="" id="{2A2277D7-0937-4A6E-91F9-764E6C6DAB6A}"/>
+                <a16:creationId xmlns:a16="http://schemas.microsoft.com/office/drawing/2014/main" id="{2A2277D7-0937-4A6E-91F9-764E6C6DAB6A}"/>
               </a:ext>
             </a:extLst>
           </p:cNvPr>
@@ -1997,7 +1997,7 @@
           <p:cNvPr id="3" name="Content Placeholder 2">
             <a:extLst>
               <a:ext uri="{FF2B5EF4-FFF2-40B4-BE49-F238E27FC236}">
-                <a16:creationId xmlns:a16="http://schemas.microsoft.com/office/drawing/2014/main" xmlns="" id="{2A5BD141-7335-40A0-9687-623FF1D3A6F2}"/>
+                <a16:creationId xmlns:a16="http://schemas.microsoft.com/office/drawing/2014/main" id="{2A5BD141-7335-40A0-9687-623FF1D3A6F2}"/>
               </a:ext>
             </a:extLst>
           </p:cNvPr>
@@ -2059,7 +2059,7 @@
           <p:cNvPr id="4" name="Content Placeholder 3">
             <a:extLst>
               <a:ext uri="{FF2B5EF4-FFF2-40B4-BE49-F238E27FC236}">
-                <a16:creationId xmlns:a16="http://schemas.microsoft.com/office/drawing/2014/main" xmlns="" id="{68AB06EE-9AB1-4927-BDA8-2DBD652C7F68}"/>
+                <a16:creationId xmlns:a16="http://schemas.microsoft.com/office/drawing/2014/main" id="{68AB06EE-9AB1-4927-BDA8-2DBD652C7F68}"/>
               </a:ext>
             </a:extLst>
           </p:cNvPr>
@@ -2121,7 +2121,7 @@
           <p:cNvPr id="5" name="Date Placeholder 4">
             <a:extLst>
               <a:ext uri="{FF2B5EF4-FFF2-40B4-BE49-F238E27FC236}">
-                <a16:creationId xmlns:a16="http://schemas.microsoft.com/office/drawing/2014/main" xmlns="" id="{1467F3DF-9A6E-40C6-83E0-00A614248934}"/>
+                <a16:creationId xmlns:a16="http://schemas.microsoft.com/office/drawing/2014/main" id="{1467F3DF-9A6E-40C6-83E0-00A614248934}"/>
               </a:ext>
             </a:extLst>
           </p:cNvPr>
@@ -2139,7 +2139,7 @@
           <a:p>
             <a:fld id="{E2B7E7BF-E648-44D0-8C95-590A8081F280}" type="datetimeFigureOut">
               <a:rPr lang="en-US" smtClean="0"/>
-              <a:t>5/4/2021</a:t>
+              <a:t>5/5/2021</a:t>
             </a:fld>
             <a:endParaRPr lang="en-US"/>
           </a:p>
@@ -2150,7 +2150,7 @@
           <p:cNvPr id="6" name="Footer Placeholder 5">
             <a:extLst>
               <a:ext uri="{FF2B5EF4-FFF2-40B4-BE49-F238E27FC236}">
-                <a16:creationId xmlns:a16="http://schemas.microsoft.com/office/drawing/2014/main" xmlns="" id="{06B00FD1-2C4E-43DB-8A1A-3541E2F610F7}"/>
+                <a16:creationId xmlns:a16="http://schemas.microsoft.com/office/drawing/2014/main" id="{06B00FD1-2C4E-43DB-8A1A-3541E2F610F7}"/>
               </a:ext>
             </a:extLst>
           </p:cNvPr>
@@ -2175,7 +2175,7 @@
           <p:cNvPr id="7" name="Slide Number Placeholder 6">
             <a:extLst>
               <a:ext uri="{FF2B5EF4-FFF2-40B4-BE49-F238E27FC236}">
-                <a16:creationId xmlns:a16="http://schemas.microsoft.com/office/drawing/2014/main" xmlns="" id="{FBAFC028-E466-45E0-8DF3-375B90510302}"/>
+                <a16:creationId xmlns:a16="http://schemas.microsoft.com/office/drawing/2014/main" id="{FBAFC028-E466-45E0-8DF3-375B90510302}"/>
               </a:ext>
             </a:extLst>
           </p:cNvPr>
@@ -2234,7 +2234,7 @@
           <p:cNvPr id="2" name="Title 1">
             <a:extLst>
               <a:ext uri="{FF2B5EF4-FFF2-40B4-BE49-F238E27FC236}">
-                <a16:creationId xmlns:a16="http://schemas.microsoft.com/office/drawing/2014/main" xmlns="" id="{F3852B5A-E71C-47BC-92B0-F0253386831F}"/>
+                <a16:creationId xmlns:a16="http://schemas.microsoft.com/office/drawing/2014/main" id="{F3852B5A-E71C-47BC-92B0-F0253386831F}"/>
               </a:ext>
             </a:extLst>
           </p:cNvPr>
@@ -2267,7 +2267,7 @@
           <p:cNvPr id="3" name="Text Placeholder 2">
             <a:extLst>
               <a:ext uri="{FF2B5EF4-FFF2-40B4-BE49-F238E27FC236}">
-                <a16:creationId xmlns:a16="http://schemas.microsoft.com/office/drawing/2014/main" xmlns="" id="{4912367A-D8EE-48C8-B980-702459FCA561}"/>
+                <a16:creationId xmlns:a16="http://schemas.microsoft.com/office/drawing/2014/main" id="{4912367A-D8EE-48C8-B980-702459FCA561}"/>
               </a:ext>
             </a:extLst>
           </p:cNvPr>
@@ -2338,7 +2338,7 @@
           <p:cNvPr id="4" name="Content Placeholder 3">
             <a:extLst>
               <a:ext uri="{FF2B5EF4-FFF2-40B4-BE49-F238E27FC236}">
-                <a16:creationId xmlns:a16="http://schemas.microsoft.com/office/drawing/2014/main" xmlns="" id="{E9FBD98F-9FD7-43E7-A57F-4FAC0D572A81}"/>
+                <a16:creationId xmlns:a16="http://schemas.microsoft.com/office/drawing/2014/main" id="{E9FBD98F-9FD7-43E7-A57F-4FAC0D572A81}"/>
               </a:ext>
             </a:extLst>
           </p:cNvPr>
@@ -2400,7 +2400,7 @@
           <p:cNvPr id="5" name="Text Placeholder 4">
             <a:extLst>
               <a:ext uri="{FF2B5EF4-FFF2-40B4-BE49-F238E27FC236}">
-                <a16:creationId xmlns:a16="http://schemas.microsoft.com/office/drawing/2014/main" xmlns="" id="{E590B16D-122A-4FC2-B692-CAC28EC855C0}"/>
+                <a16:creationId xmlns:a16="http://schemas.microsoft.com/office/drawing/2014/main" id="{E590B16D-122A-4FC2-B692-CAC28EC855C0}"/>
               </a:ext>
             </a:extLst>
           </p:cNvPr>
@@ -2471,7 +2471,7 @@
           <p:cNvPr id="6" name="Content Placeholder 5">
             <a:extLst>
               <a:ext uri="{FF2B5EF4-FFF2-40B4-BE49-F238E27FC236}">
-                <a16:creationId xmlns:a16="http://schemas.microsoft.com/office/drawing/2014/main" xmlns="" id="{EB51F8AF-CCE8-44F2-9D43-4543079D37A9}"/>
+                <a16:creationId xmlns:a16="http://schemas.microsoft.com/office/drawing/2014/main" id="{EB51F8AF-CCE8-44F2-9D43-4543079D37A9}"/>
               </a:ext>
             </a:extLst>
           </p:cNvPr>
@@ -2533,7 +2533,7 @@
           <p:cNvPr id="7" name="Date Placeholder 6">
             <a:extLst>
               <a:ext uri="{FF2B5EF4-FFF2-40B4-BE49-F238E27FC236}">
-                <a16:creationId xmlns:a16="http://schemas.microsoft.com/office/drawing/2014/main" xmlns="" id="{228D900C-848C-48E9-B4FF-21A2AE4729EA}"/>
+                <a16:creationId xmlns:a16="http://schemas.microsoft.com/office/drawing/2014/main" id="{228D900C-848C-48E9-B4FF-21A2AE4729EA}"/>
               </a:ext>
             </a:extLst>
           </p:cNvPr>
@@ -2551,7 +2551,7 @@
           <a:p>
             <a:fld id="{E2B7E7BF-E648-44D0-8C95-590A8081F280}" type="datetimeFigureOut">
               <a:rPr lang="en-US" smtClean="0"/>
-              <a:t>5/4/2021</a:t>
+              <a:t>5/5/2021</a:t>
             </a:fld>
             <a:endParaRPr lang="en-US"/>
           </a:p>
@@ -2562,7 +2562,7 @@
           <p:cNvPr id="8" name="Footer Placeholder 7">
             <a:extLst>
               <a:ext uri="{FF2B5EF4-FFF2-40B4-BE49-F238E27FC236}">
-                <a16:creationId xmlns:a16="http://schemas.microsoft.com/office/drawing/2014/main" xmlns="" id="{11A1D053-D90E-4C91-9C70-898CBB9D76EC}"/>
+                <a16:creationId xmlns:a16="http://schemas.microsoft.com/office/drawing/2014/main" id="{11A1D053-D90E-4C91-9C70-898CBB9D76EC}"/>
               </a:ext>
             </a:extLst>
           </p:cNvPr>
@@ -2587,7 +2587,7 @@
           <p:cNvPr id="9" name="Slide Number Placeholder 8">
             <a:extLst>
               <a:ext uri="{FF2B5EF4-FFF2-40B4-BE49-F238E27FC236}">
-                <a16:creationId xmlns:a16="http://schemas.microsoft.com/office/drawing/2014/main" xmlns="" id="{8AB8C875-9757-454A-B3BC-6555FAE3B104}"/>
+                <a16:creationId xmlns:a16="http://schemas.microsoft.com/office/drawing/2014/main" id="{8AB8C875-9757-454A-B3BC-6555FAE3B104}"/>
               </a:ext>
             </a:extLst>
           </p:cNvPr>
@@ -2646,7 +2646,7 @@
           <p:cNvPr id="2" name="Title 1">
             <a:extLst>
               <a:ext uri="{FF2B5EF4-FFF2-40B4-BE49-F238E27FC236}">
-                <a16:creationId xmlns:a16="http://schemas.microsoft.com/office/drawing/2014/main" xmlns="" id="{42B13E6D-21E8-4554-B6E2-1BEAE2F465A9}"/>
+                <a16:creationId xmlns:a16="http://schemas.microsoft.com/office/drawing/2014/main" id="{42B13E6D-21E8-4554-B6E2-1BEAE2F465A9}"/>
               </a:ext>
             </a:extLst>
           </p:cNvPr>
@@ -2674,7 +2674,7 @@
           <p:cNvPr id="3" name="Date Placeholder 2">
             <a:extLst>
               <a:ext uri="{FF2B5EF4-FFF2-40B4-BE49-F238E27FC236}">
-                <a16:creationId xmlns:a16="http://schemas.microsoft.com/office/drawing/2014/main" xmlns="" id="{86C95DC3-D24B-4AFF-8571-4B29F63F895B}"/>
+                <a16:creationId xmlns:a16="http://schemas.microsoft.com/office/drawing/2014/main" id="{86C95DC3-D24B-4AFF-8571-4B29F63F895B}"/>
               </a:ext>
             </a:extLst>
           </p:cNvPr>
@@ -2692,7 +2692,7 @@
           <a:p>
             <a:fld id="{E2B7E7BF-E648-44D0-8C95-590A8081F280}" type="datetimeFigureOut">
               <a:rPr lang="en-US" smtClean="0"/>
-              <a:t>5/4/2021</a:t>
+              <a:t>5/5/2021</a:t>
             </a:fld>
             <a:endParaRPr lang="en-US"/>
           </a:p>
@@ -2703,7 +2703,7 @@
           <p:cNvPr id="4" name="Footer Placeholder 3">
             <a:extLst>
               <a:ext uri="{FF2B5EF4-FFF2-40B4-BE49-F238E27FC236}">
-                <a16:creationId xmlns:a16="http://schemas.microsoft.com/office/drawing/2014/main" xmlns="" id="{25AB2DC5-6410-4BD8-95A3-80BDAAE2F433}"/>
+                <a16:creationId xmlns:a16="http://schemas.microsoft.com/office/drawing/2014/main" id="{25AB2DC5-6410-4BD8-95A3-80BDAAE2F433}"/>
               </a:ext>
             </a:extLst>
           </p:cNvPr>
@@ -2728,7 +2728,7 @@
           <p:cNvPr id="5" name="Slide Number Placeholder 4">
             <a:extLst>
               <a:ext uri="{FF2B5EF4-FFF2-40B4-BE49-F238E27FC236}">
-                <a16:creationId xmlns:a16="http://schemas.microsoft.com/office/drawing/2014/main" xmlns="" id="{D640DE5C-8B75-46D1-979C-A8EF22D25418}"/>
+                <a16:creationId xmlns:a16="http://schemas.microsoft.com/office/drawing/2014/main" id="{D640DE5C-8B75-46D1-979C-A8EF22D25418}"/>
               </a:ext>
             </a:extLst>
           </p:cNvPr>
@@ -2787,7 +2787,7 @@
           <p:cNvPr id="2" name="Date Placeholder 1">
             <a:extLst>
               <a:ext uri="{FF2B5EF4-FFF2-40B4-BE49-F238E27FC236}">
-                <a16:creationId xmlns:a16="http://schemas.microsoft.com/office/drawing/2014/main" xmlns="" id="{0B3D4CF6-422B-43C8-AFB8-89EBB0DB80D3}"/>
+                <a16:creationId xmlns:a16="http://schemas.microsoft.com/office/drawing/2014/main" id="{0B3D4CF6-422B-43C8-AFB8-89EBB0DB80D3}"/>
               </a:ext>
             </a:extLst>
           </p:cNvPr>
@@ -2805,7 +2805,7 @@
           <a:p>
             <a:fld id="{E2B7E7BF-E648-44D0-8C95-590A8081F280}" type="datetimeFigureOut">
               <a:rPr lang="en-US" smtClean="0"/>
-              <a:t>5/4/2021</a:t>
+              <a:t>5/5/2021</a:t>
             </a:fld>
             <a:endParaRPr lang="en-US"/>
           </a:p>
@@ -2816,7 +2816,7 @@
           <p:cNvPr id="3" name="Footer Placeholder 2">
             <a:extLst>
               <a:ext uri="{FF2B5EF4-FFF2-40B4-BE49-F238E27FC236}">
-                <a16:creationId xmlns:a16="http://schemas.microsoft.com/office/drawing/2014/main" xmlns="" id="{28478275-B09A-44AF-86DD-19495DC0E58B}"/>
+                <a16:creationId xmlns:a16="http://schemas.microsoft.com/office/drawing/2014/main" id="{28478275-B09A-44AF-86DD-19495DC0E58B}"/>
               </a:ext>
             </a:extLst>
           </p:cNvPr>
@@ -2841,7 +2841,7 @@
           <p:cNvPr id="4" name="Slide Number Placeholder 3">
             <a:extLst>
               <a:ext uri="{FF2B5EF4-FFF2-40B4-BE49-F238E27FC236}">
-                <a16:creationId xmlns:a16="http://schemas.microsoft.com/office/drawing/2014/main" xmlns="" id="{C33FB40D-3A8D-424B-9C04-FA07FE29BB26}"/>
+                <a16:creationId xmlns:a16="http://schemas.microsoft.com/office/drawing/2014/main" id="{C33FB40D-3A8D-424B-9C04-FA07FE29BB26}"/>
               </a:ext>
             </a:extLst>
           </p:cNvPr>
@@ -2900,7 +2900,7 @@
           <p:cNvPr id="2" name="Title 1">
             <a:extLst>
               <a:ext uri="{FF2B5EF4-FFF2-40B4-BE49-F238E27FC236}">
-                <a16:creationId xmlns:a16="http://schemas.microsoft.com/office/drawing/2014/main" xmlns="" id="{8B9E6F00-10B9-4A18-A349-6CCFBBA3F438}"/>
+                <a16:creationId xmlns:a16="http://schemas.microsoft.com/office/drawing/2014/main" id="{8B9E6F00-10B9-4A18-A349-6CCFBBA3F438}"/>
               </a:ext>
             </a:extLst>
           </p:cNvPr>
@@ -2937,7 +2937,7 @@
           <p:cNvPr id="3" name="Content Placeholder 2">
             <a:extLst>
               <a:ext uri="{FF2B5EF4-FFF2-40B4-BE49-F238E27FC236}">
-                <a16:creationId xmlns:a16="http://schemas.microsoft.com/office/drawing/2014/main" xmlns="" id="{8E83D0B1-5484-44CF-BBAB-50F20150C414}"/>
+                <a16:creationId xmlns:a16="http://schemas.microsoft.com/office/drawing/2014/main" id="{8E83D0B1-5484-44CF-BBAB-50F20150C414}"/>
               </a:ext>
             </a:extLst>
           </p:cNvPr>
@@ -3027,7 +3027,7 @@
           <p:cNvPr id="4" name="Text Placeholder 3">
             <a:extLst>
               <a:ext uri="{FF2B5EF4-FFF2-40B4-BE49-F238E27FC236}">
-                <a16:creationId xmlns:a16="http://schemas.microsoft.com/office/drawing/2014/main" xmlns="" id="{655B3463-0B40-43BF-9478-868FDF0DF0D1}"/>
+                <a16:creationId xmlns:a16="http://schemas.microsoft.com/office/drawing/2014/main" id="{655B3463-0B40-43BF-9478-868FDF0DF0D1}"/>
               </a:ext>
             </a:extLst>
           </p:cNvPr>
@@ -3098,7 +3098,7 @@
           <p:cNvPr id="5" name="Date Placeholder 4">
             <a:extLst>
               <a:ext uri="{FF2B5EF4-FFF2-40B4-BE49-F238E27FC236}">
-                <a16:creationId xmlns:a16="http://schemas.microsoft.com/office/drawing/2014/main" xmlns="" id="{AE71CEC0-482A-475D-9755-EB1EBC7325A0}"/>
+                <a16:creationId xmlns:a16="http://schemas.microsoft.com/office/drawing/2014/main" id="{AE71CEC0-482A-475D-9755-EB1EBC7325A0}"/>
               </a:ext>
             </a:extLst>
           </p:cNvPr>
@@ -3116,7 +3116,7 @@
           <a:p>
             <a:fld id="{E2B7E7BF-E648-44D0-8C95-590A8081F280}" type="datetimeFigureOut">
               <a:rPr lang="en-US" smtClean="0"/>
-              <a:t>5/4/2021</a:t>
+              <a:t>5/5/2021</a:t>
             </a:fld>
             <a:endParaRPr lang="en-US"/>
           </a:p>
@@ -3127,7 +3127,7 @@
           <p:cNvPr id="6" name="Footer Placeholder 5">
             <a:extLst>
               <a:ext uri="{FF2B5EF4-FFF2-40B4-BE49-F238E27FC236}">
-                <a16:creationId xmlns:a16="http://schemas.microsoft.com/office/drawing/2014/main" xmlns="" id="{70915CA5-1942-48C9-8E42-7EDAFD0DF82B}"/>
+                <a16:creationId xmlns:a16="http://schemas.microsoft.com/office/drawing/2014/main" id="{70915CA5-1942-48C9-8E42-7EDAFD0DF82B}"/>
               </a:ext>
             </a:extLst>
           </p:cNvPr>
@@ -3152,7 +3152,7 @@
           <p:cNvPr id="7" name="Slide Number Placeholder 6">
             <a:extLst>
               <a:ext uri="{FF2B5EF4-FFF2-40B4-BE49-F238E27FC236}">
-                <a16:creationId xmlns:a16="http://schemas.microsoft.com/office/drawing/2014/main" xmlns="" id="{F5BF40D1-A82D-45F3-96EA-58ACF291E359}"/>
+                <a16:creationId xmlns:a16="http://schemas.microsoft.com/office/drawing/2014/main" id="{F5BF40D1-A82D-45F3-96EA-58ACF291E359}"/>
               </a:ext>
             </a:extLst>
           </p:cNvPr>
@@ -3211,7 +3211,7 @@
           <p:cNvPr id="2" name="Title 1">
             <a:extLst>
               <a:ext uri="{FF2B5EF4-FFF2-40B4-BE49-F238E27FC236}">
-                <a16:creationId xmlns:a16="http://schemas.microsoft.com/office/drawing/2014/main" xmlns="" id="{A7919C8E-70A4-4CF4-B572-B10169236191}"/>
+                <a16:creationId xmlns:a16="http://schemas.microsoft.com/office/drawing/2014/main" id="{A7919C8E-70A4-4CF4-B572-B10169236191}"/>
               </a:ext>
             </a:extLst>
           </p:cNvPr>
@@ -3248,7 +3248,7 @@
           <p:cNvPr id="3" name="Picture Placeholder 2">
             <a:extLst>
               <a:ext uri="{FF2B5EF4-FFF2-40B4-BE49-F238E27FC236}">
-                <a16:creationId xmlns:a16="http://schemas.microsoft.com/office/drawing/2014/main" xmlns="" id="{E18393D1-9CC2-436B-8698-FDE463016794}"/>
+                <a16:creationId xmlns:a16="http://schemas.microsoft.com/office/drawing/2014/main" id="{E18393D1-9CC2-436B-8698-FDE463016794}"/>
               </a:ext>
             </a:extLst>
           </p:cNvPr>
@@ -3315,7 +3315,7 @@
           <p:cNvPr id="4" name="Text Placeholder 3">
             <a:extLst>
               <a:ext uri="{FF2B5EF4-FFF2-40B4-BE49-F238E27FC236}">
-                <a16:creationId xmlns:a16="http://schemas.microsoft.com/office/drawing/2014/main" xmlns="" id="{08AE0DDF-D950-4E2A-AA3D-3DFE0F23308E}"/>
+                <a16:creationId xmlns:a16="http://schemas.microsoft.com/office/drawing/2014/main" id="{08AE0DDF-D950-4E2A-AA3D-3DFE0F23308E}"/>
               </a:ext>
             </a:extLst>
           </p:cNvPr>
@@ -3386,7 +3386,7 @@
           <p:cNvPr id="5" name="Date Placeholder 4">
             <a:extLst>
               <a:ext uri="{FF2B5EF4-FFF2-40B4-BE49-F238E27FC236}">
-                <a16:creationId xmlns:a16="http://schemas.microsoft.com/office/drawing/2014/main" xmlns="" id="{F172CF79-81FB-4005-A402-4EC642382428}"/>
+                <a16:creationId xmlns:a16="http://schemas.microsoft.com/office/drawing/2014/main" id="{F172CF79-81FB-4005-A402-4EC642382428}"/>
               </a:ext>
             </a:extLst>
           </p:cNvPr>
@@ -3404,7 +3404,7 @@
           <a:p>
             <a:fld id="{E2B7E7BF-E648-44D0-8C95-590A8081F280}" type="datetimeFigureOut">
               <a:rPr lang="en-US" smtClean="0"/>
-              <a:t>5/4/2021</a:t>
+              <a:t>5/5/2021</a:t>
             </a:fld>
             <a:endParaRPr lang="en-US"/>
           </a:p>
@@ -3415,7 +3415,7 @@
           <p:cNvPr id="6" name="Footer Placeholder 5">
             <a:extLst>
               <a:ext uri="{FF2B5EF4-FFF2-40B4-BE49-F238E27FC236}">
-                <a16:creationId xmlns:a16="http://schemas.microsoft.com/office/drawing/2014/main" xmlns="" id="{869F9C4B-48FA-4D7E-A819-27D9E973C4AC}"/>
+                <a16:creationId xmlns:a16="http://schemas.microsoft.com/office/drawing/2014/main" id="{869F9C4B-48FA-4D7E-A819-27D9E973C4AC}"/>
               </a:ext>
             </a:extLst>
           </p:cNvPr>
@@ -3440,7 +3440,7 @@
           <p:cNvPr id="7" name="Slide Number Placeholder 6">
             <a:extLst>
               <a:ext uri="{FF2B5EF4-FFF2-40B4-BE49-F238E27FC236}">
-                <a16:creationId xmlns:a16="http://schemas.microsoft.com/office/drawing/2014/main" xmlns="" id="{50094332-D767-48E1-9DA9-7B92625DC293}"/>
+                <a16:creationId xmlns:a16="http://schemas.microsoft.com/office/drawing/2014/main" id="{50094332-D767-48E1-9DA9-7B92625DC293}"/>
               </a:ext>
             </a:extLst>
           </p:cNvPr>
@@ -3504,7 +3504,7 @@
           <p:cNvPr id="2" name="Title Placeholder 1">
             <a:extLst>
               <a:ext uri="{FF2B5EF4-FFF2-40B4-BE49-F238E27FC236}">
-                <a16:creationId xmlns:a16="http://schemas.microsoft.com/office/drawing/2014/main" xmlns="" id="{D9BFE41F-A4D4-4182-B1C5-2D6F0E6F7438}"/>
+                <a16:creationId xmlns:a16="http://schemas.microsoft.com/office/drawing/2014/main" id="{D9BFE41F-A4D4-4182-B1C5-2D6F0E6F7438}"/>
               </a:ext>
             </a:extLst>
           </p:cNvPr>
@@ -3542,7 +3542,7 @@
           <p:cNvPr id="3" name="Text Placeholder 2">
             <a:extLst>
               <a:ext uri="{FF2B5EF4-FFF2-40B4-BE49-F238E27FC236}">
-                <a16:creationId xmlns:a16="http://schemas.microsoft.com/office/drawing/2014/main" xmlns="" id="{06DB14C5-2567-4FD4-8944-174BCC20E00C}"/>
+                <a16:creationId xmlns:a16="http://schemas.microsoft.com/office/drawing/2014/main" id="{06DB14C5-2567-4FD4-8944-174BCC20E00C}"/>
               </a:ext>
             </a:extLst>
           </p:cNvPr>
@@ -3609,7 +3609,7 @@
           <p:cNvPr id="4" name="Date Placeholder 3">
             <a:extLst>
               <a:ext uri="{FF2B5EF4-FFF2-40B4-BE49-F238E27FC236}">
-                <a16:creationId xmlns:a16="http://schemas.microsoft.com/office/drawing/2014/main" xmlns="" id="{869CA8AE-FBF4-4B5C-BAF7-63B2487E758A}"/>
+                <a16:creationId xmlns:a16="http://schemas.microsoft.com/office/drawing/2014/main" id="{869CA8AE-FBF4-4B5C-BAF7-63B2487E758A}"/>
               </a:ext>
             </a:extLst>
           </p:cNvPr>
@@ -3645,7 +3645,7 @@
           <a:p>
             <a:fld id="{E2B7E7BF-E648-44D0-8C95-590A8081F280}" type="datetimeFigureOut">
               <a:rPr lang="en-US" smtClean="0"/>
-              <a:t>5/4/2021</a:t>
+              <a:t>5/5/2021</a:t>
             </a:fld>
             <a:endParaRPr lang="en-US"/>
           </a:p>
@@ -3656,7 +3656,7 @@
           <p:cNvPr id="5" name="Footer Placeholder 4">
             <a:extLst>
               <a:ext uri="{FF2B5EF4-FFF2-40B4-BE49-F238E27FC236}">
-                <a16:creationId xmlns:a16="http://schemas.microsoft.com/office/drawing/2014/main" xmlns="" id="{892E0C27-F3D5-44AC-B580-02AFC5B28B3E}"/>
+                <a16:creationId xmlns:a16="http://schemas.microsoft.com/office/drawing/2014/main" id="{892E0C27-F3D5-44AC-B580-02AFC5B28B3E}"/>
               </a:ext>
             </a:extLst>
           </p:cNvPr>
@@ -3699,7 +3699,7 @@
           <p:cNvPr id="6" name="Slide Number Placeholder 5">
             <a:extLst>
               <a:ext uri="{FF2B5EF4-FFF2-40B4-BE49-F238E27FC236}">
-                <a16:creationId xmlns:a16="http://schemas.microsoft.com/office/drawing/2014/main" xmlns="" id="{C3B4AA22-8D01-4C9D-BD7A-9726F0327C6E}"/>
+                <a16:creationId xmlns:a16="http://schemas.microsoft.com/office/drawing/2014/main" id="{C3B4AA22-8D01-4C9D-BD7A-9726F0327C6E}"/>
               </a:ext>
             </a:extLst>
           </p:cNvPr>
@@ -4089,7 +4089,7 @@
             <p:cNvPr id="5" name="Picture 4">
               <a:extLst>
                 <a:ext uri="{FF2B5EF4-FFF2-40B4-BE49-F238E27FC236}">
-                  <a16:creationId xmlns:a16="http://schemas.microsoft.com/office/drawing/2014/main" xmlns="" id="{A6424575-4C38-4256-B6F2-7983E50E8AFE}"/>
+                  <a16:creationId xmlns:a16="http://schemas.microsoft.com/office/drawing/2014/main" id="{A6424575-4C38-4256-B6F2-7983E50E8AFE}"/>
                 </a:ext>
               </a:extLst>
             </p:cNvPr>
@@ -4118,7 +4118,7 @@
             <p:cNvPr id="6" name="Picture 5">
               <a:extLst>
                 <a:ext uri="{FF2B5EF4-FFF2-40B4-BE49-F238E27FC236}">
-                  <a16:creationId xmlns:a16="http://schemas.microsoft.com/office/drawing/2014/main" xmlns="" id="{DDA1A626-38E8-4B07-BA96-C06682B390EB}"/>
+                  <a16:creationId xmlns:a16="http://schemas.microsoft.com/office/drawing/2014/main" id="{DDA1A626-38E8-4B07-BA96-C06682B390EB}"/>
                 </a:ext>
               </a:extLst>
             </p:cNvPr>
@@ -4147,7 +4147,7 @@
             <p:cNvPr id="7" name="Picture 6">
               <a:extLst>
                 <a:ext uri="{FF2B5EF4-FFF2-40B4-BE49-F238E27FC236}">
-                  <a16:creationId xmlns:a16="http://schemas.microsoft.com/office/drawing/2014/main" xmlns="" id="{01A057CA-AA13-495C-B9C7-FCF01B1D94C2}"/>
+                  <a16:creationId xmlns:a16="http://schemas.microsoft.com/office/drawing/2014/main" id="{01A057CA-AA13-495C-B9C7-FCF01B1D94C2}"/>
                 </a:ext>
               </a:extLst>
             </p:cNvPr>
@@ -4176,7 +4176,7 @@
             <p:cNvPr id="13" name="Straight Connector 12">
               <a:extLst>
                 <a:ext uri="{FF2B5EF4-FFF2-40B4-BE49-F238E27FC236}">
-                  <a16:creationId xmlns:a16="http://schemas.microsoft.com/office/drawing/2014/main" xmlns="" id="{26863735-E13D-4A89-AE8C-597A08621476}"/>
+                  <a16:creationId xmlns:a16="http://schemas.microsoft.com/office/drawing/2014/main" id="{26863735-E13D-4A89-AE8C-597A08621476}"/>
                 </a:ext>
               </a:extLst>
             </p:cNvPr>
@@ -4215,7 +4215,7 @@
             <p:cNvPr id="22" name="Picture 21">
               <a:extLst>
                 <a:ext uri="{FF2B5EF4-FFF2-40B4-BE49-F238E27FC236}">
-                  <a16:creationId xmlns:a16="http://schemas.microsoft.com/office/drawing/2014/main" xmlns="" id="{3CDDA5AC-9987-489F-87AA-9E5FED7D545B}"/>
+                  <a16:creationId xmlns:a16="http://schemas.microsoft.com/office/drawing/2014/main" id="{3CDDA5AC-9987-489F-87AA-9E5FED7D545B}"/>
                 </a:ext>
               </a:extLst>
             </p:cNvPr>
@@ -4245,7 +4245,7 @@
             <p:cNvPr id="23" name="Picture 22">
               <a:extLst>
                 <a:ext uri="{FF2B5EF4-FFF2-40B4-BE49-F238E27FC236}">
-                  <a16:creationId xmlns:a16="http://schemas.microsoft.com/office/drawing/2014/main" xmlns="" id="{3500F582-63F6-4EC9-AC70-FE2357FA7E70}"/>
+                  <a16:creationId xmlns:a16="http://schemas.microsoft.com/office/drawing/2014/main" id="{3500F582-63F6-4EC9-AC70-FE2357FA7E70}"/>
                 </a:ext>
               </a:extLst>
             </p:cNvPr>
@@ -4275,7 +4275,7 @@
             <p:cNvPr id="24" name="Picture 23">
               <a:extLst>
                 <a:ext uri="{FF2B5EF4-FFF2-40B4-BE49-F238E27FC236}">
-                  <a16:creationId xmlns:a16="http://schemas.microsoft.com/office/drawing/2014/main" xmlns="" id="{8B158699-579C-4B79-AE36-6DA8E750A5FE}"/>
+                  <a16:creationId xmlns:a16="http://schemas.microsoft.com/office/drawing/2014/main" id="{8B158699-579C-4B79-AE36-6DA8E750A5FE}"/>
                 </a:ext>
               </a:extLst>
             </p:cNvPr>
@@ -4305,7 +4305,7 @@
             <p:cNvPr id="25" name="Picture 24">
               <a:extLst>
                 <a:ext uri="{FF2B5EF4-FFF2-40B4-BE49-F238E27FC236}">
-                  <a16:creationId xmlns:a16="http://schemas.microsoft.com/office/drawing/2014/main" xmlns="" id="{B878C007-8F06-4B5F-A384-648211B53F24}"/>
+                  <a16:creationId xmlns:a16="http://schemas.microsoft.com/office/drawing/2014/main" id="{B878C007-8F06-4B5F-A384-648211B53F24}"/>
                 </a:ext>
               </a:extLst>
             </p:cNvPr>
@@ -4335,7 +4335,7 @@
             <p:cNvPr id="26" name="Picture 25">
               <a:extLst>
                 <a:ext uri="{FF2B5EF4-FFF2-40B4-BE49-F238E27FC236}">
-                  <a16:creationId xmlns:a16="http://schemas.microsoft.com/office/drawing/2014/main" xmlns="" id="{CAC77E8C-4764-44BC-AA74-61B92896F266}"/>
+                  <a16:creationId xmlns:a16="http://schemas.microsoft.com/office/drawing/2014/main" id="{CAC77E8C-4764-44BC-AA74-61B92896F266}"/>
                 </a:ext>
               </a:extLst>
             </p:cNvPr>
@@ -4365,7 +4365,7 @@
             <p:cNvPr id="27" name="Picture 26">
               <a:extLst>
                 <a:ext uri="{FF2B5EF4-FFF2-40B4-BE49-F238E27FC236}">
-                  <a16:creationId xmlns:a16="http://schemas.microsoft.com/office/drawing/2014/main" xmlns="" id="{AD32CB3E-C28B-4ED4-BD44-222F3329D1F1}"/>
+                  <a16:creationId xmlns:a16="http://schemas.microsoft.com/office/drawing/2014/main" id="{AD32CB3E-C28B-4ED4-BD44-222F3329D1F1}"/>
                 </a:ext>
               </a:extLst>
             </p:cNvPr>
@@ -4395,7 +4395,7 @@
             <p:cNvPr id="28" name="Picture 27">
               <a:extLst>
                 <a:ext uri="{FF2B5EF4-FFF2-40B4-BE49-F238E27FC236}">
-                  <a16:creationId xmlns:a16="http://schemas.microsoft.com/office/drawing/2014/main" xmlns="" id="{BE6AEAA1-9830-4202-9600-B4AFB9FDF188}"/>
+                  <a16:creationId xmlns:a16="http://schemas.microsoft.com/office/drawing/2014/main" id="{BE6AEAA1-9830-4202-9600-B4AFB9FDF188}"/>
                 </a:ext>
               </a:extLst>
             </p:cNvPr>
@@ -4425,7 +4425,7 @@
             <p:cNvPr id="29" name="Picture 28">
               <a:extLst>
                 <a:ext uri="{FF2B5EF4-FFF2-40B4-BE49-F238E27FC236}">
-                  <a16:creationId xmlns:a16="http://schemas.microsoft.com/office/drawing/2014/main" xmlns="" id="{3FB74890-554C-4066-B40F-A83D7719334D}"/>
+                  <a16:creationId xmlns:a16="http://schemas.microsoft.com/office/drawing/2014/main" id="{3FB74890-554C-4066-B40F-A83D7719334D}"/>
                 </a:ext>
               </a:extLst>
             </p:cNvPr>
@@ -4455,7 +4455,7 @@
             <p:cNvPr id="46" name="Freeform: Shape 45">
               <a:extLst>
                 <a:ext uri="{FF2B5EF4-FFF2-40B4-BE49-F238E27FC236}">
-                  <a16:creationId xmlns:a16="http://schemas.microsoft.com/office/drawing/2014/main" xmlns="" id="{4728A98C-3B8D-409E-8F0A-C0E41AED3D45}"/>
+                  <a16:creationId xmlns:a16="http://schemas.microsoft.com/office/drawing/2014/main" id="{4728A98C-3B8D-409E-8F0A-C0E41AED3D45}"/>
                 </a:ext>
               </a:extLst>
             </p:cNvPr>
@@ -4598,7 +4598,7 @@
             <p:cNvPr id="48" name="Freeform: Shape 47">
               <a:extLst>
                 <a:ext uri="{FF2B5EF4-FFF2-40B4-BE49-F238E27FC236}">
-                  <a16:creationId xmlns:a16="http://schemas.microsoft.com/office/drawing/2014/main" xmlns="" id="{EC8181A3-E23A-4885-B51C-B7EA5AC9715D}"/>
+                  <a16:creationId xmlns:a16="http://schemas.microsoft.com/office/drawing/2014/main" id="{EC8181A3-E23A-4885-B51C-B7EA5AC9715D}"/>
                 </a:ext>
               </a:extLst>
             </p:cNvPr>
@@ -4781,7 +4781,7 @@
             <p:cNvPr id="49" name="Freeform: Shape 48">
               <a:extLst>
                 <a:ext uri="{FF2B5EF4-FFF2-40B4-BE49-F238E27FC236}">
-                  <a16:creationId xmlns:a16="http://schemas.microsoft.com/office/drawing/2014/main" xmlns="" id="{35390957-43A9-4ED0-B31A-D1C9D1338EDE}"/>
+                  <a16:creationId xmlns:a16="http://schemas.microsoft.com/office/drawing/2014/main" id="{35390957-43A9-4ED0-B31A-D1C9D1338EDE}"/>
                 </a:ext>
               </a:extLst>
             </p:cNvPr>
@@ -5010,7 +5010,7 @@
             <p:cNvPr id="50" name="Freeform: Shape 49">
               <a:extLst>
                 <a:ext uri="{FF2B5EF4-FFF2-40B4-BE49-F238E27FC236}">
-                  <a16:creationId xmlns:a16="http://schemas.microsoft.com/office/drawing/2014/main" xmlns="" id="{0361E4F4-A71D-4450-A1C5-51B87E3B7173}"/>
+                  <a16:creationId xmlns:a16="http://schemas.microsoft.com/office/drawing/2014/main" id="{0361E4F4-A71D-4450-A1C5-51B87E3B7173}"/>
                 </a:ext>
               </a:extLst>
             </p:cNvPr>
@@ -5113,7 +5113,7 @@
             <p:cNvPr id="51" name="Freeform: Shape 50">
               <a:extLst>
                 <a:ext uri="{FF2B5EF4-FFF2-40B4-BE49-F238E27FC236}">
-                  <a16:creationId xmlns:a16="http://schemas.microsoft.com/office/drawing/2014/main" xmlns="" id="{4246151C-11C4-4DD3-8C43-9E8E33FB2EC1}"/>
+                  <a16:creationId xmlns:a16="http://schemas.microsoft.com/office/drawing/2014/main" id="{4246151C-11C4-4DD3-8C43-9E8E33FB2EC1}"/>
                 </a:ext>
               </a:extLst>
             </p:cNvPr>
@@ -5286,7 +5286,7 @@
             <p:cNvPr id="52" name="Freeform: Shape 51">
               <a:extLst>
                 <a:ext uri="{FF2B5EF4-FFF2-40B4-BE49-F238E27FC236}">
-                  <a16:creationId xmlns:a16="http://schemas.microsoft.com/office/drawing/2014/main" xmlns="" id="{80FD8095-EE18-4081-9141-CD92686A315D}"/>
+                  <a16:creationId xmlns:a16="http://schemas.microsoft.com/office/drawing/2014/main" id="{80FD8095-EE18-4081-9141-CD92686A315D}"/>
                 </a:ext>
               </a:extLst>
             </p:cNvPr>
@@ -5439,7 +5439,7 @@
             <p:cNvPr id="53" name="Freeform: Shape 52">
               <a:extLst>
                 <a:ext uri="{FF2B5EF4-FFF2-40B4-BE49-F238E27FC236}">
-                  <a16:creationId xmlns:a16="http://schemas.microsoft.com/office/drawing/2014/main" xmlns="" id="{3774E5BE-8A8F-4E37-9AC1-DFF50A3AC57C}"/>
+                  <a16:creationId xmlns:a16="http://schemas.microsoft.com/office/drawing/2014/main" id="{3774E5BE-8A8F-4E37-9AC1-DFF50A3AC57C}"/>
                 </a:ext>
               </a:extLst>
             </p:cNvPr>
@@ -5592,7 +5592,7 @@
             <p:cNvPr id="54" name="Freeform: Shape 53">
               <a:extLst>
                 <a:ext uri="{FF2B5EF4-FFF2-40B4-BE49-F238E27FC236}">
-                  <a16:creationId xmlns:a16="http://schemas.microsoft.com/office/drawing/2014/main" xmlns="" id="{A120BA88-3CFF-4CB2-AD71-7C0C9E43EC3B}"/>
+                  <a16:creationId xmlns:a16="http://schemas.microsoft.com/office/drawing/2014/main" id="{A120BA88-3CFF-4CB2-AD71-7C0C9E43EC3B}"/>
                 </a:ext>
               </a:extLst>
             </p:cNvPr>
@@ -5745,7 +5745,7 @@
             <p:cNvPr id="30" name="Picture 29">
               <a:extLst>
                 <a:ext uri="{FF2B5EF4-FFF2-40B4-BE49-F238E27FC236}">
-                  <a16:creationId xmlns:a16="http://schemas.microsoft.com/office/drawing/2014/main" xmlns="" id="{42032B77-D7B1-46F9-AA83-CF87105D2846}"/>
+                  <a16:creationId xmlns:a16="http://schemas.microsoft.com/office/drawing/2014/main" id="{42032B77-D7B1-46F9-AA83-CF87105D2846}"/>
                 </a:ext>
               </a:extLst>
             </p:cNvPr>
@@ -8310,10 +8310,9 @@
             <a:lstStyle/>
             <a:p>
               <a:r>
-                <a:rPr lang="en-PH" sz="800" dirty="0" smtClean="0"/>
+                <a:rPr lang="en-PH" sz="800" dirty="0"/>
                 <a:t>BT4-2</a:t>
               </a:r>
-              <a:endParaRPr lang="en-PH" sz="800" dirty="0"/>
             </a:p>
           </p:txBody>
         </p:sp>
@@ -8340,10 +8339,9 @@
             <a:lstStyle/>
             <a:p>
               <a:r>
-                <a:rPr lang="en-PH" sz="1000" dirty="0" smtClean="0"/>
+                <a:rPr lang="en-PH" sz="1000" dirty="0"/>
                 <a:t>PLET32</a:t>
               </a:r>
-              <a:endParaRPr lang="en-PH" sz="1000" dirty="0"/>
             </a:p>
           </p:txBody>
         </p:sp>
@@ -8370,10 +8368,9 @@
             <a:lstStyle/>
             <a:p>
               <a:r>
-                <a:rPr lang="en-PH" sz="1000" dirty="0" smtClean="0"/>
+                <a:rPr lang="en-PH" sz="1000" dirty="0"/>
                 <a:t>PLET12</a:t>
               </a:r>
-              <a:endParaRPr lang="en-PH" sz="1000" dirty="0"/>
             </a:p>
           </p:txBody>
         </p:sp>
@@ -8400,10 +8397,9 @@
             <a:lstStyle/>
             <a:p>
               <a:r>
-                <a:rPr lang="en-PH" sz="1000" dirty="0" smtClean="0"/>
+                <a:rPr lang="en-PH" sz="1000" dirty="0"/>
                 <a:t>PLET22</a:t>
               </a:r>
-              <a:endParaRPr lang="en-PH" sz="1000" dirty="0"/>
             </a:p>
           </p:txBody>
         </p:sp>
@@ -8430,10 +8426,9 @@
             <a:lstStyle/>
             <a:p>
               <a:r>
-                <a:rPr lang="en-PH" sz="1000" dirty="0" smtClean="0"/>
+                <a:rPr lang="en-PH" sz="1000" dirty="0"/>
                 <a:t>Riser Base Manifold</a:t>
               </a:r>
-              <a:endParaRPr lang="en-PH" sz="1000" dirty="0"/>
             </a:p>
           </p:txBody>
         </p:sp>
@@ -8460,16 +8455,15 @@
             <a:lstStyle/>
             <a:p>
               <a:r>
-                <a:rPr lang="en-PH" sz="1000" dirty="0" smtClean="0"/>
+                <a:rPr lang="en-PH" sz="1000" dirty="0"/>
                 <a:t>Riser Heel </a:t>
               </a:r>
             </a:p>
             <a:p>
               <a:r>
-                <a:rPr lang="en-PH" sz="1000" dirty="0" smtClean="0"/>
+                <a:rPr lang="en-PH" sz="1000" dirty="0"/>
                 <a:t>Anchors</a:t>
               </a:r>
-              <a:endParaRPr lang="en-PH" sz="1000" dirty="0"/>
             </a:p>
           </p:txBody>
         </p:sp>
@@ -8496,14 +8490,13 @@
             <a:lstStyle/>
             <a:p>
               <a:r>
-                <a:rPr lang="en-PH" sz="1000" dirty="0" smtClean="0"/>
+                <a:rPr lang="en-PH" sz="1000" dirty="0"/>
                 <a:t>Flexible Riser  </a:t>
               </a:r>
               <a:r>
-                <a:rPr lang="en-PH" sz="1200" dirty="0" smtClean="0"/>
+                <a:rPr lang="en-PH" sz="1200" dirty="0"/>
                 <a:t>8     7     6     5</a:t>
               </a:r>
-              <a:endParaRPr lang="en-PH" sz="1200" dirty="0"/>
             </a:p>
           </p:txBody>
         </p:sp>
@@ -8530,10 +8523,9 @@
             <a:lstStyle/>
             <a:p>
               <a:r>
-                <a:rPr lang="en-PH" sz="1000" dirty="0" smtClean="0"/>
+                <a:rPr lang="en-PH" sz="1000" dirty="0"/>
                 <a:t>Umbilical</a:t>
               </a:r>
-              <a:endParaRPr lang="en-PH" sz="1000" dirty="0"/>
             </a:p>
           </p:txBody>
         </p:sp>
@@ -8560,10 +8552,9 @@
             <a:lstStyle/>
             <a:p>
               <a:r>
-                <a:rPr lang="en-PH" sz="1000" dirty="0" smtClean="0"/>
+                <a:rPr lang="en-PH" sz="1000" dirty="0"/>
                 <a:t>ESFL</a:t>
               </a:r>
-              <a:endParaRPr lang="en-PH" sz="1000" dirty="0"/>
             </a:p>
           </p:txBody>
         </p:sp>
@@ -8590,10 +8581,9 @@
             <a:lstStyle/>
             <a:p>
               <a:r>
-                <a:rPr lang="en-PH" sz="800" dirty="0" smtClean="0"/>
+                <a:rPr lang="en-PH" sz="800" dirty="0"/>
                 <a:t>BT4-1</a:t>
               </a:r>
-              <a:endParaRPr lang="en-PH" sz="800" dirty="0"/>
             </a:p>
           </p:txBody>
         </p:sp>
@@ -8620,10 +8610,9 @@
             <a:lstStyle/>
             <a:p>
               <a:r>
-                <a:rPr lang="en-PH" sz="800" dirty="0" smtClean="0"/>
+                <a:rPr lang="en-PH" sz="800" dirty="0"/>
                 <a:t>BT3-2</a:t>
               </a:r>
-              <a:endParaRPr lang="en-PH" sz="800" dirty="0"/>
             </a:p>
           </p:txBody>
         </p:sp>
@@ -8650,10 +8639,9 @@
             <a:lstStyle/>
             <a:p>
               <a:r>
-                <a:rPr lang="en-PH" sz="800" dirty="0" smtClean="0"/>
+                <a:rPr lang="en-PH" sz="800" dirty="0"/>
                 <a:t>BT2-2</a:t>
               </a:r>
-              <a:endParaRPr lang="en-PH" sz="800" dirty="0"/>
             </a:p>
           </p:txBody>
         </p:sp>
@@ -8680,10 +8668,9 @@
             <a:lstStyle/>
             <a:p>
               <a:r>
-                <a:rPr lang="en-PH" sz="800" dirty="0" smtClean="0"/>
+                <a:rPr lang="en-PH" sz="800" dirty="0"/>
                 <a:t>BT1-2</a:t>
               </a:r>
-              <a:endParaRPr lang="en-PH" sz="800" dirty="0"/>
             </a:p>
           </p:txBody>
         </p:sp>
@@ -8710,10 +8697,9 @@
             <a:lstStyle/>
             <a:p>
               <a:r>
-                <a:rPr lang="en-PH" sz="800" dirty="0" smtClean="0"/>
+                <a:rPr lang="en-PH" sz="800" dirty="0"/>
                 <a:t>BT3-1</a:t>
               </a:r>
-              <a:endParaRPr lang="en-PH" sz="800" dirty="0"/>
             </a:p>
           </p:txBody>
         </p:sp>
@@ -8740,10 +8726,9 @@
             <a:lstStyle/>
             <a:p>
               <a:r>
-                <a:rPr lang="en-PH" sz="800" dirty="0" smtClean="0"/>
+                <a:rPr lang="en-PH" sz="800" dirty="0"/>
                 <a:t>BT2-1</a:t>
               </a:r>
-              <a:endParaRPr lang="en-PH" sz="800" dirty="0"/>
             </a:p>
           </p:txBody>
         </p:sp>
@@ -8770,10 +8755,9 @@
             <a:lstStyle/>
             <a:p>
               <a:r>
-                <a:rPr lang="en-PH" sz="1000" dirty="0" smtClean="0"/>
+                <a:rPr lang="en-PH" sz="1000" dirty="0"/>
                 <a:t>PLET42</a:t>
               </a:r>
-              <a:endParaRPr lang="en-PH" sz="1000" dirty="0"/>
             </a:p>
           </p:txBody>
         </p:sp>
@@ -8800,10 +8784,9 @@
             <a:lstStyle/>
             <a:p>
               <a:r>
-                <a:rPr lang="en-PH" sz="800" dirty="0" smtClean="0"/>
+                <a:rPr lang="en-PH" sz="800" dirty="0"/>
                 <a:t>BT1-1</a:t>
               </a:r>
-              <a:endParaRPr lang="en-PH" sz="800" dirty="0"/>
             </a:p>
           </p:txBody>
         </p:sp>
@@ -8830,10 +8813,9 @@
             <a:lstStyle/>
             <a:p>
               <a:r>
-                <a:rPr lang="en-PH" sz="1000" dirty="0" smtClean="0"/>
+                <a:rPr lang="en-PH" sz="1000" dirty="0"/>
                 <a:t>PLET41</a:t>
               </a:r>
-              <a:endParaRPr lang="en-PH" sz="1000" dirty="0"/>
             </a:p>
           </p:txBody>
         </p:sp>
@@ -8860,10 +8842,9 @@
             <a:lstStyle/>
             <a:p>
               <a:r>
-                <a:rPr lang="en-PH" sz="1000" dirty="0" smtClean="0"/>
+                <a:rPr lang="en-PH" sz="1000" dirty="0"/>
                 <a:t>PLET31</a:t>
               </a:r>
-              <a:endParaRPr lang="en-PH" sz="1000" dirty="0"/>
             </a:p>
           </p:txBody>
         </p:sp>
@@ -8890,10 +8871,9 @@
             <a:lstStyle/>
             <a:p>
               <a:r>
-                <a:rPr lang="en-PH" sz="1000" dirty="0" smtClean="0"/>
+                <a:rPr lang="en-PH" sz="1000" dirty="0"/>
                 <a:t>PLET11</a:t>
               </a:r>
-              <a:endParaRPr lang="en-PH" sz="1000" dirty="0"/>
             </a:p>
           </p:txBody>
         </p:sp>
@@ -8920,10 +8900,9 @@
             <a:lstStyle/>
             <a:p>
               <a:r>
-                <a:rPr lang="en-PH" sz="1000" dirty="0" smtClean="0"/>
+                <a:rPr lang="en-PH" sz="1000" dirty="0"/>
                 <a:t>PLET21</a:t>
               </a:r>
-              <a:endParaRPr lang="en-PH" sz="1000" dirty="0"/>
             </a:p>
           </p:txBody>
         </p:sp>
@@ -8950,10 +8929,9 @@
             <a:lstStyle/>
             <a:p>
               <a:r>
-                <a:rPr lang="en-PH" sz="1000" dirty="0" smtClean="0"/>
+                <a:rPr lang="en-PH" sz="1000" dirty="0"/>
                 <a:t>PM-W</a:t>
               </a:r>
-              <a:endParaRPr lang="en-PH" sz="1000" dirty="0"/>
             </a:p>
           </p:txBody>
         </p:sp>
@@ -8980,10 +8958,9 @@
             <a:lstStyle/>
             <a:p>
               <a:r>
-                <a:rPr lang="en-PH" sz="1000" dirty="0" smtClean="0"/>
+                <a:rPr lang="en-PH" sz="1000" dirty="0"/>
                 <a:t>PM-E</a:t>
               </a:r>
-              <a:endParaRPr lang="en-PH" sz="1000" dirty="0"/>
             </a:p>
           </p:txBody>
         </p:sp>
@@ -9010,10 +8987,9 @@
             <a:lstStyle/>
             <a:p>
               <a:r>
-                <a:rPr lang="en-PH" sz="1000" dirty="0" smtClean="0"/>
+                <a:rPr lang="en-PH" sz="1000" dirty="0"/>
                 <a:t>P5</a:t>
               </a:r>
-              <a:endParaRPr lang="en-PH" sz="1000" dirty="0"/>
             </a:p>
           </p:txBody>
         </p:sp>
@@ -9040,10 +9016,9 @@
             <a:lstStyle/>
             <a:p>
               <a:r>
-                <a:rPr lang="en-PH" sz="1000" dirty="0" smtClean="0"/>
+                <a:rPr lang="en-PH" sz="1000" dirty="0"/>
                 <a:t>P4</a:t>
               </a:r>
-              <a:endParaRPr lang="en-PH" sz="1000" dirty="0"/>
             </a:p>
           </p:txBody>
         </p:sp>
@@ -9070,10 +9045,9 @@
             <a:lstStyle/>
             <a:p>
               <a:r>
-                <a:rPr lang="en-PH" sz="1000" dirty="0" smtClean="0"/>
+                <a:rPr lang="en-PH" sz="1000" dirty="0"/>
                 <a:t>P6</a:t>
               </a:r>
-              <a:endParaRPr lang="en-PH" sz="1000" dirty="0"/>
             </a:p>
           </p:txBody>
         </p:sp>
@@ -9100,10 +9074,9 @@
             <a:lstStyle/>
             <a:p>
               <a:r>
-                <a:rPr lang="en-PH" sz="1000" dirty="0" smtClean="0"/>
+                <a:rPr lang="en-PH" sz="1000" dirty="0"/>
                 <a:t>P1</a:t>
               </a:r>
-              <a:endParaRPr lang="en-PH" sz="1000" dirty="0"/>
             </a:p>
           </p:txBody>
         </p:sp>
@@ -9130,10 +9103,9 @@
             <a:lstStyle/>
             <a:p>
               <a:r>
-                <a:rPr lang="en-PH" sz="1000" dirty="0" smtClean="0"/>
+                <a:rPr lang="en-PH" sz="1000" dirty="0"/>
                 <a:t>P3</a:t>
               </a:r>
-              <a:endParaRPr lang="en-PH" sz="1000" dirty="0"/>
             </a:p>
           </p:txBody>
         </p:sp>
@@ -9160,10 +9132,9 @@
             <a:lstStyle/>
             <a:p>
               <a:r>
-                <a:rPr lang="en-PH" sz="1200" dirty="0" smtClean="0"/>
+                <a:rPr lang="en-PH" sz="1200" dirty="0"/>
                 <a:t>FLNG Turret</a:t>
               </a:r>
-              <a:endParaRPr lang="en-PH" sz="1200" dirty="0"/>
             </a:p>
           </p:txBody>
         </p:sp>
@@ -9190,10 +9161,9 @@
             <a:lstStyle/>
             <a:p>
               <a:r>
-                <a:rPr lang="en-PH" sz="1000" dirty="0" smtClean="0"/>
+                <a:rPr lang="en-PH" sz="1000" dirty="0"/>
                 <a:t>CTA</a:t>
               </a:r>
-              <a:endParaRPr lang="en-PH" sz="1000" dirty="0"/>
             </a:p>
           </p:txBody>
         </p:sp>
@@ -9221,17 +9191,16 @@
             <a:p>
               <a:pPr algn="ctr"/>
               <a:r>
-                <a:rPr lang="en-PH" sz="1000" dirty="0" smtClean="0"/>
+                <a:rPr lang="en-PH" sz="1000" dirty="0"/>
                 <a:t>Fibre Optic </a:t>
               </a:r>
             </a:p>
             <a:p>
               <a:pPr algn="ctr"/>
               <a:r>
-                <a:rPr lang="en-PH" sz="1000" dirty="0" smtClean="0"/>
+                <a:rPr lang="en-PH" sz="1000" dirty="0"/>
                 <a:t>Cable</a:t>
               </a:r>
-              <a:endParaRPr lang="en-PH" sz="1000" dirty="0"/>
             </a:p>
           </p:txBody>
         </p:sp>
@@ -9258,10 +9227,9 @@
             <a:lstStyle/>
             <a:p>
               <a:r>
-                <a:rPr lang="en-PH" sz="1000" dirty="0" smtClean="0"/>
+                <a:rPr lang="en-PH" sz="1000" dirty="0"/>
                 <a:t>To Onshore</a:t>
               </a:r>
-              <a:endParaRPr lang="en-PH" sz="1000" dirty="0"/>
             </a:p>
           </p:txBody>
         </p:sp>
@@ -9288,10 +9256,9 @@
             <a:lstStyle/>
             <a:p>
               <a:r>
-                <a:rPr lang="en-PH" sz="1000" dirty="0" smtClean="0"/>
+                <a:rPr lang="en-PH" sz="1000" dirty="0"/>
                 <a:t>P7</a:t>
               </a:r>
-              <a:endParaRPr lang="en-PH" sz="1000" dirty="0"/>
             </a:p>
           </p:txBody>
         </p:sp>
@@ -9318,10 +9285,9 @@
             <a:lstStyle/>
             <a:p>
               <a:r>
-                <a:rPr lang="en-PH" sz="1000" dirty="0" smtClean="0"/>
+                <a:rPr lang="en-PH" sz="1000" dirty="0"/>
                 <a:t>P8</a:t>
               </a:r>
-              <a:endParaRPr lang="en-PH" sz="1000" dirty="0"/>
             </a:p>
           </p:txBody>
         </p:sp>
@@ -9348,10 +9314,9 @@
             <a:lstStyle/>
             <a:p>
               <a:r>
-                <a:rPr lang="en-PH" sz="1000" dirty="0" smtClean="0"/>
+                <a:rPr lang="en-PH" sz="1000" dirty="0"/>
                 <a:t>UTA-1/HDM-1</a:t>
               </a:r>
-              <a:endParaRPr lang="en-PH" sz="1000" dirty="0"/>
             </a:p>
           </p:txBody>
         </p:sp>
@@ -9378,10 +9343,9 @@
             <a:lstStyle/>
             <a:p>
               <a:r>
-                <a:rPr lang="en-PH" sz="1000" dirty="0" smtClean="0"/>
+                <a:rPr lang="en-PH" sz="1000" dirty="0"/>
                 <a:t>UTA-2/HDM-2</a:t>
               </a:r>
-              <a:endParaRPr lang="en-PH" sz="1000" dirty="0"/>
             </a:p>
           </p:txBody>
         </p:sp>
@@ -9408,10 +9372,9 @@
             <a:lstStyle/>
             <a:p>
               <a:r>
-                <a:rPr lang="en-PH" sz="1000" dirty="0" smtClean="0"/>
+                <a:rPr lang="en-PH" sz="1000" dirty="0"/>
                 <a:t>UTA-3/EDM-1</a:t>
               </a:r>
-              <a:endParaRPr lang="en-PH" sz="1000" dirty="0"/>
             </a:p>
           </p:txBody>
         </p:sp>
@@ -9438,10 +9401,9 @@
             <a:lstStyle/>
             <a:p>
               <a:r>
-                <a:rPr lang="en-PH" sz="1000" dirty="0" smtClean="0"/>
+                <a:rPr lang="en-PH" sz="1000" dirty="0"/>
                 <a:t>FL-004</a:t>
               </a:r>
-              <a:endParaRPr lang="en-PH" sz="1000" dirty="0"/>
             </a:p>
           </p:txBody>
         </p:sp>
@@ -9468,10 +9430,9 @@
             <a:lstStyle/>
             <a:p>
               <a:r>
-                <a:rPr lang="en-PH" sz="1000" dirty="0" smtClean="0"/>
+                <a:rPr lang="en-PH" sz="1000" dirty="0"/>
                 <a:t>FL-003</a:t>
               </a:r>
-              <a:endParaRPr lang="en-PH" sz="1000" dirty="0"/>
             </a:p>
           </p:txBody>
         </p:sp>
@@ -9498,10 +9459,9 @@
             <a:lstStyle/>
             <a:p>
               <a:r>
-                <a:rPr lang="en-PH" sz="1000" dirty="0" smtClean="0"/>
+                <a:rPr lang="en-PH" sz="1000" dirty="0"/>
                 <a:t>FL-002</a:t>
               </a:r>
-              <a:endParaRPr lang="en-PH" sz="1000" dirty="0"/>
             </a:p>
           </p:txBody>
         </p:sp>
@@ -9528,10 +9488,9 @@
             <a:lstStyle/>
             <a:p>
               <a:r>
-                <a:rPr lang="en-PH" sz="1000" dirty="0" smtClean="0"/>
+                <a:rPr lang="en-PH" sz="1000" dirty="0"/>
                 <a:t>FL-001</a:t>
               </a:r>
-              <a:endParaRPr lang="en-PH" sz="1000" dirty="0"/>
             </a:p>
           </p:txBody>
         </p:sp>
@@ -9558,10 +9517,9 @@
             <a:lstStyle/>
             <a:p>
               <a:r>
-                <a:rPr lang="en-PH" sz="600" dirty="0" smtClean="0"/>
+                <a:rPr lang="en-PH" sz="600" dirty="0"/>
                 <a:t>PAP- 4</a:t>
               </a:r>
-              <a:endParaRPr lang="en-PH" sz="600" dirty="0"/>
             </a:p>
           </p:txBody>
         </p:sp>
@@ -9588,10 +9546,9 @@
             <a:lstStyle/>
             <a:p>
               <a:r>
-                <a:rPr lang="en-PH" sz="600" dirty="0" smtClean="0"/>
+                <a:rPr lang="en-PH" sz="600" dirty="0"/>
                 <a:t>PAP- 3</a:t>
               </a:r>
-              <a:endParaRPr lang="en-PH" sz="600" dirty="0"/>
             </a:p>
           </p:txBody>
         </p:sp>
@@ -9618,10 +9575,9 @@
             <a:lstStyle/>
             <a:p>
               <a:r>
-                <a:rPr lang="en-PH" sz="600" dirty="0" smtClean="0"/>
+                <a:rPr lang="en-PH" sz="600" dirty="0"/>
                 <a:t>PAP- 1</a:t>
               </a:r>
-              <a:endParaRPr lang="en-PH" sz="600" dirty="0"/>
             </a:p>
           </p:txBody>
         </p:sp>
@@ -9648,10 +9604,9 @@
             <a:lstStyle/>
             <a:p>
               <a:r>
-                <a:rPr lang="en-PH" sz="600" dirty="0" smtClean="0"/>
+                <a:rPr lang="en-PH" sz="600" dirty="0"/>
                 <a:t>PAP- 2</a:t>
               </a:r>
-              <a:endParaRPr lang="en-PH" sz="600" dirty="0"/>
             </a:p>
           </p:txBody>
         </p:sp>
@@ -9879,10 +9834,9 @@
             <a:lstStyle/>
             <a:p>
               <a:r>
-                <a:rPr lang="en-PH" sz="600" dirty="0" smtClean="0"/>
+                <a:rPr lang="en-PH" sz="600" dirty="0"/>
                 <a:t>RJ-04</a:t>
               </a:r>
-              <a:endParaRPr lang="en-PH" sz="600" dirty="0"/>
             </a:p>
           </p:txBody>
         </p:sp>
@@ -9909,10 +9863,9 @@
             <a:lstStyle/>
             <a:p>
               <a:r>
-                <a:rPr lang="en-PH" sz="600" dirty="0" smtClean="0"/>
+                <a:rPr lang="en-PH" sz="600" dirty="0"/>
                 <a:t>RJ-03</a:t>
               </a:r>
-              <a:endParaRPr lang="en-PH" sz="600" dirty="0"/>
             </a:p>
           </p:txBody>
         </p:sp>
@@ -9939,10 +9892,9 @@
             <a:lstStyle/>
             <a:p>
               <a:r>
-                <a:rPr lang="en-PH" sz="600" dirty="0" smtClean="0"/>
+                <a:rPr lang="en-PH" sz="600" dirty="0"/>
                 <a:t>RJ-02</a:t>
               </a:r>
-              <a:endParaRPr lang="en-PH" sz="600" dirty="0"/>
             </a:p>
           </p:txBody>
         </p:sp>
@@ -9969,10 +9921,9 @@
             <a:lstStyle/>
             <a:p>
               <a:r>
-                <a:rPr lang="en-PH" sz="600" dirty="0" smtClean="0"/>
+                <a:rPr lang="en-PH" sz="600" dirty="0"/>
                 <a:t>RJ-01</a:t>
               </a:r>
-              <a:endParaRPr lang="en-PH" sz="600" dirty="0"/>
             </a:p>
           </p:txBody>
         </p:sp>
@@ -9999,10 +9950,9 @@
             <a:lstStyle/>
             <a:p>
               <a:r>
-                <a:rPr lang="en-PH" sz="600" dirty="0" smtClean="0"/>
+                <a:rPr lang="en-PH" sz="600" dirty="0"/>
                 <a:t>MJ-02</a:t>
               </a:r>
-              <a:endParaRPr lang="en-PH" sz="600" dirty="0"/>
             </a:p>
           </p:txBody>
         </p:sp>
@@ -10029,10 +9979,9 @@
             <a:lstStyle/>
             <a:p>
               <a:r>
-                <a:rPr lang="en-PH" sz="600" dirty="0" smtClean="0"/>
+                <a:rPr lang="en-PH" sz="600" dirty="0"/>
                 <a:t>MJ-01</a:t>
               </a:r>
-              <a:endParaRPr lang="en-PH" sz="600" dirty="0"/>
             </a:p>
           </p:txBody>
         </p:sp>
@@ -10060,10 +10009,9 @@
           <a:lstStyle/>
           <a:p>
             <a:r>
-              <a:rPr lang="en-PH" dirty="0" smtClean="0"/>
+              <a:rPr lang="en-PH" dirty="0"/>
               <a:t>Figure 5</a:t>
             </a:r>
-            <a:endParaRPr lang="en-PH" dirty="0"/>
           </a:p>
         </p:txBody>
       </p:sp>
@@ -10114,10 +10062,9 @@
           <a:lstStyle/>
           <a:p>
             <a:r>
-              <a:rPr lang="en-PH" dirty="0" smtClean="0"/>
+              <a:rPr lang="en-PH" dirty="0"/>
               <a:t>Not included</a:t>
             </a:r>
-            <a:endParaRPr lang="en-PH" dirty="0"/>
           </a:p>
         </p:txBody>
       </p:sp>
@@ -10131,13 +10078,6 @@
   <p:clrMapOvr>
     <a:masterClrMapping/>
   </p:clrMapOvr>
-  <p:timing>
-    <p:tnLst>
-      <p:par>
-        <p:cTn id="1" dur="indefinite" restart="never" nodeType="tmRoot"/>
-      </p:par>
-    </p:tnLst>
-  </p:timing>
 </p:sld>
 </file>
 
@@ -10163,7 +10103,7 @@
           <p:cNvPr id="138" name="Rectangle 137">
             <a:extLst>
               <a:ext uri="{FF2B5EF4-FFF2-40B4-BE49-F238E27FC236}">
-                <a16:creationId xmlns:a16="http://schemas.microsoft.com/office/drawing/2014/main" xmlns="" id="{B8BDB747-DB54-4603-9F15-4ACF08417009}"/>
+                <a16:creationId xmlns:a16="http://schemas.microsoft.com/office/drawing/2014/main" id="{B8BDB747-DB54-4603-9F15-4ACF08417009}"/>
               </a:ext>
             </a:extLst>
           </p:cNvPr>
@@ -10256,7 +10196,7 @@
             <p:cNvPr id="178" name="Rectangle 177">
               <a:extLst>
                 <a:ext uri="{FF2B5EF4-FFF2-40B4-BE49-F238E27FC236}">
-                  <a16:creationId xmlns:a16="http://schemas.microsoft.com/office/drawing/2014/main" xmlns="" id="{B00EF988-81A5-4CD8-B70A-E26E876AAD0D}"/>
+                  <a16:creationId xmlns:a16="http://schemas.microsoft.com/office/drawing/2014/main" id="{B00EF988-81A5-4CD8-B70A-E26E876AAD0D}"/>
                 </a:ext>
               </a:extLst>
             </p:cNvPr>
@@ -10302,18 +10242,13 @@
             <a:p>
               <a:pPr algn="ctr"/>
               <a:r>
-                <a:rPr lang="en-GB" sz="700" b="1" dirty="0" smtClean="0">
+                <a:rPr lang="en-GB" sz="700" b="1" dirty="0">
                   <a:solidFill>
                     <a:srgbClr val="000000"/>
                   </a:solidFill>
                 </a:rPr>
                 <a:t>SFLS</a:t>
               </a:r>
-              <a:endParaRPr lang="en-GB" sz="700" b="1" dirty="0">
-                <a:solidFill>
-                  <a:srgbClr val="000000"/>
-                </a:solidFill>
-              </a:endParaRPr>
             </a:p>
           </p:txBody>
         </p:sp>
@@ -10322,7 +10257,7 @@
             <p:cNvPr id="212" name="Rectangle 211">
               <a:extLst>
                 <a:ext uri="{FF2B5EF4-FFF2-40B4-BE49-F238E27FC236}">
-                  <a16:creationId xmlns:a16="http://schemas.microsoft.com/office/drawing/2014/main" xmlns="" id="{65213324-AD47-4E21-A396-C767F748C6C9}"/>
+                  <a16:creationId xmlns:a16="http://schemas.microsoft.com/office/drawing/2014/main" id="{65213324-AD47-4E21-A396-C767F748C6C9}"/>
                 </a:ext>
               </a:extLst>
             </p:cNvPr>
@@ -10382,7 +10317,7 @@
             <p:cNvPr id="124" name="Rectangle 123">
               <a:extLst>
                 <a:ext uri="{FF2B5EF4-FFF2-40B4-BE49-F238E27FC236}">
-                  <a16:creationId xmlns:a16="http://schemas.microsoft.com/office/drawing/2014/main" xmlns="" id="{268CF0CF-8B9E-49C3-B441-CE5A5F4401CB}"/>
+                  <a16:creationId xmlns:a16="http://schemas.microsoft.com/office/drawing/2014/main" id="{268CF0CF-8B9E-49C3-B441-CE5A5F4401CB}"/>
                 </a:ext>
               </a:extLst>
             </p:cNvPr>
@@ -10427,18 +10362,13 @@
             <a:lstStyle/>
             <a:p>
               <a:r>
-                <a:rPr lang="en-GB" sz="1100" dirty="0" smtClean="0">
+                <a:rPr lang="en-GB" sz="1100" dirty="0">
                   <a:solidFill>
                     <a:schemeClr val="tx1"/>
                   </a:solidFill>
                 </a:rPr>
                 <a:t>SUBSEA</a:t>
               </a:r>
-              <a:endParaRPr lang="en-GB" sz="1100" dirty="0">
-                <a:solidFill>
-                  <a:schemeClr val="tx1"/>
-                </a:solidFill>
-              </a:endParaRPr>
             </a:p>
           </p:txBody>
         </p:sp>
@@ -10447,7 +10377,7 @@
             <p:cNvPr id="227" name="Rectangle 226">
               <a:extLst>
                 <a:ext uri="{FF2B5EF4-FFF2-40B4-BE49-F238E27FC236}">
-                  <a16:creationId xmlns:a16="http://schemas.microsoft.com/office/drawing/2014/main" xmlns="" id="{A272D0FE-A97F-4CED-BD9D-A9F47E17C6F4}"/>
+                  <a16:creationId xmlns:a16="http://schemas.microsoft.com/office/drawing/2014/main" id="{A272D0FE-A97F-4CED-BD9D-A9F47E17C6F4}"/>
                 </a:ext>
               </a:extLst>
             </p:cNvPr>
@@ -10498,21 +10428,8 @@
                     <a:schemeClr val="tx1"/>
                   </a:solidFill>
                 </a:rPr>
-                <a:t>Prelude Subsea System </a:t>
+                <a:t>Prelude Subsea System Asset Integrity Status Dashboard, 2020, rev 2</a:t>
               </a:r>
-              <a:r>
-                <a:rPr lang="en-GB" sz="1600" b="1" dirty="0" smtClean="0">
-                  <a:solidFill>
-                    <a:schemeClr val="tx1"/>
-                  </a:solidFill>
-                </a:rPr>
-                <a:t>Asset Integrity Status Dashboard, 2020, rev 2</a:t>
-              </a:r>
-              <a:endParaRPr lang="en-GB" sz="1600" b="1" dirty="0">
-                <a:solidFill>
-                  <a:schemeClr val="tx1"/>
-                </a:solidFill>
-              </a:endParaRPr>
             </a:p>
           </p:txBody>
         </p:sp>
@@ -10521,7 +10438,7 @@
             <p:cNvPr id="210" name="Rectangle 209">
               <a:extLst>
                 <a:ext uri="{FF2B5EF4-FFF2-40B4-BE49-F238E27FC236}">
-                  <a16:creationId xmlns:a16="http://schemas.microsoft.com/office/drawing/2014/main" xmlns="" id="{268CF0CF-8B9E-49C3-B441-CE5A5F4401CB}"/>
+                  <a16:creationId xmlns:a16="http://schemas.microsoft.com/office/drawing/2014/main" id="{268CF0CF-8B9E-49C3-B441-CE5A5F4401CB}"/>
                 </a:ext>
               </a:extLst>
             </p:cNvPr>
@@ -10566,18 +10483,13 @@
             <a:lstStyle/>
             <a:p>
               <a:r>
-                <a:rPr lang="en-GB" sz="1100" dirty="0" smtClean="0">
+                <a:rPr lang="en-GB" sz="1100" dirty="0">
                   <a:solidFill>
                     <a:schemeClr val="tx1"/>
                   </a:solidFill>
                 </a:rPr>
                 <a:t>RISERs/UMBILICAL</a:t>
               </a:r>
-              <a:endParaRPr lang="en-GB" sz="1100" dirty="0">
-                <a:solidFill>
-                  <a:schemeClr val="tx1"/>
-                </a:solidFill>
-              </a:endParaRPr>
             </a:p>
           </p:txBody>
         </p:sp>
@@ -10586,7 +10498,7 @@
             <p:cNvPr id="160" name="Rectangle 159">
               <a:extLst>
                 <a:ext uri="{FF2B5EF4-FFF2-40B4-BE49-F238E27FC236}">
-                  <a16:creationId xmlns:a16="http://schemas.microsoft.com/office/drawing/2014/main" xmlns="" id="{7117050F-A2EE-4B2C-BFD0-4A6598BFE9C9}"/>
+                  <a16:creationId xmlns:a16="http://schemas.microsoft.com/office/drawing/2014/main" id="{7117050F-A2EE-4B2C-BFD0-4A6598BFE9C9}"/>
                 </a:ext>
               </a:extLst>
             </p:cNvPr>
@@ -10647,7 +10559,7 @@
             <p:cNvPr id="161" name="Rectangle 160">
               <a:extLst>
                 <a:ext uri="{FF2B5EF4-FFF2-40B4-BE49-F238E27FC236}">
-                  <a16:creationId xmlns:a16="http://schemas.microsoft.com/office/drawing/2014/main" xmlns="" id="{AF15E516-51FC-45AD-B02C-995018977EAD}"/>
+                  <a16:creationId xmlns:a16="http://schemas.microsoft.com/office/drawing/2014/main" id="{AF15E516-51FC-45AD-B02C-995018977EAD}"/>
                 </a:ext>
               </a:extLst>
             </p:cNvPr>
@@ -10708,7 +10620,7 @@
             <p:cNvPr id="162" name="Rectangle 161">
               <a:extLst>
                 <a:ext uri="{FF2B5EF4-FFF2-40B4-BE49-F238E27FC236}">
-                  <a16:creationId xmlns:a16="http://schemas.microsoft.com/office/drawing/2014/main" xmlns="" id="{F1BA82AF-F97D-42B4-AA06-2AC9D008BB78}"/>
+                  <a16:creationId xmlns:a16="http://schemas.microsoft.com/office/drawing/2014/main" id="{F1BA82AF-F97D-42B4-AA06-2AC9D008BB78}"/>
                 </a:ext>
               </a:extLst>
             </p:cNvPr>
@@ -10769,7 +10681,7 @@
             <p:cNvPr id="189" name="Rectangle 188">
               <a:extLst>
                 <a:ext uri="{FF2B5EF4-FFF2-40B4-BE49-F238E27FC236}">
-                  <a16:creationId xmlns:a16="http://schemas.microsoft.com/office/drawing/2014/main" xmlns="" id="{6A2636E8-0A45-4F73-831B-C9C565A3C3AC}"/>
+                  <a16:creationId xmlns:a16="http://schemas.microsoft.com/office/drawing/2014/main" id="{6A2636E8-0A45-4F73-831B-C9C565A3C3AC}"/>
                 </a:ext>
               </a:extLst>
             </p:cNvPr>
@@ -10831,7 +10743,7 @@
             <p:cNvPr id="228" name="Rectangle 227">
               <a:extLst>
                 <a:ext uri="{FF2B5EF4-FFF2-40B4-BE49-F238E27FC236}">
-                  <a16:creationId xmlns:a16="http://schemas.microsoft.com/office/drawing/2014/main" xmlns="" id="{7EF06410-4D22-4625-8D14-C0C56D86E832}"/>
+                  <a16:creationId xmlns:a16="http://schemas.microsoft.com/office/drawing/2014/main" id="{7EF06410-4D22-4625-8D14-C0C56D86E832}"/>
                 </a:ext>
               </a:extLst>
             </p:cNvPr>
@@ -10888,7 +10800,7 @@
             <p:cNvPr id="229" name="Rectangle 228">
               <a:extLst>
                 <a:ext uri="{FF2B5EF4-FFF2-40B4-BE49-F238E27FC236}">
-                  <a16:creationId xmlns:a16="http://schemas.microsoft.com/office/drawing/2014/main" xmlns="" id="{FF68E0FE-BA9B-4B69-A717-1006746AAF7F}"/>
+                  <a16:creationId xmlns:a16="http://schemas.microsoft.com/office/drawing/2014/main" id="{FF68E0FE-BA9B-4B69-A717-1006746AAF7F}"/>
                 </a:ext>
               </a:extLst>
             </p:cNvPr>
@@ -10945,7 +10857,7 @@
             <p:cNvPr id="230" name="Rectangle 229">
               <a:extLst>
                 <a:ext uri="{FF2B5EF4-FFF2-40B4-BE49-F238E27FC236}">
-                  <a16:creationId xmlns:a16="http://schemas.microsoft.com/office/drawing/2014/main" xmlns="" id="{3A186F86-183B-44D9-994F-09DC9E1CB888}"/>
+                  <a16:creationId xmlns:a16="http://schemas.microsoft.com/office/drawing/2014/main" id="{3A186F86-183B-44D9-994F-09DC9E1CB888}"/>
                 </a:ext>
               </a:extLst>
             </p:cNvPr>
@@ -11006,7 +10918,7 @@
             <p:cNvPr id="231" name="Rectangle 230">
               <a:extLst>
                 <a:ext uri="{FF2B5EF4-FFF2-40B4-BE49-F238E27FC236}">
-                  <a16:creationId xmlns:a16="http://schemas.microsoft.com/office/drawing/2014/main" xmlns="" id="{314B1CB2-9E77-4648-A554-EE2A883A4C3C}"/>
+                  <a16:creationId xmlns:a16="http://schemas.microsoft.com/office/drawing/2014/main" id="{314B1CB2-9E77-4648-A554-EE2A883A4C3C}"/>
                 </a:ext>
               </a:extLst>
             </p:cNvPr>
@@ -11067,7 +10979,7 @@
             <p:cNvPr id="266" name="Rectangle 265">
               <a:extLst>
                 <a:ext uri="{FF2B5EF4-FFF2-40B4-BE49-F238E27FC236}">
-                  <a16:creationId xmlns:a16="http://schemas.microsoft.com/office/drawing/2014/main" xmlns="" id="{62BDBCB1-3043-460A-8B13-2B0F557125F6}"/>
+                  <a16:creationId xmlns:a16="http://schemas.microsoft.com/office/drawing/2014/main" id="{62BDBCB1-3043-460A-8B13-2B0F557125F6}"/>
                 </a:ext>
               </a:extLst>
             </p:cNvPr>
@@ -11113,20 +11025,12 @@
             <a:p>
               <a:pPr algn="ctr"/>
               <a:r>
-                <a:rPr lang="en-GB" sz="800" i="1" dirty="0" smtClean="0">
-                  <a:solidFill>
-                    <a:schemeClr val="tx1"/>
-                  </a:solidFill>
-                </a:rPr>
-                <a:t>             PRODUCTION </a:t>
-              </a:r>
-              <a:r>
                 <a:rPr lang="en-GB" sz="800" i="1" dirty="0">
                   <a:solidFill>
                     <a:schemeClr val="tx1"/>
                   </a:solidFill>
                 </a:rPr>
-                <a:t>SYSTEM</a:t>
+                <a:t>             PRODUCTION SYSTEM</a:t>
               </a:r>
             </a:p>
           </p:txBody>
@@ -11136,7 +11040,7 @@
             <p:cNvPr id="267" name="Rectangle 266">
               <a:extLst>
                 <a:ext uri="{FF2B5EF4-FFF2-40B4-BE49-F238E27FC236}">
-                  <a16:creationId xmlns:a16="http://schemas.microsoft.com/office/drawing/2014/main" xmlns="" id="{322C7DF9-5653-41CD-89D5-50AE4BEE8A5E}"/>
+                  <a16:creationId xmlns:a16="http://schemas.microsoft.com/office/drawing/2014/main" id="{322C7DF9-5653-41CD-89D5-50AE4BEE8A5E}"/>
                 </a:ext>
               </a:extLst>
             </p:cNvPr>
@@ -11197,7 +11101,7 @@
             <p:cNvPr id="282" name="Connector: Elbow 281">
               <a:extLst>
                 <a:ext uri="{FF2B5EF4-FFF2-40B4-BE49-F238E27FC236}">
-                  <a16:creationId xmlns:a16="http://schemas.microsoft.com/office/drawing/2014/main" xmlns="" id="{B6522D1A-2EEB-4DCB-9622-F584E4DB1EE9}"/>
+                  <a16:creationId xmlns:a16="http://schemas.microsoft.com/office/drawing/2014/main" id="{B6522D1A-2EEB-4DCB-9622-F584E4DB1EE9}"/>
                 </a:ext>
               </a:extLst>
             </p:cNvPr>
@@ -11242,7 +11146,7 @@
             <p:cNvPr id="285" name="Rectangle 284">
               <a:extLst>
                 <a:ext uri="{FF2B5EF4-FFF2-40B4-BE49-F238E27FC236}">
-                  <a16:creationId xmlns:a16="http://schemas.microsoft.com/office/drawing/2014/main" xmlns="" id="{6F75FE53-6A70-4F05-A4C2-349A82A49C78}"/>
+                  <a16:creationId xmlns:a16="http://schemas.microsoft.com/office/drawing/2014/main" id="{6F75FE53-6A70-4F05-A4C2-349A82A49C78}"/>
                 </a:ext>
               </a:extLst>
             </p:cNvPr>
@@ -11303,7 +11207,7 @@
             <p:cNvPr id="291" name="Rectangle 290">
               <a:extLst>
                 <a:ext uri="{FF2B5EF4-FFF2-40B4-BE49-F238E27FC236}">
-                  <a16:creationId xmlns:a16="http://schemas.microsoft.com/office/drawing/2014/main" xmlns="" id="{AC62CD37-69F6-4B18-B8E5-A42CDA4A2331}"/>
+                  <a16:creationId xmlns:a16="http://schemas.microsoft.com/office/drawing/2014/main" id="{AC62CD37-69F6-4B18-B8E5-A42CDA4A2331}"/>
                 </a:ext>
               </a:extLst>
             </p:cNvPr>
@@ -11360,7 +11264,7 @@
             <p:cNvPr id="186" name="Rectangle 185">
               <a:extLst>
                 <a:ext uri="{FF2B5EF4-FFF2-40B4-BE49-F238E27FC236}">
-                  <a16:creationId xmlns:a16="http://schemas.microsoft.com/office/drawing/2014/main" xmlns="" id="{61B0E387-B99B-477C-A708-6AC78B8EE1BE}"/>
+                  <a16:creationId xmlns:a16="http://schemas.microsoft.com/office/drawing/2014/main" id="{61B0E387-B99B-477C-A708-6AC78B8EE1BE}"/>
                 </a:ext>
               </a:extLst>
             </p:cNvPr>
@@ -11417,7 +11321,7 @@
             <p:cNvPr id="187" name="Rectangle 186">
               <a:extLst>
                 <a:ext uri="{FF2B5EF4-FFF2-40B4-BE49-F238E27FC236}">
-                  <a16:creationId xmlns:a16="http://schemas.microsoft.com/office/drawing/2014/main" xmlns="" id="{8A235B86-3E51-415B-9AB6-DB739C11D906}"/>
+                  <a16:creationId xmlns:a16="http://schemas.microsoft.com/office/drawing/2014/main" id="{8A235B86-3E51-415B-9AB6-DB739C11D906}"/>
                 </a:ext>
               </a:extLst>
             </p:cNvPr>
@@ -11472,7 +11376,7 @@
             <p:cNvPr id="190" name="Rectangle 189">
               <a:extLst>
                 <a:ext uri="{FF2B5EF4-FFF2-40B4-BE49-F238E27FC236}">
-                  <a16:creationId xmlns:a16="http://schemas.microsoft.com/office/drawing/2014/main" xmlns="" id="{E66C3D41-8283-452A-A537-6E9C275190CE}"/>
+                  <a16:creationId xmlns:a16="http://schemas.microsoft.com/office/drawing/2014/main" id="{E66C3D41-8283-452A-A537-6E9C275190CE}"/>
                 </a:ext>
               </a:extLst>
             </p:cNvPr>
@@ -11527,7 +11431,7 @@
             <p:cNvPr id="192" name="Connector: Elbow 191">
               <a:extLst>
                 <a:ext uri="{FF2B5EF4-FFF2-40B4-BE49-F238E27FC236}">
-                  <a16:creationId xmlns:a16="http://schemas.microsoft.com/office/drawing/2014/main" xmlns="" id="{CDE61E10-C12B-4522-B678-783926EDDC54}"/>
+                  <a16:creationId xmlns:a16="http://schemas.microsoft.com/office/drawing/2014/main" id="{CDE61E10-C12B-4522-B678-783926EDDC54}"/>
                 </a:ext>
               </a:extLst>
             </p:cNvPr>
@@ -11571,7 +11475,7 @@
             <p:cNvPr id="195" name="Connector: Elbow 194">
               <a:extLst>
                 <a:ext uri="{FF2B5EF4-FFF2-40B4-BE49-F238E27FC236}">
-                  <a16:creationId xmlns:a16="http://schemas.microsoft.com/office/drawing/2014/main" xmlns="" id="{3F8C8746-E275-430E-B078-BE38FECA7B5E}"/>
+                  <a16:creationId xmlns:a16="http://schemas.microsoft.com/office/drawing/2014/main" id="{3F8C8746-E275-430E-B078-BE38FECA7B5E}"/>
                 </a:ext>
               </a:extLst>
             </p:cNvPr>
@@ -11617,7 +11521,7 @@
             <p:cNvPr id="199" name="Straight Connector 198">
               <a:extLst>
                 <a:ext uri="{FF2B5EF4-FFF2-40B4-BE49-F238E27FC236}">
-                  <a16:creationId xmlns:a16="http://schemas.microsoft.com/office/drawing/2014/main" xmlns="" id="{9B37C0F6-C9C0-4453-BFEA-BC02505125CC}"/>
+                  <a16:creationId xmlns:a16="http://schemas.microsoft.com/office/drawing/2014/main" id="{9B37C0F6-C9C0-4453-BFEA-BC02505125CC}"/>
                 </a:ext>
               </a:extLst>
             </p:cNvPr>
@@ -11660,7 +11564,7 @@
             <p:cNvPr id="201" name="Connector: Elbow 200">
               <a:extLst>
                 <a:ext uri="{FF2B5EF4-FFF2-40B4-BE49-F238E27FC236}">
-                  <a16:creationId xmlns:a16="http://schemas.microsoft.com/office/drawing/2014/main" xmlns="" id="{A68371D3-9FCD-4C2A-9457-6069CACC2C30}"/>
+                  <a16:creationId xmlns:a16="http://schemas.microsoft.com/office/drawing/2014/main" id="{A68371D3-9FCD-4C2A-9457-6069CACC2C30}"/>
                 </a:ext>
               </a:extLst>
             </p:cNvPr>
@@ -11705,7 +11609,7 @@
             <p:cNvPr id="188" name="Rectangle 187">
               <a:extLst>
                 <a:ext uri="{FF2B5EF4-FFF2-40B4-BE49-F238E27FC236}">
-                  <a16:creationId xmlns:a16="http://schemas.microsoft.com/office/drawing/2014/main" xmlns="" id="{4BB99705-0FDA-4E9A-88D9-F375AF3C0AA9}"/>
+                  <a16:creationId xmlns:a16="http://schemas.microsoft.com/office/drawing/2014/main" id="{4BB99705-0FDA-4E9A-88D9-F375AF3C0AA9}"/>
                 </a:ext>
               </a:extLst>
             </p:cNvPr>
@@ -11760,7 +11664,7 @@
             <p:cNvPr id="280" name="Rectangle 279">
               <a:extLst>
                 <a:ext uri="{FF2B5EF4-FFF2-40B4-BE49-F238E27FC236}">
-                  <a16:creationId xmlns:a16="http://schemas.microsoft.com/office/drawing/2014/main" xmlns="" id="{138625F3-6989-4232-BADB-CE1AFD512F9A}"/>
+                  <a16:creationId xmlns:a16="http://schemas.microsoft.com/office/drawing/2014/main" id="{138625F3-6989-4232-BADB-CE1AFD512F9A}"/>
                 </a:ext>
               </a:extLst>
             </p:cNvPr>
@@ -11815,7 +11719,7 @@
             <p:cNvPr id="110" name="Rectangle 109">
               <a:extLst>
                 <a:ext uri="{FF2B5EF4-FFF2-40B4-BE49-F238E27FC236}">
-                  <a16:creationId xmlns:a16="http://schemas.microsoft.com/office/drawing/2014/main" xmlns="" id="{3D5A848A-7DDF-4E98-9203-74E4A3CB11B0}"/>
+                  <a16:creationId xmlns:a16="http://schemas.microsoft.com/office/drawing/2014/main" id="{3D5A848A-7DDF-4E98-9203-74E4A3CB11B0}"/>
                 </a:ext>
               </a:extLst>
             </p:cNvPr>
@@ -11869,7 +11773,7 @@
             <p:cNvPr id="111" name="Rectangle 110">
               <a:extLst>
                 <a:ext uri="{FF2B5EF4-FFF2-40B4-BE49-F238E27FC236}">
-                  <a16:creationId xmlns:a16="http://schemas.microsoft.com/office/drawing/2014/main" xmlns="" id="{D948357E-8B89-455A-B45A-725687B417D6}"/>
+                  <a16:creationId xmlns:a16="http://schemas.microsoft.com/office/drawing/2014/main" id="{D948357E-8B89-455A-B45A-725687B417D6}"/>
                 </a:ext>
               </a:extLst>
             </p:cNvPr>
@@ -11923,7 +11827,7 @@
             <p:cNvPr id="112" name="Rectangle 111">
               <a:extLst>
                 <a:ext uri="{FF2B5EF4-FFF2-40B4-BE49-F238E27FC236}">
-                  <a16:creationId xmlns:a16="http://schemas.microsoft.com/office/drawing/2014/main" xmlns="" id="{EFFA351A-B3E8-46C1-BFA6-792058AFB5AB}"/>
+                  <a16:creationId xmlns:a16="http://schemas.microsoft.com/office/drawing/2014/main" id="{EFFA351A-B3E8-46C1-BFA6-792058AFB5AB}"/>
                 </a:ext>
               </a:extLst>
             </p:cNvPr>
@@ -11977,7 +11881,7 @@
             <p:cNvPr id="113" name="Rectangle 112">
               <a:extLst>
                 <a:ext uri="{FF2B5EF4-FFF2-40B4-BE49-F238E27FC236}">
-                  <a16:creationId xmlns:a16="http://schemas.microsoft.com/office/drawing/2014/main" xmlns="" id="{E5D438F9-8A31-41D7-ACF3-964D853B2582}"/>
+                  <a16:creationId xmlns:a16="http://schemas.microsoft.com/office/drawing/2014/main" id="{E5D438F9-8A31-41D7-ACF3-964D853B2582}"/>
                 </a:ext>
               </a:extLst>
             </p:cNvPr>
@@ -12031,7 +11935,7 @@
             <p:cNvPr id="114" name="Rectangle 113">
               <a:extLst>
                 <a:ext uri="{FF2B5EF4-FFF2-40B4-BE49-F238E27FC236}">
-                  <a16:creationId xmlns:a16="http://schemas.microsoft.com/office/drawing/2014/main" xmlns="" id="{DF4EB9AD-8811-4CAA-B86C-FF0B4841A1BD}"/>
+                  <a16:creationId xmlns:a16="http://schemas.microsoft.com/office/drawing/2014/main" id="{DF4EB9AD-8811-4CAA-B86C-FF0B4841A1BD}"/>
                 </a:ext>
               </a:extLst>
             </p:cNvPr>
@@ -12091,7 +11995,7 @@
             <p:cNvPr id="115" name="Rectangle 114">
               <a:extLst>
                 <a:ext uri="{FF2B5EF4-FFF2-40B4-BE49-F238E27FC236}">
-                  <a16:creationId xmlns:a16="http://schemas.microsoft.com/office/drawing/2014/main" xmlns="" id="{E287870C-0686-412B-B7B7-E3EE89EF5F47}"/>
+                  <a16:creationId xmlns:a16="http://schemas.microsoft.com/office/drawing/2014/main" id="{E287870C-0686-412B-B7B7-E3EE89EF5F47}"/>
                 </a:ext>
               </a:extLst>
             </p:cNvPr>
@@ -12145,7 +12049,7 @@
             <p:cNvPr id="116" name="Rectangle 115">
               <a:extLst>
                 <a:ext uri="{FF2B5EF4-FFF2-40B4-BE49-F238E27FC236}">
-                  <a16:creationId xmlns:a16="http://schemas.microsoft.com/office/drawing/2014/main" xmlns="" id="{C577E244-F504-4E36-A4DE-0B1C1D9EE03C}"/>
+                  <a16:creationId xmlns:a16="http://schemas.microsoft.com/office/drawing/2014/main" id="{C577E244-F504-4E36-A4DE-0B1C1D9EE03C}"/>
                 </a:ext>
               </a:extLst>
             </p:cNvPr>
@@ -12199,7 +12103,7 @@
             <p:cNvPr id="117" name="Rectangle 116">
               <a:extLst>
                 <a:ext uri="{FF2B5EF4-FFF2-40B4-BE49-F238E27FC236}">
-                  <a16:creationId xmlns:a16="http://schemas.microsoft.com/office/drawing/2014/main" xmlns="" id="{6052DDAA-AFD2-4AF6-85C2-676892C26C77}"/>
+                  <a16:creationId xmlns:a16="http://schemas.microsoft.com/office/drawing/2014/main" id="{6052DDAA-AFD2-4AF6-85C2-676892C26C77}"/>
                 </a:ext>
               </a:extLst>
             </p:cNvPr>
@@ -12253,7 +12157,7 @@
             <p:cNvPr id="118" name="Rectangle 117">
               <a:extLst>
                 <a:ext uri="{FF2B5EF4-FFF2-40B4-BE49-F238E27FC236}">
-                  <a16:creationId xmlns:a16="http://schemas.microsoft.com/office/drawing/2014/main" xmlns="" id="{25CE3F0A-7FB4-4A9D-800A-186AF28921F2}"/>
+                  <a16:creationId xmlns:a16="http://schemas.microsoft.com/office/drawing/2014/main" id="{25CE3F0A-7FB4-4A9D-800A-186AF28921F2}"/>
                 </a:ext>
               </a:extLst>
             </p:cNvPr>
@@ -12307,7 +12211,7 @@
             <p:cNvPr id="120" name="Rectangle 119">
               <a:extLst>
                 <a:ext uri="{FF2B5EF4-FFF2-40B4-BE49-F238E27FC236}">
-                  <a16:creationId xmlns:a16="http://schemas.microsoft.com/office/drawing/2014/main" xmlns="" id="{9263DE6F-E2B3-40BC-8D30-EC1EE4C09E4F}"/>
+                  <a16:creationId xmlns:a16="http://schemas.microsoft.com/office/drawing/2014/main" id="{9263DE6F-E2B3-40BC-8D30-EC1EE4C09E4F}"/>
                 </a:ext>
               </a:extLst>
             </p:cNvPr>
@@ -12364,7 +12268,7 @@
             <p:cNvPr id="123" name="Rectangle 122">
               <a:extLst>
                 <a:ext uri="{FF2B5EF4-FFF2-40B4-BE49-F238E27FC236}">
-                  <a16:creationId xmlns:a16="http://schemas.microsoft.com/office/drawing/2014/main" xmlns="" id="{7389C7FE-8BE8-4C4A-BB9C-B5142D7F3BD1}"/>
+                  <a16:creationId xmlns:a16="http://schemas.microsoft.com/office/drawing/2014/main" id="{7389C7FE-8BE8-4C4A-BB9C-B5142D7F3BD1}"/>
                 </a:ext>
               </a:extLst>
             </p:cNvPr>
@@ -12459,7 +12363,7 @@
             <a:lstStyle/>
             <a:p>
               <a:pPr algn="ctr"/>
-              <a:endParaRPr lang="en-PH" sz="1600" dirty="0" err="1" smtClean="0"/>
+              <a:endParaRPr lang="en-PH" sz="1600" dirty="0" err="1"/>
             </a:p>
           </p:txBody>
         </p:sp>
@@ -12504,7 +12408,7 @@
                 <a:buSzPct val="85000"/>
               </a:pPr>
               <a:r>
-                <a:rPr lang="en-PH" sz="1000" dirty="0" smtClean="0"/>
+                <a:rPr lang="en-PH" sz="1000" dirty="0"/>
                 <a:t>UMBILICAL</a:t>
               </a:r>
             </a:p>
@@ -12515,7 +12419,7 @@
             <p:cNvPr id="119" name="Rectangle 118">
               <a:extLst>
                 <a:ext uri="{FF2B5EF4-FFF2-40B4-BE49-F238E27FC236}">
-                  <a16:creationId xmlns:a16="http://schemas.microsoft.com/office/drawing/2014/main" xmlns="" id="{94D814AF-83A7-4E32-9A6C-4546FB2CCA24}"/>
+                  <a16:creationId xmlns:a16="http://schemas.microsoft.com/office/drawing/2014/main" id="{94D814AF-83A7-4E32-9A6C-4546FB2CCA24}"/>
                 </a:ext>
               </a:extLst>
             </p:cNvPr>
@@ -12561,10 +12465,9 @@
             <a:p>
               <a:pPr algn="ctr"/>
               <a:r>
-                <a:rPr lang="en-GB" sz="800" dirty="0" smtClean="0"/>
+                <a:rPr lang="en-GB" sz="800" dirty="0"/>
                 <a:t>BT4-1</a:t>
               </a:r>
-              <a:endParaRPr lang="en-GB" sz="800" dirty="0"/>
             </a:p>
           </p:txBody>
         </p:sp>
@@ -12573,7 +12476,7 @@
             <p:cNvPr id="121" name="Rectangle 120">
               <a:extLst>
                 <a:ext uri="{FF2B5EF4-FFF2-40B4-BE49-F238E27FC236}">
-                  <a16:creationId xmlns:a16="http://schemas.microsoft.com/office/drawing/2014/main" xmlns="" id="{94D814AF-83A7-4E32-9A6C-4546FB2CCA24}"/>
+                  <a16:creationId xmlns:a16="http://schemas.microsoft.com/office/drawing/2014/main" id="{94D814AF-83A7-4E32-9A6C-4546FB2CCA24}"/>
                 </a:ext>
               </a:extLst>
             </p:cNvPr>
@@ -12619,10 +12522,9 @@
             <a:p>
               <a:pPr algn="ctr"/>
               <a:r>
-                <a:rPr lang="en-GB" sz="800" dirty="0" smtClean="0"/>
+                <a:rPr lang="en-GB" sz="800" dirty="0"/>
                 <a:t>BT4-2</a:t>
               </a:r>
-              <a:endParaRPr lang="en-GB" sz="800" dirty="0"/>
             </a:p>
           </p:txBody>
         </p:sp>
@@ -12631,7 +12533,7 @@
             <p:cNvPr id="125" name="Rectangle 124">
               <a:extLst>
                 <a:ext uri="{FF2B5EF4-FFF2-40B4-BE49-F238E27FC236}">
-                  <a16:creationId xmlns:a16="http://schemas.microsoft.com/office/drawing/2014/main" xmlns="" id="{94D814AF-83A7-4E32-9A6C-4546FB2CCA24}"/>
+                  <a16:creationId xmlns:a16="http://schemas.microsoft.com/office/drawing/2014/main" id="{94D814AF-83A7-4E32-9A6C-4546FB2CCA24}"/>
                 </a:ext>
               </a:extLst>
             </p:cNvPr>
@@ -12677,10 +12579,9 @@
             <a:p>
               <a:pPr algn="ctr"/>
               <a:r>
-                <a:rPr lang="en-GB" sz="800" dirty="0" smtClean="0"/>
+                <a:rPr lang="en-GB" sz="800" dirty="0"/>
                 <a:t>BT3-1</a:t>
               </a:r>
-              <a:endParaRPr lang="en-GB" sz="800" dirty="0"/>
             </a:p>
           </p:txBody>
         </p:sp>
@@ -12689,7 +12590,7 @@
             <p:cNvPr id="97" name="Straight Connector 96">
               <a:extLst>
                 <a:ext uri="{FF2B5EF4-FFF2-40B4-BE49-F238E27FC236}">
-                  <a16:creationId xmlns:a16="http://schemas.microsoft.com/office/drawing/2014/main" xmlns="" id="{D2D4152D-E445-44F7-9FFA-F801801657A4}"/>
+                  <a16:creationId xmlns:a16="http://schemas.microsoft.com/office/drawing/2014/main" id="{D2D4152D-E445-44F7-9FFA-F801801657A4}"/>
                 </a:ext>
               </a:extLst>
             </p:cNvPr>
@@ -12732,7 +12633,7 @@
             <p:cNvPr id="43" name="Straight Connector 42">
               <a:extLst>
                 <a:ext uri="{FF2B5EF4-FFF2-40B4-BE49-F238E27FC236}">
-                  <a16:creationId xmlns:a16="http://schemas.microsoft.com/office/drawing/2014/main" xmlns="" id="{7D418F97-72C5-4E5C-9F3A-DAA96B9694F5}"/>
+                  <a16:creationId xmlns:a16="http://schemas.microsoft.com/office/drawing/2014/main" id="{7D418F97-72C5-4E5C-9F3A-DAA96B9694F5}"/>
                 </a:ext>
               </a:extLst>
             </p:cNvPr>
@@ -12775,7 +12676,7 @@
             <p:cNvPr id="46" name="Straight Connector 45">
               <a:extLst>
                 <a:ext uri="{FF2B5EF4-FFF2-40B4-BE49-F238E27FC236}">
-                  <a16:creationId xmlns:a16="http://schemas.microsoft.com/office/drawing/2014/main" xmlns="" id="{668E4FBB-E5C7-4983-89D2-5C2DE622E0F2}"/>
+                  <a16:creationId xmlns:a16="http://schemas.microsoft.com/office/drawing/2014/main" id="{668E4FBB-E5C7-4983-89D2-5C2DE622E0F2}"/>
                 </a:ext>
               </a:extLst>
             </p:cNvPr>
@@ -12818,7 +12719,7 @@
             <p:cNvPr id="50" name="Connector: Elbow 49">
               <a:extLst>
                 <a:ext uri="{FF2B5EF4-FFF2-40B4-BE49-F238E27FC236}">
-                  <a16:creationId xmlns:a16="http://schemas.microsoft.com/office/drawing/2014/main" xmlns="" id="{7A7EBD10-FEA5-4F71-A6BB-253CBE1C2B5A}"/>
+                  <a16:creationId xmlns:a16="http://schemas.microsoft.com/office/drawing/2014/main" id="{7A7EBD10-FEA5-4F71-A6BB-253CBE1C2B5A}"/>
                 </a:ext>
               </a:extLst>
             </p:cNvPr>
@@ -12863,7 +12764,7 @@
             <p:cNvPr id="56" name="Connector: Elbow 55">
               <a:extLst>
                 <a:ext uri="{FF2B5EF4-FFF2-40B4-BE49-F238E27FC236}">
-                  <a16:creationId xmlns:a16="http://schemas.microsoft.com/office/drawing/2014/main" xmlns="" id="{3CB1AB71-E1BD-4F35-9BEF-ED11F9DBFB4E}"/>
+                  <a16:creationId xmlns:a16="http://schemas.microsoft.com/office/drawing/2014/main" id="{3CB1AB71-E1BD-4F35-9BEF-ED11F9DBFB4E}"/>
                 </a:ext>
               </a:extLst>
             </p:cNvPr>
@@ -12909,7 +12810,7 @@
             <p:cNvPr id="59" name="Connector: Elbow 58">
               <a:extLst>
                 <a:ext uri="{FF2B5EF4-FFF2-40B4-BE49-F238E27FC236}">
-                  <a16:creationId xmlns:a16="http://schemas.microsoft.com/office/drawing/2014/main" xmlns="" id="{0DF047BA-FC58-46B2-A8F5-3E6873F05133}"/>
+                  <a16:creationId xmlns:a16="http://schemas.microsoft.com/office/drawing/2014/main" id="{0DF047BA-FC58-46B2-A8F5-3E6873F05133}"/>
                 </a:ext>
               </a:extLst>
             </p:cNvPr>
@@ -12955,7 +12856,7 @@
             <p:cNvPr id="61" name="Connector: Elbow 60">
               <a:extLst>
                 <a:ext uri="{FF2B5EF4-FFF2-40B4-BE49-F238E27FC236}">
-                  <a16:creationId xmlns:a16="http://schemas.microsoft.com/office/drawing/2014/main" xmlns="" id="{CBC03679-7CD0-4722-A894-AB4719E5EB7D}"/>
+                  <a16:creationId xmlns:a16="http://schemas.microsoft.com/office/drawing/2014/main" id="{CBC03679-7CD0-4722-A894-AB4719E5EB7D}"/>
                 </a:ext>
               </a:extLst>
             </p:cNvPr>
@@ -13001,7 +12902,7 @@
             <p:cNvPr id="73" name="Connector: Elbow 72">
               <a:extLst>
                 <a:ext uri="{FF2B5EF4-FFF2-40B4-BE49-F238E27FC236}">
-                  <a16:creationId xmlns:a16="http://schemas.microsoft.com/office/drawing/2014/main" xmlns="" id="{65F5347D-FE86-462C-831E-722C68DADE04}"/>
+                  <a16:creationId xmlns:a16="http://schemas.microsoft.com/office/drawing/2014/main" id="{65F5347D-FE86-462C-831E-722C68DADE04}"/>
                 </a:ext>
               </a:extLst>
             </p:cNvPr>
@@ -13046,7 +12947,7 @@
             <p:cNvPr id="74" name="Connector: Elbow 73">
               <a:extLst>
                 <a:ext uri="{FF2B5EF4-FFF2-40B4-BE49-F238E27FC236}">
-                  <a16:creationId xmlns:a16="http://schemas.microsoft.com/office/drawing/2014/main" xmlns="" id="{B515E8BC-EF7F-4D9F-AC8F-0A5D256A5A43}"/>
+                  <a16:creationId xmlns:a16="http://schemas.microsoft.com/office/drawing/2014/main" id="{B515E8BC-EF7F-4D9F-AC8F-0A5D256A5A43}"/>
                 </a:ext>
               </a:extLst>
             </p:cNvPr>
@@ -13091,7 +12992,7 @@
             <p:cNvPr id="78" name="Connector: Elbow 77">
               <a:extLst>
                 <a:ext uri="{FF2B5EF4-FFF2-40B4-BE49-F238E27FC236}">
-                  <a16:creationId xmlns:a16="http://schemas.microsoft.com/office/drawing/2014/main" xmlns="" id="{0391FBF3-53A7-473D-8C54-D11AED47BA9A}"/>
+                  <a16:creationId xmlns:a16="http://schemas.microsoft.com/office/drawing/2014/main" id="{0391FBF3-53A7-473D-8C54-D11AED47BA9A}"/>
                 </a:ext>
               </a:extLst>
             </p:cNvPr>
@@ -13136,7 +13037,7 @@
             <p:cNvPr id="79" name="Connector: Elbow 78">
               <a:extLst>
                 <a:ext uri="{FF2B5EF4-FFF2-40B4-BE49-F238E27FC236}">
-                  <a16:creationId xmlns:a16="http://schemas.microsoft.com/office/drawing/2014/main" xmlns="" id="{53B7D16A-0951-4B73-9A87-4476A58781A7}"/>
+                  <a16:creationId xmlns:a16="http://schemas.microsoft.com/office/drawing/2014/main" id="{53B7D16A-0951-4B73-9A87-4476A58781A7}"/>
                 </a:ext>
               </a:extLst>
             </p:cNvPr>
@@ -13181,7 +13082,7 @@
             <p:cNvPr id="170" name="Rectangle 169">
               <a:extLst>
                 <a:ext uri="{FF2B5EF4-FFF2-40B4-BE49-F238E27FC236}">
-                  <a16:creationId xmlns:a16="http://schemas.microsoft.com/office/drawing/2014/main" xmlns="" id="{0A39FE7D-5E35-4CC8-929D-8426AC15A250}"/>
+                  <a16:creationId xmlns:a16="http://schemas.microsoft.com/office/drawing/2014/main" id="{0A39FE7D-5E35-4CC8-929D-8426AC15A250}"/>
                 </a:ext>
               </a:extLst>
             </p:cNvPr>
@@ -13238,7 +13139,7 @@
             <p:cNvPr id="172" name="Straight Connector 171">
               <a:extLst>
                 <a:ext uri="{FF2B5EF4-FFF2-40B4-BE49-F238E27FC236}">
-                  <a16:creationId xmlns:a16="http://schemas.microsoft.com/office/drawing/2014/main" xmlns="" id="{7DE850BD-3980-4137-B8F8-9CFB96C7BAD9}"/>
+                  <a16:creationId xmlns:a16="http://schemas.microsoft.com/office/drawing/2014/main" id="{7DE850BD-3980-4137-B8F8-9CFB96C7BAD9}"/>
                 </a:ext>
               </a:extLst>
             </p:cNvPr>
@@ -13281,7 +13182,7 @@
             <p:cNvPr id="173" name="Straight Connector 172">
               <a:extLst>
                 <a:ext uri="{FF2B5EF4-FFF2-40B4-BE49-F238E27FC236}">
-                  <a16:creationId xmlns:a16="http://schemas.microsoft.com/office/drawing/2014/main" xmlns="" id="{0BE95A8A-9FD8-4C43-BE89-1E610B81B3F9}"/>
+                  <a16:creationId xmlns:a16="http://schemas.microsoft.com/office/drawing/2014/main" id="{0BE95A8A-9FD8-4C43-BE89-1E610B81B3F9}"/>
                 </a:ext>
               </a:extLst>
             </p:cNvPr>
@@ -13324,7 +13225,7 @@
             <p:cNvPr id="174" name="Straight Connector 173">
               <a:extLst>
                 <a:ext uri="{FF2B5EF4-FFF2-40B4-BE49-F238E27FC236}">
-                  <a16:creationId xmlns:a16="http://schemas.microsoft.com/office/drawing/2014/main" xmlns="" id="{312488A4-4BF7-49B6-8A79-7F8D19369A66}"/>
+                  <a16:creationId xmlns:a16="http://schemas.microsoft.com/office/drawing/2014/main" id="{312488A4-4BF7-49B6-8A79-7F8D19369A66}"/>
                 </a:ext>
               </a:extLst>
             </p:cNvPr>
@@ -13367,7 +13268,7 @@
             <p:cNvPr id="180" name="Straight Connector 179">
               <a:extLst>
                 <a:ext uri="{FF2B5EF4-FFF2-40B4-BE49-F238E27FC236}">
-                  <a16:creationId xmlns:a16="http://schemas.microsoft.com/office/drawing/2014/main" xmlns="" id="{0C1C05D8-F57F-456E-8AAB-FB8D33CAF81E}"/>
+                  <a16:creationId xmlns:a16="http://schemas.microsoft.com/office/drawing/2014/main" id="{0C1C05D8-F57F-456E-8AAB-FB8D33CAF81E}"/>
                 </a:ext>
               </a:extLst>
             </p:cNvPr>
@@ -13410,7 +13311,7 @@
             <p:cNvPr id="249" name="Rectangle 248">
               <a:extLst>
                 <a:ext uri="{FF2B5EF4-FFF2-40B4-BE49-F238E27FC236}">
-                  <a16:creationId xmlns:a16="http://schemas.microsoft.com/office/drawing/2014/main" xmlns="" id="{05B33235-0756-4563-9CE7-E600D9743873}"/>
+                  <a16:creationId xmlns:a16="http://schemas.microsoft.com/office/drawing/2014/main" id="{05B33235-0756-4563-9CE7-E600D9743873}"/>
                 </a:ext>
               </a:extLst>
             </p:cNvPr>
@@ -13471,7 +13372,7 @@
             <p:cNvPr id="10" name="Rectangle 9">
               <a:extLst>
                 <a:ext uri="{FF2B5EF4-FFF2-40B4-BE49-F238E27FC236}">
-                  <a16:creationId xmlns:a16="http://schemas.microsoft.com/office/drawing/2014/main" xmlns="" id="{08A137F5-FA4C-4F3B-B37B-4E10ACFF5472}"/>
+                  <a16:creationId xmlns:a16="http://schemas.microsoft.com/office/drawing/2014/main" id="{08A137F5-FA4C-4F3B-B37B-4E10ACFF5472}"/>
                 </a:ext>
               </a:extLst>
             </p:cNvPr>
@@ -13517,18 +13418,13 @@
             <a:p>
               <a:pPr algn="ctr"/>
               <a:r>
-                <a:rPr lang="en-GB" sz="1000" b="1" dirty="0" smtClean="0">
+                <a:rPr lang="en-GB" sz="1000" b="1" dirty="0">
                   <a:solidFill>
                     <a:schemeClr val="tx1"/>
                   </a:solidFill>
                 </a:rPr>
                 <a:t>PM-W</a:t>
               </a:r>
-              <a:endParaRPr lang="en-GB" sz="1000" b="1" dirty="0">
-                <a:solidFill>
-                  <a:schemeClr val="tx1"/>
-                </a:solidFill>
-              </a:endParaRPr>
             </a:p>
           </p:txBody>
         </p:sp>
@@ -13537,7 +13433,7 @@
             <p:cNvPr id="98" name="Straight Connector 97">
               <a:extLst>
                 <a:ext uri="{FF2B5EF4-FFF2-40B4-BE49-F238E27FC236}">
-                  <a16:creationId xmlns:a16="http://schemas.microsoft.com/office/drawing/2014/main" xmlns="" id="{4FAECFAD-E86D-4DE0-83E0-0AA95639170F}"/>
+                  <a16:creationId xmlns:a16="http://schemas.microsoft.com/office/drawing/2014/main" id="{4FAECFAD-E86D-4DE0-83E0-0AA95639170F}"/>
                 </a:ext>
               </a:extLst>
             </p:cNvPr>
@@ -13580,7 +13476,7 @@
             <p:cNvPr id="99" name="Straight Connector 98">
               <a:extLst>
                 <a:ext uri="{FF2B5EF4-FFF2-40B4-BE49-F238E27FC236}">
-                  <a16:creationId xmlns:a16="http://schemas.microsoft.com/office/drawing/2014/main" xmlns="" id="{37A049CD-523F-4E0E-BDCB-0D8F4060D88E}"/>
+                  <a16:creationId xmlns:a16="http://schemas.microsoft.com/office/drawing/2014/main" id="{37A049CD-523F-4E0E-BDCB-0D8F4060D88E}"/>
                 </a:ext>
               </a:extLst>
             </p:cNvPr>
@@ -13623,7 +13519,7 @@
             <p:cNvPr id="14" name="Rectangle 13">
               <a:extLst>
                 <a:ext uri="{FF2B5EF4-FFF2-40B4-BE49-F238E27FC236}">
-                  <a16:creationId xmlns:a16="http://schemas.microsoft.com/office/drawing/2014/main" xmlns="" id="{F4301EF9-A463-483B-8038-91C7DAD42396}"/>
+                  <a16:creationId xmlns:a16="http://schemas.microsoft.com/office/drawing/2014/main" id="{F4301EF9-A463-483B-8038-91C7DAD42396}"/>
                 </a:ext>
               </a:extLst>
             </p:cNvPr>
@@ -13680,7 +13576,7 @@
             <p:cNvPr id="177" name="Rectangle 176">
               <a:extLst>
                 <a:ext uri="{FF2B5EF4-FFF2-40B4-BE49-F238E27FC236}">
-                  <a16:creationId xmlns:a16="http://schemas.microsoft.com/office/drawing/2014/main" xmlns="" id="{2CA50F9A-8554-4EA1-A738-AEDB386057CF}"/>
+                  <a16:creationId xmlns:a16="http://schemas.microsoft.com/office/drawing/2014/main" id="{2CA50F9A-8554-4EA1-A738-AEDB386057CF}"/>
                 </a:ext>
               </a:extLst>
             </p:cNvPr>
@@ -13741,7 +13637,7 @@
             <p:cNvPr id="179" name="Rectangle 178">
               <a:extLst>
                 <a:ext uri="{FF2B5EF4-FFF2-40B4-BE49-F238E27FC236}">
-                  <a16:creationId xmlns:a16="http://schemas.microsoft.com/office/drawing/2014/main" xmlns="" id="{9252164B-3074-435F-B8FF-79820E24846F}"/>
+                  <a16:creationId xmlns:a16="http://schemas.microsoft.com/office/drawing/2014/main" id="{9252164B-3074-435F-B8FF-79820E24846F}"/>
                 </a:ext>
               </a:extLst>
             </p:cNvPr>
@@ -13787,18 +13683,13 @@
             <a:p>
               <a:pPr algn="ctr"/>
               <a:r>
-                <a:rPr lang="en-GB" sz="1000" b="1" dirty="0" smtClean="0">
+                <a:rPr lang="en-GB" sz="1000" b="1" dirty="0">
                   <a:solidFill>
                     <a:schemeClr val="bg1"/>
                   </a:solidFill>
                 </a:rPr>
                 <a:t>P8</a:t>
               </a:r>
-              <a:endParaRPr lang="en-GB" sz="1000" b="1" dirty="0">
-                <a:solidFill>
-                  <a:schemeClr val="bg1"/>
-                </a:solidFill>
-              </a:endParaRPr>
             </a:p>
           </p:txBody>
         </p:sp>
@@ -13807,7 +13698,7 @@
             <p:cNvPr id="175" name="Rectangle 174">
               <a:extLst>
                 <a:ext uri="{FF2B5EF4-FFF2-40B4-BE49-F238E27FC236}">
-                  <a16:creationId xmlns:a16="http://schemas.microsoft.com/office/drawing/2014/main" xmlns="" id="{15A5A695-C1C1-4F11-AF19-44645EA2373A}"/>
+                  <a16:creationId xmlns:a16="http://schemas.microsoft.com/office/drawing/2014/main" id="{15A5A695-C1C1-4F11-AF19-44645EA2373A}"/>
                 </a:ext>
               </a:extLst>
             </p:cNvPr>
@@ -13864,7 +13755,7 @@
             <p:cNvPr id="103" name="Rectangle 102">
               <a:extLst>
                 <a:ext uri="{FF2B5EF4-FFF2-40B4-BE49-F238E27FC236}">
-                  <a16:creationId xmlns:a16="http://schemas.microsoft.com/office/drawing/2014/main" xmlns="" id="{030A7595-D640-4E59-B463-AC847EA76C1A}"/>
+                  <a16:creationId xmlns:a16="http://schemas.microsoft.com/office/drawing/2014/main" id="{030A7595-D640-4E59-B463-AC847EA76C1A}"/>
                 </a:ext>
               </a:extLst>
             </p:cNvPr>
@@ -13908,10 +13799,9 @@
             <a:p>
               <a:pPr algn="ctr"/>
               <a:r>
-                <a:rPr lang="en-GB" sz="700" b="1" dirty="0" smtClean="0"/>
+                <a:rPr lang="en-GB" sz="700" b="1" dirty="0"/>
                 <a:t>FIBRE OPTIC</a:t>
               </a:r>
-              <a:endParaRPr lang="en-GB" sz="700" b="1" dirty="0"/>
             </a:p>
           </p:txBody>
         </p:sp>
@@ -13920,7 +13810,7 @@
             <p:cNvPr id="169" name="Rectangle 168">
               <a:extLst>
                 <a:ext uri="{FF2B5EF4-FFF2-40B4-BE49-F238E27FC236}">
-                  <a16:creationId xmlns:a16="http://schemas.microsoft.com/office/drawing/2014/main" xmlns="" id="{58EF8757-308F-409C-86DB-5B7696700D53}"/>
+                  <a16:creationId xmlns:a16="http://schemas.microsoft.com/office/drawing/2014/main" id="{58EF8757-308F-409C-86DB-5B7696700D53}"/>
                 </a:ext>
               </a:extLst>
             </p:cNvPr>
@@ -13977,7 +13867,7 @@
             <p:cNvPr id="122" name="Rectangle 121">
               <a:extLst>
                 <a:ext uri="{FF2B5EF4-FFF2-40B4-BE49-F238E27FC236}">
-                  <a16:creationId xmlns:a16="http://schemas.microsoft.com/office/drawing/2014/main" xmlns="" id="{94D814AF-83A7-4E32-9A6C-4546FB2CCA24}"/>
+                  <a16:creationId xmlns:a16="http://schemas.microsoft.com/office/drawing/2014/main" id="{94D814AF-83A7-4E32-9A6C-4546FB2CCA24}"/>
                 </a:ext>
               </a:extLst>
             </p:cNvPr>
@@ -14023,10 +13913,9 @@
             <a:p>
               <a:pPr algn="ctr"/>
               <a:r>
-                <a:rPr lang="en-GB" sz="800" dirty="0" smtClean="0"/>
+                <a:rPr lang="en-GB" sz="800" dirty="0"/>
                 <a:t>BT3-2</a:t>
               </a:r>
-              <a:endParaRPr lang="en-GB" sz="800" dirty="0"/>
             </a:p>
           </p:txBody>
         </p:sp>
@@ -14035,7 +13924,7 @@
             <p:cNvPr id="126" name="Rectangle 125">
               <a:extLst>
                 <a:ext uri="{FF2B5EF4-FFF2-40B4-BE49-F238E27FC236}">
-                  <a16:creationId xmlns:a16="http://schemas.microsoft.com/office/drawing/2014/main" xmlns="" id="{94D814AF-83A7-4E32-9A6C-4546FB2CCA24}"/>
+                  <a16:creationId xmlns:a16="http://schemas.microsoft.com/office/drawing/2014/main" id="{94D814AF-83A7-4E32-9A6C-4546FB2CCA24}"/>
                 </a:ext>
               </a:extLst>
             </p:cNvPr>
@@ -14081,10 +13970,9 @@
             <a:p>
               <a:pPr algn="ctr"/>
               <a:r>
-                <a:rPr lang="en-GB" sz="800" dirty="0" smtClean="0"/>
+                <a:rPr lang="en-GB" sz="800" dirty="0"/>
                 <a:t>BT2-2</a:t>
               </a:r>
-              <a:endParaRPr lang="en-GB" sz="800" dirty="0"/>
             </a:p>
           </p:txBody>
         </p:sp>
@@ -14093,7 +13981,7 @@
             <p:cNvPr id="127" name="Rectangle 126">
               <a:extLst>
                 <a:ext uri="{FF2B5EF4-FFF2-40B4-BE49-F238E27FC236}">
-                  <a16:creationId xmlns:a16="http://schemas.microsoft.com/office/drawing/2014/main" xmlns="" id="{94D814AF-83A7-4E32-9A6C-4546FB2CCA24}"/>
+                  <a16:creationId xmlns:a16="http://schemas.microsoft.com/office/drawing/2014/main" id="{94D814AF-83A7-4E32-9A6C-4546FB2CCA24}"/>
                 </a:ext>
               </a:extLst>
             </p:cNvPr>
@@ -14139,10 +14027,9 @@
             <a:p>
               <a:pPr algn="ctr"/>
               <a:r>
-                <a:rPr lang="en-GB" sz="800" dirty="0" smtClean="0"/>
+                <a:rPr lang="en-GB" sz="800" dirty="0"/>
                 <a:t>BT2-1</a:t>
               </a:r>
-              <a:endParaRPr lang="en-GB" sz="800" dirty="0"/>
             </a:p>
           </p:txBody>
         </p:sp>
@@ -14151,7 +14038,7 @@
             <p:cNvPr id="128" name="Rectangle 127">
               <a:extLst>
                 <a:ext uri="{FF2B5EF4-FFF2-40B4-BE49-F238E27FC236}">
-                  <a16:creationId xmlns:a16="http://schemas.microsoft.com/office/drawing/2014/main" xmlns="" id="{94D814AF-83A7-4E32-9A6C-4546FB2CCA24}"/>
+                  <a16:creationId xmlns:a16="http://schemas.microsoft.com/office/drawing/2014/main" id="{94D814AF-83A7-4E32-9A6C-4546FB2CCA24}"/>
                 </a:ext>
               </a:extLst>
             </p:cNvPr>
@@ -14197,10 +14084,9 @@
             <a:p>
               <a:pPr algn="ctr"/>
               <a:r>
-                <a:rPr lang="en-GB" sz="800" dirty="0" smtClean="0"/>
+                <a:rPr lang="en-GB" sz="800" dirty="0"/>
                 <a:t>BT1-2</a:t>
               </a:r>
-              <a:endParaRPr lang="en-GB" sz="800" dirty="0"/>
             </a:p>
           </p:txBody>
         </p:sp>
@@ -14209,7 +14095,7 @@
             <p:cNvPr id="129" name="Rectangle 128">
               <a:extLst>
                 <a:ext uri="{FF2B5EF4-FFF2-40B4-BE49-F238E27FC236}">
-                  <a16:creationId xmlns:a16="http://schemas.microsoft.com/office/drawing/2014/main" xmlns="" id="{94D814AF-83A7-4E32-9A6C-4546FB2CCA24}"/>
+                  <a16:creationId xmlns:a16="http://schemas.microsoft.com/office/drawing/2014/main" id="{94D814AF-83A7-4E32-9A6C-4546FB2CCA24}"/>
                 </a:ext>
               </a:extLst>
             </p:cNvPr>
@@ -14255,10 +14141,9 @@
             <a:p>
               <a:pPr algn="ctr"/>
               <a:r>
-                <a:rPr lang="en-GB" sz="800" dirty="0" smtClean="0"/>
+                <a:rPr lang="en-GB" sz="800" dirty="0"/>
                 <a:t>BT1-1</a:t>
               </a:r>
-              <a:endParaRPr lang="en-GB" sz="800" dirty="0"/>
             </a:p>
           </p:txBody>
         </p:sp>
@@ -14345,7 +14230,7 @@
             <a:p>
               <a:pPr algn="ctr"/>
               <a:r>
-                <a:rPr lang="en-PH" sz="800" dirty="0" smtClean="0"/>
+                <a:rPr lang="en-PH" sz="800" dirty="0"/>
                 <a:t>AP4</a:t>
               </a:r>
             </a:p>
@@ -14434,10 +14319,9 @@
             <a:p>
               <a:pPr algn="ctr"/>
               <a:r>
-                <a:rPr lang="en-PH" sz="800" dirty="0" smtClean="0"/>
+                <a:rPr lang="en-PH" sz="800" dirty="0"/>
                 <a:t>AP3</a:t>
               </a:r>
-              <a:endParaRPr lang="en-PH" sz="800" dirty="0"/>
             </a:p>
           </p:txBody>
         </p:sp>
@@ -14522,10 +14406,9 @@
             <a:p>
               <a:pPr algn="ctr"/>
               <a:r>
-                <a:rPr lang="en-PH" sz="800" dirty="0" smtClean="0"/>
+                <a:rPr lang="en-PH" sz="800" dirty="0"/>
                 <a:t>AP2</a:t>
               </a:r>
-              <a:endParaRPr lang="en-PH" sz="800" dirty="0"/>
             </a:p>
           </p:txBody>
         </p:sp>
@@ -14610,10 +14493,9 @@
             <a:p>
               <a:pPr algn="ctr"/>
               <a:r>
-                <a:rPr lang="en-PH" sz="800" dirty="0" smtClean="0"/>
+                <a:rPr lang="en-PH" sz="800" dirty="0"/>
                 <a:t>AP1</a:t>
               </a:r>
-              <a:endParaRPr lang="en-PH" sz="800" dirty="0"/>
             </a:p>
           </p:txBody>
         </p:sp>
@@ -14622,7 +14504,7 @@
             <p:cNvPr id="167" name="Rectangle 166">
               <a:extLst>
                 <a:ext uri="{FF2B5EF4-FFF2-40B4-BE49-F238E27FC236}">
-                  <a16:creationId xmlns:a16="http://schemas.microsoft.com/office/drawing/2014/main" xmlns="" id="{94D814AF-83A7-4E32-9A6C-4546FB2CCA24}"/>
+                  <a16:creationId xmlns:a16="http://schemas.microsoft.com/office/drawing/2014/main" id="{94D814AF-83A7-4E32-9A6C-4546FB2CCA24}"/>
                 </a:ext>
               </a:extLst>
             </p:cNvPr>
@@ -14668,18 +14550,13 @@
             <a:p>
               <a:pPr algn="ctr"/>
               <a:r>
-                <a:rPr lang="en-GB" sz="1000" b="1" dirty="0" smtClean="0">
+                <a:rPr lang="en-GB" sz="1000" b="1" dirty="0">
                   <a:solidFill>
                     <a:schemeClr val="bg1"/>
                   </a:solidFill>
                 </a:rPr>
                 <a:t>P4</a:t>
               </a:r>
-              <a:endParaRPr lang="en-GB" sz="1000" b="1" dirty="0">
-                <a:solidFill>
-                  <a:schemeClr val="bg1"/>
-                </a:solidFill>
-              </a:endParaRPr>
             </a:p>
           </p:txBody>
         </p:sp>
@@ -14688,7 +14565,7 @@
             <p:cNvPr id="140" name="Rectangle 139">
               <a:extLst>
                 <a:ext uri="{FF2B5EF4-FFF2-40B4-BE49-F238E27FC236}">
-                  <a16:creationId xmlns:a16="http://schemas.microsoft.com/office/drawing/2014/main" xmlns="" id="{40DEB316-E730-4899-AC10-0C4F4E710769}"/>
+                  <a16:creationId xmlns:a16="http://schemas.microsoft.com/office/drawing/2014/main" id="{40DEB316-E730-4899-AC10-0C4F4E710769}"/>
                 </a:ext>
               </a:extLst>
             </p:cNvPr>
@@ -14734,18 +14611,13 @@
             <a:p>
               <a:pPr algn="ctr"/>
               <a:r>
-                <a:rPr lang="en-GB" sz="900" b="1" dirty="0" smtClean="0">
+                <a:rPr lang="en-GB" sz="900" b="1" dirty="0">
                   <a:solidFill>
                     <a:schemeClr val="bg1"/>
                   </a:solidFill>
                 </a:rPr>
                 <a:t>ESFL</a:t>
               </a:r>
-              <a:endParaRPr lang="en-GB" sz="900" b="1" dirty="0">
-                <a:solidFill>
-                  <a:schemeClr val="bg1"/>
-                </a:solidFill>
-              </a:endParaRPr>
             </a:p>
           </p:txBody>
         </p:sp>
@@ -14754,7 +14626,7 @@
             <p:cNvPr id="147" name="Rectangle 146">
               <a:extLst>
                 <a:ext uri="{FF2B5EF4-FFF2-40B4-BE49-F238E27FC236}">
-                  <a16:creationId xmlns:a16="http://schemas.microsoft.com/office/drawing/2014/main" xmlns="" id="{7DCA0DBE-613F-4A74-9D28-A27F2AD8AE03}"/>
+                  <a16:creationId xmlns:a16="http://schemas.microsoft.com/office/drawing/2014/main" id="{7DCA0DBE-613F-4A74-9D28-A27F2AD8AE03}"/>
                 </a:ext>
               </a:extLst>
             </p:cNvPr>
@@ -14800,18 +14672,13 @@
             <a:p>
               <a:pPr algn="ctr"/>
               <a:r>
-                <a:rPr lang="en-GB" sz="700" b="1" dirty="0" smtClean="0">
+                <a:rPr lang="en-GB" sz="700" b="1" dirty="0">
                   <a:solidFill>
                     <a:srgbClr val="000000"/>
                   </a:solidFill>
                 </a:rPr>
                 <a:t>EFLS</a:t>
               </a:r>
-              <a:endParaRPr lang="en-GB" sz="700" b="1" dirty="0">
-                <a:solidFill>
-                  <a:srgbClr val="000000"/>
-                </a:solidFill>
-              </a:endParaRPr>
             </a:p>
           </p:txBody>
         </p:sp>
@@ -14820,7 +14687,7 @@
             <p:cNvPr id="148" name="Rectangle 147">
               <a:extLst>
                 <a:ext uri="{FF2B5EF4-FFF2-40B4-BE49-F238E27FC236}">
-                  <a16:creationId xmlns:a16="http://schemas.microsoft.com/office/drawing/2014/main" xmlns="" id="{B00EF988-81A5-4CD8-B70A-E26E876AAD0D}"/>
+                  <a16:creationId xmlns:a16="http://schemas.microsoft.com/office/drawing/2014/main" id="{B00EF988-81A5-4CD8-B70A-E26E876AAD0D}"/>
                 </a:ext>
               </a:extLst>
             </p:cNvPr>
@@ -14866,18 +14733,13 @@
             <a:p>
               <a:pPr algn="ctr"/>
               <a:r>
-                <a:rPr lang="en-GB" sz="700" b="1" dirty="0" smtClean="0">
+                <a:rPr lang="en-GB" sz="700" b="1" dirty="0">
                   <a:solidFill>
                     <a:srgbClr val="000000"/>
                   </a:solidFill>
                 </a:rPr>
                 <a:t>SFLS</a:t>
               </a:r>
-              <a:endParaRPr lang="en-GB" sz="700" b="1" dirty="0">
-                <a:solidFill>
-                  <a:srgbClr val="000000"/>
-                </a:solidFill>
-              </a:endParaRPr>
             </a:p>
           </p:txBody>
         </p:sp>
@@ -14886,7 +14748,7 @@
             <p:cNvPr id="149" name="Rectangle 148">
               <a:extLst>
                 <a:ext uri="{FF2B5EF4-FFF2-40B4-BE49-F238E27FC236}">
-                  <a16:creationId xmlns:a16="http://schemas.microsoft.com/office/drawing/2014/main" xmlns="" id="{40DEB316-E730-4899-AC10-0C4F4E710769}"/>
+                  <a16:creationId xmlns:a16="http://schemas.microsoft.com/office/drawing/2014/main" id="{40DEB316-E730-4899-AC10-0C4F4E710769}"/>
                 </a:ext>
               </a:extLst>
             </p:cNvPr>
@@ -14930,17 +14792,16 @@
             <a:p>
               <a:pPr algn="ctr"/>
               <a:r>
-                <a:rPr lang="en-GB" sz="700" b="1" dirty="0" smtClean="0"/>
+                <a:rPr lang="en-GB" sz="700" b="1" dirty="0"/>
                 <a:t>TERM</a:t>
               </a:r>
             </a:p>
             <a:p>
               <a:pPr algn="ctr"/>
               <a:r>
-                <a:rPr lang="en-GB" sz="700" b="1" dirty="0" smtClean="0"/>
+                <a:rPr lang="en-GB" sz="700" b="1" dirty="0"/>
                 <a:t>ASBLY</a:t>
               </a:r>
-              <a:endParaRPr lang="en-GB" sz="700" b="1" dirty="0"/>
             </a:p>
           </p:txBody>
         </p:sp>
@@ -14949,7 +14810,7 @@
             <p:cNvPr id="258" name="Rectangle 257">
               <a:extLst>
                 <a:ext uri="{FF2B5EF4-FFF2-40B4-BE49-F238E27FC236}">
-                  <a16:creationId xmlns:a16="http://schemas.microsoft.com/office/drawing/2014/main" xmlns="" id="{56D2F77C-C552-46B2-A723-F8D67927A308}"/>
+                  <a16:creationId xmlns:a16="http://schemas.microsoft.com/office/drawing/2014/main" id="{56D2F77C-C552-46B2-A723-F8D67927A308}"/>
                 </a:ext>
               </a:extLst>
             </p:cNvPr>
@@ -14993,10 +14854,9 @@
             <a:p>
               <a:pPr algn="ctr"/>
               <a:r>
-                <a:rPr lang="en-GB" sz="1000" b="1" dirty="0" smtClean="0"/>
+                <a:rPr lang="en-GB" sz="1000" b="1" dirty="0"/>
                 <a:t>PM-E</a:t>
               </a:r>
-              <a:endParaRPr lang="en-GB" sz="1000" b="1" dirty="0"/>
             </a:p>
           </p:txBody>
         </p:sp>
@@ -15005,7 +14865,7 @@
             <p:cNvPr id="23" name="Rectangle 22">
               <a:extLst>
                 <a:ext uri="{FF2B5EF4-FFF2-40B4-BE49-F238E27FC236}">
-                  <a16:creationId xmlns:a16="http://schemas.microsoft.com/office/drawing/2014/main" xmlns="" id="{A4A583A6-7AF1-4AAA-B02D-8F198CA01423}"/>
+                  <a16:creationId xmlns:a16="http://schemas.microsoft.com/office/drawing/2014/main" id="{A4A583A6-7AF1-4AAA-B02D-8F198CA01423}"/>
                 </a:ext>
               </a:extLst>
             </p:cNvPr>
@@ -15066,7 +14926,7 @@
             <p:cNvPr id="193" name="Rectangle 192">
               <a:extLst>
                 <a:ext uri="{FF2B5EF4-FFF2-40B4-BE49-F238E27FC236}">
-                  <a16:creationId xmlns:a16="http://schemas.microsoft.com/office/drawing/2014/main" xmlns="" id="{2CA50F9A-8554-4EA1-A738-AEDB386057CF}"/>
+                  <a16:creationId xmlns:a16="http://schemas.microsoft.com/office/drawing/2014/main" id="{2CA50F9A-8554-4EA1-A738-AEDB386057CF}"/>
                 </a:ext>
               </a:extLst>
             </p:cNvPr>
@@ -15108,18 +14968,13 @@
             <a:p>
               <a:pPr algn="ctr"/>
               <a:r>
-                <a:rPr lang="en-GB" sz="900" b="1" dirty="0" smtClean="0">
+                <a:rPr lang="en-GB" sz="900" b="1" dirty="0">
                   <a:solidFill>
                     <a:schemeClr val="tx1"/>
                   </a:solidFill>
                 </a:rPr>
                 <a:t>E4</a:t>
               </a:r>
-              <a:endParaRPr lang="en-GB" sz="900" b="1" dirty="0">
-                <a:solidFill>
-                  <a:schemeClr val="tx1"/>
-                </a:solidFill>
-              </a:endParaRPr>
             </a:p>
           </p:txBody>
         </p:sp>
@@ -15128,7 +14983,7 @@
             <p:cNvPr id="194" name="Rectangle 193">
               <a:extLst>
                 <a:ext uri="{FF2B5EF4-FFF2-40B4-BE49-F238E27FC236}">
-                  <a16:creationId xmlns:a16="http://schemas.microsoft.com/office/drawing/2014/main" xmlns="" id="{2CA50F9A-8554-4EA1-A738-AEDB386057CF}"/>
+                  <a16:creationId xmlns:a16="http://schemas.microsoft.com/office/drawing/2014/main" id="{2CA50F9A-8554-4EA1-A738-AEDB386057CF}"/>
                 </a:ext>
               </a:extLst>
             </p:cNvPr>
@@ -15170,18 +15025,13 @@
             <a:p>
               <a:pPr algn="ctr"/>
               <a:r>
-                <a:rPr lang="en-GB" sz="900" b="1" dirty="0" smtClean="0">
+                <a:rPr lang="en-GB" sz="900" b="1" dirty="0">
                   <a:solidFill>
                     <a:schemeClr val="tx1"/>
                   </a:solidFill>
                 </a:rPr>
                 <a:t>E3</a:t>
               </a:r>
-              <a:endParaRPr lang="en-GB" sz="900" b="1" dirty="0">
-                <a:solidFill>
-                  <a:schemeClr val="tx1"/>
-                </a:solidFill>
-              </a:endParaRPr>
             </a:p>
           </p:txBody>
         </p:sp>
@@ -15190,7 +15040,7 @@
             <p:cNvPr id="196" name="Rectangle 195">
               <a:extLst>
                 <a:ext uri="{FF2B5EF4-FFF2-40B4-BE49-F238E27FC236}">
-                  <a16:creationId xmlns:a16="http://schemas.microsoft.com/office/drawing/2014/main" xmlns="" id="{2CA50F9A-8554-4EA1-A738-AEDB386057CF}"/>
+                  <a16:creationId xmlns:a16="http://schemas.microsoft.com/office/drawing/2014/main" id="{2CA50F9A-8554-4EA1-A738-AEDB386057CF}"/>
                 </a:ext>
               </a:extLst>
             </p:cNvPr>
@@ -15232,18 +15082,13 @@
             <a:p>
               <a:pPr algn="ctr"/>
               <a:r>
-                <a:rPr lang="en-GB" sz="900" b="1" dirty="0" smtClean="0">
+                <a:rPr lang="en-GB" sz="900" b="1" dirty="0">
                   <a:solidFill>
                     <a:schemeClr val="tx1"/>
                   </a:solidFill>
                 </a:rPr>
                 <a:t>E1</a:t>
               </a:r>
-              <a:endParaRPr lang="en-GB" sz="900" b="1" dirty="0">
-                <a:solidFill>
-                  <a:schemeClr val="tx1"/>
-                </a:solidFill>
-              </a:endParaRPr>
             </a:p>
           </p:txBody>
         </p:sp>
@@ -15252,7 +15097,7 @@
             <p:cNvPr id="197" name="Rectangle 196">
               <a:extLst>
                 <a:ext uri="{FF2B5EF4-FFF2-40B4-BE49-F238E27FC236}">
-                  <a16:creationId xmlns:a16="http://schemas.microsoft.com/office/drawing/2014/main" xmlns="" id="{2CA50F9A-8554-4EA1-A738-AEDB386057CF}"/>
+                  <a16:creationId xmlns:a16="http://schemas.microsoft.com/office/drawing/2014/main" id="{2CA50F9A-8554-4EA1-A738-AEDB386057CF}"/>
                 </a:ext>
               </a:extLst>
             </p:cNvPr>
@@ -15294,18 +15139,13 @@
             <a:p>
               <a:pPr algn="ctr"/>
               <a:r>
-                <a:rPr lang="en-GB" sz="900" b="1" dirty="0" smtClean="0">
+                <a:rPr lang="en-GB" sz="900" b="1" dirty="0">
                   <a:solidFill>
                     <a:schemeClr val="tx1"/>
                   </a:solidFill>
                 </a:rPr>
                 <a:t>W4</a:t>
               </a:r>
-              <a:endParaRPr lang="en-GB" sz="900" b="1" dirty="0">
-                <a:solidFill>
-                  <a:schemeClr val="tx1"/>
-                </a:solidFill>
-              </a:endParaRPr>
             </a:p>
           </p:txBody>
         </p:sp>
@@ -15314,7 +15154,7 @@
             <p:cNvPr id="198" name="Rectangle 197">
               <a:extLst>
                 <a:ext uri="{FF2B5EF4-FFF2-40B4-BE49-F238E27FC236}">
-                  <a16:creationId xmlns:a16="http://schemas.microsoft.com/office/drawing/2014/main" xmlns="" id="{2CA50F9A-8554-4EA1-A738-AEDB386057CF}"/>
+                  <a16:creationId xmlns:a16="http://schemas.microsoft.com/office/drawing/2014/main" id="{2CA50F9A-8554-4EA1-A738-AEDB386057CF}"/>
                 </a:ext>
               </a:extLst>
             </p:cNvPr>
@@ -15356,18 +15196,13 @@
             <a:p>
               <a:pPr algn="ctr"/>
               <a:r>
-                <a:rPr lang="en-GB" sz="900" b="1" dirty="0" smtClean="0">
+                <a:rPr lang="en-GB" sz="900" b="1" dirty="0">
                   <a:solidFill>
                     <a:schemeClr val="tx1"/>
                   </a:solidFill>
                 </a:rPr>
                 <a:t>W3</a:t>
               </a:r>
-              <a:endParaRPr lang="en-GB" sz="900" b="1" dirty="0">
-                <a:solidFill>
-                  <a:schemeClr val="tx1"/>
-                </a:solidFill>
-              </a:endParaRPr>
             </a:p>
           </p:txBody>
         </p:sp>
@@ -15376,7 +15211,7 @@
             <p:cNvPr id="200" name="Rectangle 199">
               <a:extLst>
                 <a:ext uri="{FF2B5EF4-FFF2-40B4-BE49-F238E27FC236}">
-                  <a16:creationId xmlns:a16="http://schemas.microsoft.com/office/drawing/2014/main" xmlns="" id="{2CA50F9A-8554-4EA1-A738-AEDB386057CF}"/>
+                  <a16:creationId xmlns:a16="http://schemas.microsoft.com/office/drawing/2014/main" id="{2CA50F9A-8554-4EA1-A738-AEDB386057CF}"/>
                 </a:ext>
               </a:extLst>
             </p:cNvPr>
@@ -15418,18 +15253,13 @@
             <a:p>
               <a:pPr algn="ctr"/>
               <a:r>
-                <a:rPr lang="en-GB" sz="900" b="1" dirty="0" smtClean="0">
+                <a:rPr lang="en-GB" sz="900" b="1" dirty="0">
                   <a:solidFill>
                     <a:schemeClr val="tx1"/>
                   </a:solidFill>
                 </a:rPr>
                 <a:t>W1</a:t>
               </a:r>
-              <a:endParaRPr lang="en-GB" sz="900" b="1" dirty="0">
-                <a:solidFill>
-                  <a:schemeClr val="tx1"/>
-                </a:solidFill>
-              </a:endParaRPr>
             </a:p>
           </p:txBody>
         </p:sp>
@@ -15438,7 +15268,7 @@
             <p:cNvPr id="202" name="Rectangle 201">
               <a:extLst>
                 <a:ext uri="{FF2B5EF4-FFF2-40B4-BE49-F238E27FC236}">
-                  <a16:creationId xmlns:a16="http://schemas.microsoft.com/office/drawing/2014/main" xmlns="" id="{2CA50F9A-8554-4EA1-A738-AEDB386057CF}"/>
+                  <a16:creationId xmlns:a16="http://schemas.microsoft.com/office/drawing/2014/main" id="{2CA50F9A-8554-4EA1-A738-AEDB386057CF}"/>
                 </a:ext>
               </a:extLst>
             </p:cNvPr>
@@ -15480,18 +15310,13 @@
             <a:p>
               <a:pPr algn="ctr"/>
               <a:r>
-                <a:rPr lang="en-GB" sz="900" b="1" dirty="0" smtClean="0">
+                <a:rPr lang="en-GB" sz="900" b="1" dirty="0">
                   <a:solidFill>
                     <a:schemeClr val="tx1"/>
                   </a:solidFill>
                 </a:rPr>
                 <a:t>W6</a:t>
               </a:r>
-              <a:endParaRPr lang="en-GB" sz="900" b="1" dirty="0">
-                <a:solidFill>
-                  <a:schemeClr val="tx1"/>
-                </a:solidFill>
-              </a:endParaRPr>
             </a:p>
           </p:txBody>
         </p:sp>
@@ -15500,7 +15325,7 @@
             <p:cNvPr id="245" name="Rectangle 244">
               <a:extLst>
                 <a:ext uri="{FF2B5EF4-FFF2-40B4-BE49-F238E27FC236}">
-                  <a16:creationId xmlns:a16="http://schemas.microsoft.com/office/drawing/2014/main" xmlns="" id="{0824B7BE-E129-4743-8A46-4EDC97B06DB8}"/>
+                  <a16:creationId xmlns:a16="http://schemas.microsoft.com/office/drawing/2014/main" id="{0824B7BE-E129-4743-8A46-4EDC97B06DB8}"/>
                 </a:ext>
               </a:extLst>
             </p:cNvPr>
@@ -15544,10 +15369,9 @@
             <a:p>
               <a:pPr algn="ctr"/>
               <a:r>
-                <a:rPr lang="en-GB" sz="800" dirty="0" smtClean="0"/>
+                <a:rPr lang="en-GB" sz="800" dirty="0"/>
                 <a:t>PLET31</a:t>
               </a:r>
-              <a:endParaRPr lang="en-GB" sz="800" dirty="0"/>
             </a:p>
           </p:txBody>
         </p:sp>
@@ -15556,7 +15380,7 @@
             <p:cNvPr id="246" name="Rectangle 245">
               <a:extLst>
                 <a:ext uri="{FF2B5EF4-FFF2-40B4-BE49-F238E27FC236}">
-                  <a16:creationId xmlns:a16="http://schemas.microsoft.com/office/drawing/2014/main" xmlns="" id="{D8676363-EE86-4893-A51D-E88C4B4BDD32}"/>
+                  <a16:creationId xmlns:a16="http://schemas.microsoft.com/office/drawing/2014/main" id="{D8676363-EE86-4893-A51D-E88C4B4BDD32}"/>
                 </a:ext>
               </a:extLst>
             </p:cNvPr>
@@ -15600,10 +15424,9 @@
             <a:p>
               <a:pPr algn="ctr"/>
               <a:r>
-                <a:rPr lang="en-GB" sz="800" dirty="0" smtClean="0"/>
+                <a:rPr lang="en-GB" sz="800" dirty="0"/>
                 <a:t>PLET41</a:t>
               </a:r>
-              <a:endParaRPr lang="en-GB" sz="800" dirty="0"/>
             </a:p>
           </p:txBody>
         </p:sp>
@@ -15612,7 +15435,7 @@
             <p:cNvPr id="248" name="Rectangle 247">
               <a:extLst>
                 <a:ext uri="{FF2B5EF4-FFF2-40B4-BE49-F238E27FC236}">
-                  <a16:creationId xmlns:a16="http://schemas.microsoft.com/office/drawing/2014/main" xmlns="" id="{D9CC6CEB-51C5-4B9D-AA0A-6B8606E73D77}"/>
+                  <a16:creationId xmlns:a16="http://schemas.microsoft.com/office/drawing/2014/main" id="{D9CC6CEB-51C5-4B9D-AA0A-6B8606E73D77}"/>
                 </a:ext>
               </a:extLst>
             </p:cNvPr>
@@ -15656,10 +15479,9 @@
             <a:p>
               <a:pPr algn="ctr"/>
               <a:r>
-                <a:rPr lang="en-GB" sz="800" dirty="0" smtClean="0"/>
+                <a:rPr lang="en-GB" sz="800" dirty="0"/>
                 <a:t>PLET42</a:t>
               </a:r>
-              <a:endParaRPr lang="en-GB" sz="800" dirty="0"/>
             </a:p>
           </p:txBody>
         </p:sp>
@@ -15668,7 +15490,7 @@
             <p:cNvPr id="27" name="Rectangle 26">
               <a:extLst>
                 <a:ext uri="{FF2B5EF4-FFF2-40B4-BE49-F238E27FC236}">
-                  <a16:creationId xmlns:a16="http://schemas.microsoft.com/office/drawing/2014/main" xmlns="" id="{B929B1AE-1980-43CE-9118-1CF4ADE54EFD}"/>
+                  <a16:creationId xmlns:a16="http://schemas.microsoft.com/office/drawing/2014/main" id="{B929B1AE-1980-43CE-9118-1CF4ADE54EFD}"/>
                 </a:ext>
               </a:extLst>
             </p:cNvPr>
@@ -15714,18 +15536,13 @@
             <a:p>
               <a:pPr algn="ctr"/>
               <a:r>
-                <a:rPr lang="en-GB" sz="800" dirty="0" smtClean="0">
+                <a:rPr lang="en-GB" sz="800" dirty="0">
                   <a:solidFill>
                     <a:schemeClr val="bg1"/>
                   </a:solidFill>
                 </a:rPr>
                 <a:t>PLET21</a:t>
               </a:r>
-              <a:endParaRPr lang="en-GB" sz="800" dirty="0">
-                <a:solidFill>
-                  <a:schemeClr val="bg1"/>
-                </a:solidFill>
-              </a:endParaRPr>
             </a:p>
           </p:txBody>
         </p:sp>
@@ -15734,7 +15551,7 @@
             <p:cNvPr id="191" name="Rectangle 190">
               <a:extLst>
                 <a:ext uri="{FF2B5EF4-FFF2-40B4-BE49-F238E27FC236}">
-                  <a16:creationId xmlns:a16="http://schemas.microsoft.com/office/drawing/2014/main" xmlns="" id="{DCED1CFE-AA27-4B7A-B82E-C5D00B631BEB}"/>
+                  <a16:creationId xmlns:a16="http://schemas.microsoft.com/office/drawing/2014/main" id="{DCED1CFE-AA27-4B7A-B82E-C5D00B631BEB}"/>
                 </a:ext>
               </a:extLst>
             </p:cNvPr>
@@ -15825,11 +15642,11 @@
                 <a:buSzPct val="85000"/>
               </a:pPr>
               <a:r>
-                <a:rPr lang="en-PH" sz="1000" dirty="0" smtClean="0"/>
+                <a:rPr lang="en-PH" sz="1000" dirty="0"/>
                 <a:t>Legend for Xmas Trees:           </a:t>
               </a:r>
               <a:r>
-                <a:rPr lang="en-PH" sz="800" dirty="0" smtClean="0"/>
+                <a:rPr lang="en-PH" sz="800" dirty="0"/>
                 <a:t>Yellow border, choke issues               Yellow fill for external Xmas Tree issues    </a:t>
               </a:r>
             </a:p>
@@ -15840,7 +15657,7 @@
             <p:cNvPr id="136" name="Rectangle 135">
               <a:extLst>
                 <a:ext uri="{FF2B5EF4-FFF2-40B4-BE49-F238E27FC236}">
-                  <a16:creationId xmlns:a16="http://schemas.microsoft.com/office/drawing/2014/main" xmlns="" id="{15A5A695-C1C1-4F11-AF19-44645EA2373A}"/>
+                  <a16:creationId xmlns:a16="http://schemas.microsoft.com/office/drawing/2014/main" id="{15A5A695-C1C1-4F11-AF19-44645EA2373A}"/>
                 </a:ext>
               </a:extLst>
             </p:cNvPr>
@@ -15894,7 +15711,7 @@
             <p:cNvPr id="137" name="Rectangle 136">
               <a:extLst>
                 <a:ext uri="{FF2B5EF4-FFF2-40B4-BE49-F238E27FC236}">
-                  <a16:creationId xmlns:a16="http://schemas.microsoft.com/office/drawing/2014/main" xmlns="" id="{15A5A695-C1C1-4F11-AF19-44645EA2373A}"/>
+                  <a16:creationId xmlns:a16="http://schemas.microsoft.com/office/drawing/2014/main" id="{15A5A695-C1C1-4F11-AF19-44645EA2373A}"/>
                 </a:ext>
               </a:extLst>
             </p:cNvPr>
@@ -15948,7 +15765,7 @@
             <p:cNvPr id="141" name="Rectangle 140">
               <a:extLst>
                 <a:ext uri="{FF2B5EF4-FFF2-40B4-BE49-F238E27FC236}">
-                  <a16:creationId xmlns:a16="http://schemas.microsoft.com/office/drawing/2014/main" xmlns="" id="{7DCA0DBE-613F-4A74-9D28-A27F2AD8AE03}"/>
+                  <a16:creationId xmlns:a16="http://schemas.microsoft.com/office/drawing/2014/main" id="{7DCA0DBE-613F-4A74-9D28-A27F2AD8AE03}"/>
                 </a:ext>
               </a:extLst>
             </p:cNvPr>
@@ -15994,18 +15811,13 @@
             <a:p>
               <a:pPr algn="ctr"/>
               <a:r>
-                <a:rPr lang="en-GB" sz="700" b="1" dirty="0" smtClean="0">
+                <a:rPr lang="en-GB" sz="700" b="1" dirty="0">
                   <a:solidFill>
                     <a:srgbClr val="000000"/>
                   </a:solidFill>
                 </a:rPr>
                 <a:t>SFLS</a:t>
               </a:r>
-              <a:endParaRPr lang="en-GB" sz="700" b="1" dirty="0">
-                <a:solidFill>
-                  <a:srgbClr val="000000"/>
-                </a:solidFill>
-              </a:endParaRPr>
             </a:p>
           </p:txBody>
         </p:sp>
@@ -16014,7 +15826,7 @@
             <p:cNvPr id="209" name="Rectangle 208">
               <a:extLst>
                 <a:ext uri="{FF2B5EF4-FFF2-40B4-BE49-F238E27FC236}">
-                  <a16:creationId xmlns:a16="http://schemas.microsoft.com/office/drawing/2014/main" xmlns="" id="{7DCA0DBE-613F-4A74-9D28-A27F2AD8AE03}"/>
+                  <a16:creationId xmlns:a16="http://schemas.microsoft.com/office/drawing/2014/main" id="{7DCA0DBE-613F-4A74-9D28-A27F2AD8AE03}"/>
                 </a:ext>
               </a:extLst>
             </p:cNvPr>
@@ -16060,18 +15872,13 @@
             <a:p>
               <a:pPr algn="ctr"/>
               <a:r>
-                <a:rPr lang="en-GB" sz="700" b="1" dirty="0" smtClean="0">
+                <a:rPr lang="en-GB" sz="700" b="1" dirty="0">
                   <a:solidFill>
                     <a:srgbClr val="000000"/>
                   </a:solidFill>
                 </a:rPr>
                 <a:t>EFLS</a:t>
               </a:r>
-              <a:endParaRPr lang="en-GB" sz="700" b="1" dirty="0">
-                <a:solidFill>
-                  <a:srgbClr val="000000"/>
-                </a:solidFill>
-              </a:endParaRPr>
             </a:p>
           </p:txBody>
         </p:sp>
@@ -16080,7 +15887,7 @@
             <p:cNvPr id="102" name="Rectangle 101">
               <a:extLst>
                 <a:ext uri="{FF2B5EF4-FFF2-40B4-BE49-F238E27FC236}">
-                  <a16:creationId xmlns:a16="http://schemas.microsoft.com/office/drawing/2014/main" xmlns="" id="{B00EF988-81A5-4CD8-B70A-E26E876AAD0D}"/>
+                  <a16:creationId xmlns:a16="http://schemas.microsoft.com/office/drawing/2014/main" id="{B00EF988-81A5-4CD8-B70A-E26E876AAD0D}"/>
                 </a:ext>
               </a:extLst>
             </p:cNvPr>
@@ -16126,18 +15933,13 @@
             <a:p>
               <a:pPr algn="ctr"/>
               <a:r>
-                <a:rPr lang="en-GB" sz="700" b="1" dirty="0" smtClean="0">
+                <a:rPr lang="en-GB" sz="700" b="1" dirty="0">
                   <a:solidFill>
                     <a:srgbClr val="000000"/>
                   </a:solidFill>
                 </a:rPr>
                 <a:t>SFLS</a:t>
               </a:r>
-              <a:endParaRPr lang="en-GB" sz="700" b="1" dirty="0">
-                <a:solidFill>
-                  <a:srgbClr val="000000"/>
-                </a:solidFill>
-              </a:endParaRPr>
             </a:p>
           </p:txBody>
         </p:sp>
@@ -16146,7 +15948,7 @@
             <p:cNvPr id="207" name="Rectangle 206">
               <a:extLst>
                 <a:ext uri="{FF2B5EF4-FFF2-40B4-BE49-F238E27FC236}">
-                  <a16:creationId xmlns:a16="http://schemas.microsoft.com/office/drawing/2014/main" xmlns="" id="{40DEB316-E730-4899-AC10-0C4F4E710769}"/>
+                  <a16:creationId xmlns:a16="http://schemas.microsoft.com/office/drawing/2014/main" id="{40DEB316-E730-4899-AC10-0C4F4E710769}"/>
                 </a:ext>
               </a:extLst>
             </p:cNvPr>
@@ -16203,7 +16005,7 @@
             <p:cNvPr id="145" name="Rectangle 144">
               <a:extLst>
                 <a:ext uri="{FF2B5EF4-FFF2-40B4-BE49-F238E27FC236}">
-                  <a16:creationId xmlns:a16="http://schemas.microsoft.com/office/drawing/2014/main" xmlns="" id="{40DEB316-E730-4899-AC10-0C4F4E710769}"/>
+                  <a16:creationId xmlns:a16="http://schemas.microsoft.com/office/drawing/2014/main" id="{40DEB316-E730-4899-AC10-0C4F4E710769}"/>
                 </a:ext>
               </a:extLst>
             </p:cNvPr>
@@ -16249,7 +16051,7 @@
             <a:p>
               <a:pPr algn="ctr"/>
               <a:r>
-                <a:rPr lang="en-GB" sz="800" b="1" dirty="0" smtClean="0">
+                <a:rPr lang="en-GB" sz="800" b="1" dirty="0">
                   <a:solidFill>
                     <a:schemeClr val="tx1"/>
                   </a:solidFill>
@@ -16260,18 +16062,13 @@
             <a:p>
               <a:pPr algn="ctr"/>
               <a:r>
-                <a:rPr lang="en-GB" sz="800" b="1" dirty="0" smtClean="0">
+                <a:rPr lang="en-GB" sz="800" b="1" dirty="0">
                   <a:solidFill>
                     <a:schemeClr val="tx1"/>
                   </a:solidFill>
                 </a:rPr>
                 <a:t>HDM-2</a:t>
               </a:r>
-              <a:endParaRPr lang="en-GB" sz="800" b="1" dirty="0">
-                <a:solidFill>
-                  <a:schemeClr val="tx1"/>
-                </a:solidFill>
-              </a:endParaRPr>
             </a:p>
           </p:txBody>
         </p:sp>
@@ -16280,7 +16077,7 @@
             <p:cNvPr id="146" name="Rectangle 145">
               <a:extLst>
                 <a:ext uri="{FF2B5EF4-FFF2-40B4-BE49-F238E27FC236}">
-                  <a16:creationId xmlns:a16="http://schemas.microsoft.com/office/drawing/2014/main" xmlns="" id="{40DEB316-E730-4899-AC10-0C4F4E710769}"/>
+                  <a16:creationId xmlns:a16="http://schemas.microsoft.com/office/drawing/2014/main" id="{40DEB316-E730-4899-AC10-0C4F4E710769}"/>
                 </a:ext>
               </a:extLst>
             </p:cNvPr>
@@ -16326,7 +16123,7 @@
             <a:p>
               <a:pPr algn="ctr"/>
               <a:r>
-                <a:rPr lang="en-GB" sz="800" b="1" dirty="0" smtClean="0">
+                <a:rPr lang="en-GB" sz="800" b="1" dirty="0">
                   <a:solidFill>
                     <a:schemeClr val="tx1"/>
                   </a:solidFill>
@@ -16337,18 +16134,13 @@
             <a:p>
               <a:pPr algn="ctr"/>
               <a:r>
-                <a:rPr lang="en-GB" sz="800" b="1" dirty="0" smtClean="0">
+                <a:rPr lang="en-GB" sz="800" b="1" dirty="0">
                   <a:solidFill>
                     <a:schemeClr val="tx1"/>
                   </a:solidFill>
                 </a:rPr>
                 <a:t>EDM-1</a:t>
               </a:r>
-              <a:endParaRPr lang="en-GB" sz="800" b="1" dirty="0">
-                <a:solidFill>
-                  <a:schemeClr val="tx1"/>
-                </a:solidFill>
-              </a:endParaRPr>
             </a:p>
           </p:txBody>
         </p:sp>
@@ -16393,7 +16185,7 @@
                 <a:buSzPct val="85000"/>
               </a:pPr>
               <a:r>
-                <a:rPr lang="en-PH" sz="800" dirty="0" smtClean="0"/>
+                <a:rPr lang="en-PH" sz="800" dirty="0"/>
                 <a:t>MJ-02</a:t>
               </a:r>
             </a:p>
@@ -16440,7 +16232,7 @@
                 <a:buSzPct val="85000"/>
               </a:pPr>
               <a:r>
-                <a:rPr lang="en-PH" sz="800" dirty="0" smtClean="0"/>
+                <a:rPr lang="en-PH" sz="800" dirty="0"/>
                 <a:t>MJ-01</a:t>
               </a:r>
             </a:p>
@@ -16487,7 +16279,7 @@
                 <a:buSzPct val="85000"/>
               </a:pPr>
               <a:r>
-                <a:rPr lang="en-PH" sz="800" dirty="0" smtClean="0"/>
+                <a:rPr lang="en-PH" sz="800" dirty="0"/>
                 <a:t>PJ-01</a:t>
               </a:r>
             </a:p>
@@ -16534,7 +16326,7 @@
                 <a:buSzPct val="85000"/>
               </a:pPr>
               <a:r>
-                <a:rPr lang="en-PH" sz="800" dirty="0" smtClean="0"/>
+                <a:rPr lang="en-PH" sz="800" dirty="0"/>
                 <a:t>PJ-04</a:t>
               </a:r>
             </a:p>
@@ -16581,7 +16373,7 @@
                 <a:buSzPct val="85000"/>
               </a:pPr>
               <a:r>
-                <a:rPr lang="en-PH" sz="800" dirty="0" smtClean="0"/>
+                <a:rPr lang="en-PH" sz="800" dirty="0"/>
                 <a:t>RJ-01</a:t>
               </a:r>
             </a:p>
@@ -16628,7 +16420,7 @@
                 <a:buSzPct val="85000"/>
               </a:pPr>
               <a:r>
-                <a:rPr lang="en-PH" sz="800" dirty="0" smtClean="0"/>
+                <a:rPr lang="en-PH" sz="800" dirty="0"/>
                 <a:t>RJ-02</a:t>
               </a:r>
             </a:p>
@@ -16675,7 +16467,7 @@
                 <a:buSzPct val="85000"/>
               </a:pPr>
               <a:r>
-                <a:rPr lang="en-PH" sz="800" dirty="0" smtClean="0"/>
+                <a:rPr lang="en-PH" sz="800" dirty="0"/>
                 <a:t>RJ-03</a:t>
               </a:r>
             </a:p>
@@ -16722,7 +16514,7 @@
                 <a:buSzPct val="85000"/>
               </a:pPr>
               <a:r>
-                <a:rPr lang="en-PH" sz="800" dirty="0" smtClean="0"/>
+                <a:rPr lang="en-PH" sz="800" dirty="0"/>
                 <a:t>RJ-04</a:t>
               </a:r>
             </a:p>
@@ -16769,7 +16561,7 @@
                 <a:buSzPct val="85000"/>
               </a:pPr>
               <a:r>
-                <a:rPr lang="en-PH" sz="800" dirty="0" smtClean="0"/>
+                <a:rPr lang="en-PH" sz="800" dirty="0"/>
                 <a:t>PJ-03</a:t>
               </a:r>
             </a:p>
@@ -16912,7 +16704,7 @@
                 <a:buSzPct val="85000"/>
               </a:pPr>
               <a:r>
-                <a:rPr lang="en-PH" sz="800" dirty="0" smtClean="0"/>
+                <a:rPr lang="en-PH" sz="800" dirty="0"/>
                 <a:t>PJ-02</a:t>
               </a:r>
             </a:p>
@@ -16959,7 +16751,7 @@
                 <a:buSzPct val="85000"/>
               </a:pPr>
               <a:r>
-                <a:rPr lang="en-PH" sz="600" dirty="0" smtClean="0"/>
+                <a:rPr lang="en-PH" sz="600" dirty="0"/>
                 <a:t>12-WJ-301</a:t>
               </a:r>
             </a:p>
@@ -17006,7 +16798,7 @@
                 <a:buSzPct val="85000"/>
               </a:pPr>
               <a:r>
-                <a:rPr lang="en-PH" sz="600" dirty="0" smtClean="0"/>
+                <a:rPr lang="en-PH" sz="600" dirty="0"/>
                 <a:t>12-WJ-101</a:t>
               </a:r>
             </a:p>
@@ -17053,7 +16845,7 @@
                 <a:buSzPct val="85000"/>
               </a:pPr>
               <a:r>
-                <a:rPr lang="en-PH" sz="600" dirty="0" smtClean="0"/>
+                <a:rPr lang="en-PH" sz="600" dirty="0"/>
                 <a:t>12-WJ-601</a:t>
               </a:r>
             </a:p>
@@ -17100,7 +16892,7 @@
                 <a:buSzPct val="85000"/>
               </a:pPr>
               <a:r>
-                <a:rPr lang="en-PH" sz="600" dirty="0" smtClean="0"/>
+                <a:rPr lang="en-PH" sz="600" dirty="0"/>
                 <a:t>11-WJ-101</a:t>
               </a:r>
             </a:p>
@@ -17147,7 +16939,7 @@
                 <a:buSzPct val="85000"/>
               </a:pPr>
               <a:r>
-                <a:rPr lang="en-PH" sz="600" dirty="0" smtClean="0"/>
+                <a:rPr lang="en-PH" sz="600" dirty="0"/>
                 <a:t>11-WJ-401</a:t>
               </a:r>
             </a:p>
@@ -17194,7 +16986,7 @@
                 <a:buSzPct val="85000"/>
               </a:pPr>
               <a:r>
-                <a:rPr lang="en-PH" sz="600" dirty="0" smtClean="0"/>
+                <a:rPr lang="en-PH" sz="600" dirty="0"/>
                 <a:t>11-WJ-301</a:t>
               </a:r>
             </a:p>
@@ -17241,7 +17033,7 @@
                 <a:buSzPct val="85000"/>
               </a:pPr>
               <a:r>
-                <a:rPr lang="en-PH" sz="600" dirty="0" smtClean="0"/>
+                <a:rPr lang="en-PH" sz="600" dirty="0"/>
                 <a:t>12-WJ-401</a:t>
               </a:r>
             </a:p>
@@ -17252,7 +17044,7 @@
             <p:cNvPr id="250" name="Rectangle 249">
               <a:extLst>
                 <a:ext uri="{FF2B5EF4-FFF2-40B4-BE49-F238E27FC236}">
-                  <a16:creationId xmlns:a16="http://schemas.microsoft.com/office/drawing/2014/main" xmlns="" id="{5C24CC4D-6A79-48B3-92A0-DD39A40C359D}"/>
+                  <a16:creationId xmlns:a16="http://schemas.microsoft.com/office/drawing/2014/main" id="{5C24CC4D-6A79-48B3-92A0-DD39A40C359D}"/>
                 </a:ext>
               </a:extLst>
             </p:cNvPr>
@@ -17313,7 +17105,7 @@
             <p:cNvPr id="237" name="Rectangle 236">
               <a:extLst>
                 <a:ext uri="{FF2B5EF4-FFF2-40B4-BE49-F238E27FC236}">
-                  <a16:creationId xmlns:a16="http://schemas.microsoft.com/office/drawing/2014/main" xmlns="" id="{A9222955-4E35-4DF4-BDD0-30AB7970E2AF}"/>
+                  <a16:creationId xmlns:a16="http://schemas.microsoft.com/office/drawing/2014/main" id="{A9222955-4E35-4DF4-BDD0-30AB7970E2AF}"/>
                 </a:ext>
               </a:extLst>
             </p:cNvPr>
@@ -17374,7 +17166,7 @@
             <p:cNvPr id="232" name="Rectangle 231">
               <a:extLst>
                 <a:ext uri="{FF2B5EF4-FFF2-40B4-BE49-F238E27FC236}">
-                  <a16:creationId xmlns:a16="http://schemas.microsoft.com/office/drawing/2014/main" xmlns="" id="{F2C03604-FDD1-405E-AC66-1998640B1176}"/>
+                  <a16:creationId xmlns:a16="http://schemas.microsoft.com/office/drawing/2014/main" id="{F2C03604-FDD1-405E-AC66-1998640B1176}"/>
                 </a:ext>
               </a:extLst>
             </p:cNvPr>
@@ -17435,7 +17227,7 @@
             <p:cNvPr id="28" name="Rectangle 27">
               <a:extLst>
                 <a:ext uri="{FF2B5EF4-FFF2-40B4-BE49-F238E27FC236}">
-                  <a16:creationId xmlns:a16="http://schemas.microsoft.com/office/drawing/2014/main" xmlns="" id="{761A63E8-7F28-4871-B0A9-247484364F74}"/>
+                  <a16:creationId xmlns:a16="http://schemas.microsoft.com/office/drawing/2014/main" id="{761A63E8-7F28-4871-B0A9-247484364F74}"/>
                 </a:ext>
               </a:extLst>
             </p:cNvPr>
@@ -17479,10 +17271,9 @@
             <a:p>
               <a:pPr algn="ctr"/>
               <a:r>
-                <a:rPr lang="en-GB" sz="800" dirty="0" smtClean="0"/>
+                <a:rPr lang="en-GB" sz="800" dirty="0"/>
                 <a:t>PLET11</a:t>
               </a:r>
-              <a:endParaRPr lang="en-GB" sz="800" dirty="0"/>
             </a:p>
           </p:txBody>
         </p:sp>
@@ -17491,7 +17282,7 @@
             <p:cNvPr id="29" name="Rectangle 28">
               <a:extLst>
                 <a:ext uri="{FF2B5EF4-FFF2-40B4-BE49-F238E27FC236}">
-                  <a16:creationId xmlns:a16="http://schemas.microsoft.com/office/drawing/2014/main" xmlns="" id="{6146A208-4E3C-49DF-9229-F82357E8ED5E}"/>
+                  <a16:creationId xmlns:a16="http://schemas.microsoft.com/office/drawing/2014/main" id="{6146A208-4E3C-49DF-9229-F82357E8ED5E}"/>
                 </a:ext>
               </a:extLst>
             </p:cNvPr>
@@ -17535,10 +17326,9 @@
             <a:p>
               <a:pPr algn="ctr"/>
               <a:r>
-                <a:rPr lang="en-GB" sz="800" dirty="0" smtClean="0"/>
+                <a:rPr lang="en-GB" sz="800" dirty="0"/>
                 <a:t>PLET22</a:t>
               </a:r>
-              <a:endParaRPr lang="en-GB" sz="800" dirty="0"/>
             </a:p>
           </p:txBody>
         </p:sp>
@@ -17547,7 +17337,7 @@
             <p:cNvPr id="30" name="Rectangle 29">
               <a:extLst>
                 <a:ext uri="{FF2B5EF4-FFF2-40B4-BE49-F238E27FC236}">
-                  <a16:creationId xmlns:a16="http://schemas.microsoft.com/office/drawing/2014/main" xmlns="" id="{82B7C559-B9D7-4F73-B498-984901FFBAF6}"/>
+                  <a16:creationId xmlns:a16="http://schemas.microsoft.com/office/drawing/2014/main" id="{82B7C559-B9D7-4F73-B498-984901FFBAF6}"/>
                 </a:ext>
               </a:extLst>
             </p:cNvPr>
@@ -17591,10 +17381,9 @@
             <a:p>
               <a:pPr algn="ctr"/>
               <a:r>
-                <a:rPr lang="en-GB" sz="800" dirty="0" smtClean="0"/>
+                <a:rPr lang="en-GB" sz="800" dirty="0"/>
                 <a:t>PLET21</a:t>
               </a:r>
-              <a:endParaRPr lang="en-GB" sz="800" dirty="0"/>
             </a:p>
           </p:txBody>
         </p:sp>
@@ -17603,7 +17392,7 @@
             <p:cNvPr id="247" name="Rectangle 246">
               <a:extLst>
                 <a:ext uri="{FF2B5EF4-FFF2-40B4-BE49-F238E27FC236}">
-                  <a16:creationId xmlns:a16="http://schemas.microsoft.com/office/drawing/2014/main" xmlns="" id="{F1749F8C-021A-4EF6-8109-4E80598C2D76}"/>
+                  <a16:creationId xmlns:a16="http://schemas.microsoft.com/office/drawing/2014/main" id="{F1749F8C-021A-4EF6-8109-4E80598C2D76}"/>
                 </a:ext>
               </a:extLst>
             </p:cNvPr>
@@ -17647,10 +17436,9 @@
             <a:p>
               <a:pPr algn="ctr"/>
               <a:r>
-                <a:rPr lang="en-GB" sz="800" dirty="0" smtClean="0"/>
+                <a:rPr lang="en-GB" sz="800" dirty="0"/>
                 <a:t>PLET32</a:t>
               </a:r>
-              <a:endParaRPr lang="en-GB" sz="800" dirty="0"/>
             </a:p>
           </p:txBody>
         </p:sp>
@@ -17659,7 +17447,7 @@
             <p:cNvPr id="171" name="Rectangle 170">
               <a:extLst>
                 <a:ext uri="{FF2B5EF4-FFF2-40B4-BE49-F238E27FC236}">
-                  <a16:creationId xmlns:a16="http://schemas.microsoft.com/office/drawing/2014/main" xmlns="" id="{40DEB316-E730-4899-AC10-0C4F4E710769}"/>
+                  <a16:creationId xmlns:a16="http://schemas.microsoft.com/office/drawing/2014/main" id="{40DEB316-E730-4899-AC10-0C4F4E710769}"/>
                 </a:ext>
               </a:extLst>
             </p:cNvPr>
@@ -17706,13 +17494,8 @@
               <a:pPr algn="ctr"/>
               <a:r>
                 <a:rPr lang="en-GB" sz="900" b="1" dirty="0"/>
-                <a:t> </a:t>
+                <a:t> UTA-1</a:t>
               </a:r>
-              <a:r>
-                <a:rPr lang="en-GB" sz="900" b="1" dirty="0" smtClean="0"/>
-                <a:t>UTA-1</a:t>
-              </a:r>
-              <a:endParaRPr lang="en-GB" sz="900" b="1" dirty="0"/>
             </a:p>
           </p:txBody>
         </p:sp>
@@ -17721,7 +17504,7 @@
             <p:cNvPr id="176" name="Rectangle 175">
               <a:extLst>
                 <a:ext uri="{FF2B5EF4-FFF2-40B4-BE49-F238E27FC236}">
-                  <a16:creationId xmlns:a16="http://schemas.microsoft.com/office/drawing/2014/main" xmlns="" id="{40DEB316-E730-4899-AC10-0C4F4E710769}"/>
+                  <a16:creationId xmlns:a16="http://schemas.microsoft.com/office/drawing/2014/main" id="{40DEB316-E730-4899-AC10-0C4F4E710769}"/>
                 </a:ext>
               </a:extLst>
             </p:cNvPr>
@@ -17767,10 +17550,9 @@
             <a:p>
               <a:pPr algn="ctr"/>
               <a:r>
-                <a:rPr lang="en-GB" sz="800" b="1" dirty="0" smtClean="0"/>
+                <a:rPr lang="en-GB" sz="800" b="1" dirty="0"/>
                 <a:t>UTAJ1&amp;2</a:t>
               </a:r>
-              <a:endParaRPr lang="en-GB" sz="800" b="1" dirty="0"/>
             </a:p>
           </p:txBody>
         </p:sp>
@@ -17798,10 +17580,9 @@
           <a:lstStyle/>
           <a:p>
             <a:r>
-              <a:rPr lang="en-PH" dirty="0" smtClean="0"/>
+              <a:rPr lang="en-PH" dirty="0"/>
               <a:t>Figure 1</a:t>
             </a:r>
-            <a:endParaRPr lang="en-PH" dirty="0"/>
           </a:p>
         </p:txBody>
       </p:sp>
@@ -17828,10 +17609,9 @@
           <a:lstStyle/>
           <a:p>
             <a:r>
-              <a:rPr lang="en-PH" dirty="0" smtClean="0"/>
+              <a:rPr lang="en-PH" dirty="0"/>
               <a:t>Not included</a:t>
             </a:r>
-            <a:endParaRPr lang="en-PH" dirty="0"/>
           </a:p>
         </p:txBody>
       </p:sp>
@@ -17923,10 +17703,9 @@
           <a:lstStyle/>
           <a:p>
             <a:r>
-              <a:rPr lang="en-US" sz="700" dirty="0" smtClean="0"/>
+              <a:rPr lang="en-US" sz="700" dirty="0"/>
               <a:t>AU.PRL.051-UTA-001     601</a:t>
             </a:r>
-            <a:endParaRPr lang="en-US" sz="700" dirty="0"/>
           </a:p>
         </p:txBody>
       </p:sp>
@@ -17989,10 +17768,9 @@
           <a:lstStyle/>
           <a:p>
             <a:r>
-              <a:rPr lang="en-US" sz="700" dirty="0" smtClean="0"/>
+              <a:rPr lang="en-US" sz="700" dirty="0"/>
               <a:t>AU.PRL.051-UTAJ-002     622</a:t>
             </a:r>
-            <a:endParaRPr lang="en-US" sz="700" dirty="0"/>
           </a:p>
         </p:txBody>
       </p:sp>
@@ -18055,10 +17833,9 @@
           <a:lstStyle/>
           <a:p>
             <a:r>
-              <a:rPr lang="en-US" sz="700" dirty="0" smtClean="0"/>
+              <a:rPr lang="en-US" sz="700" dirty="0"/>
               <a:t>AU.PRL.051-UTAJ-001     611</a:t>
             </a:r>
-            <a:endParaRPr lang="en-US" sz="700" dirty="0"/>
           </a:p>
         </p:txBody>
       </p:sp>
@@ -18121,10 +17898,9 @@
           <a:lstStyle/>
           <a:p>
             <a:r>
-              <a:rPr lang="en-US" sz="700" dirty="0" smtClean="0"/>
+              <a:rPr lang="en-US" sz="700" dirty="0"/>
               <a:t>AU.PRL.051-UTA-002     620</a:t>
             </a:r>
-            <a:endParaRPr lang="en-US" sz="700" dirty="0"/>
           </a:p>
         </p:txBody>
       </p:sp>
@@ -18187,10 +17963,9 @@
           <a:lstStyle/>
           <a:p>
             <a:r>
-              <a:rPr lang="en-US" sz="700" dirty="0" smtClean="0"/>
+              <a:rPr lang="en-US" sz="700" dirty="0"/>
               <a:t>AU.PRL.051-HDM-002     621</a:t>
             </a:r>
-            <a:endParaRPr lang="en-US" sz="700" dirty="0"/>
           </a:p>
         </p:txBody>
       </p:sp>
@@ -18253,10 +18028,9 @@
           <a:lstStyle/>
           <a:p>
             <a:r>
-              <a:rPr lang="en-US" sz="700" dirty="0" smtClean="0"/>
+              <a:rPr lang="en-US" sz="700" dirty="0"/>
               <a:t>AU.PRL.051-UTA-003     630</a:t>
             </a:r>
-            <a:endParaRPr lang="en-US" sz="700" dirty="0"/>
           </a:p>
         </p:txBody>
       </p:sp>
@@ -18319,10 +18093,9 @@
           <a:lstStyle/>
           <a:p>
             <a:r>
-              <a:rPr lang="en-US" sz="700" dirty="0" smtClean="0"/>
+              <a:rPr lang="en-US" sz="700" dirty="0"/>
               <a:t>AU.PRL.051-EDM-001     631</a:t>
             </a:r>
-            <a:endParaRPr lang="en-US" sz="700" dirty="0"/>
           </a:p>
         </p:txBody>
       </p:sp>
@@ -18431,10 +18204,9 @@
           <a:lstStyle/>
           <a:p>
             <a:r>
-              <a:rPr lang="en-US" sz="700" dirty="0" smtClean="0"/>
+              <a:rPr lang="en-US" sz="700" dirty="0"/>
               <a:t>AU.PRL.SDS     846</a:t>
             </a:r>
-            <a:endParaRPr lang="en-US" sz="700" dirty="0"/>
           </a:p>
         </p:txBody>
       </p:sp>
@@ -18497,10 +18269,9 @@
           <a:lstStyle/>
           <a:p>
             <a:r>
-              <a:rPr lang="en-US" sz="700" dirty="0" smtClean="0"/>
-              <a:t>AU.PRL.051-SFL-001     603</a:t>
+              <a:rPr lang="en-US" sz="700" dirty="0"/>
+              <a:t>AU.PRL.012-SFL-101 194</a:t>
             </a:r>
-            <a:endParaRPr lang="en-US" sz="700" dirty="0"/>
           </a:p>
         </p:txBody>
       </p:sp>
@@ -18563,10 +18334,9 @@
           <a:lstStyle/>
           <a:p>
             <a:r>
-              <a:rPr lang="en-US" sz="700" dirty="0" smtClean="0"/>
+              <a:rPr lang="en-US" sz="700" dirty="0"/>
               <a:t>AU.PRL.051-ESFL-001     612</a:t>
             </a:r>
-            <a:endParaRPr lang="en-US" sz="700" dirty="0"/>
           </a:p>
         </p:txBody>
       </p:sp>
@@ -18629,10 +18399,9 @@
           <a:lstStyle/>
           <a:p>
             <a:r>
-              <a:rPr lang="en-US" sz="700" dirty="0" smtClean="0"/>
+              <a:rPr lang="en-US" sz="700" dirty="0"/>
               <a:t>AU.PRL.051-SFL-002     604</a:t>
             </a:r>
-            <a:endParaRPr lang="en-US" sz="700" dirty="0"/>
           </a:p>
         </p:txBody>
       </p:sp>
@@ -18695,10 +18464,9 @@
           <a:lstStyle/>
           <a:p>
             <a:r>
-              <a:rPr lang="en-US" sz="700" dirty="0" smtClean="0"/>
+              <a:rPr lang="en-US" sz="700" dirty="0"/>
               <a:t>AU.PRL.051-EFL-001     605</a:t>
             </a:r>
-            <a:endParaRPr lang="en-US" sz="700" dirty="0"/>
           </a:p>
         </p:txBody>
       </p:sp>
@@ -18763,10 +18531,9 @@
           <a:lstStyle/>
           <a:p>
             <a:r>
-              <a:rPr lang="en-US" sz="700" dirty="0" smtClean="0"/>
+              <a:rPr lang="en-US" sz="700" dirty="0"/>
               <a:t>AU.PRL.051-EFL-002     606</a:t>
             </a:r>
-            <a:endParaRPr lang="en-US" sz="700" dirty="0"/>
           </a:p>
         </p:txBody>
       </p:sp>
@@ -18829,10 +18596,9 @@
           <a:lstStyle/>
           <a:p>
             <a:r>
-              <a:rPr lang="en-US" sz="700" dirty="0" smtClean="0"/>
+              <a:rPr lang="en-US" sz="700" dirty="0"/>
               <a:t>AU.PRL.051-SFL-003     610</a:t>
             </a:r>
-            <a:endParaRPr lang="en-US" sz="700" dirty="0"/>
           </a:p>
         </p:txBody>
       </p:sp>
@@ -18882,14 +18648,6 @@
   <p:clrMapOvr>
     <a:masterClrMapping/>
   </p:clrMapOvr>
-  <mc:AlternateContent xmlns:mc="http://schemas.openxmlformats.org/markup-compatibility/2006" xmlns:p14="http://schemas.microsoft.com/office/powerpoint/2010/main">
-    <mc:Choice Requires="p14">
-      <p:transition spd="slow" p14:dur="2000"/>
-    </mc:Choice>
-    <mc:Fallback xmlns="">
-      <p:transition spd="slow"/>
-    </mc:Fallback>
-  </mc:AlternateContent>
 </p:sld>
 </file>
 
@@ -19450,21 +19208,6 @@
 </file>
 
 <file path=customXml/item1.xml><?xml version="1.0" encoding="utf-8"?>
-<?mso-contentType ?>
-<FormTemplates xmlns="http://schemas.microsoft.com/sharepoint/v3/contenttype/forms">
-  <Display>DocumentLibraryForm</Display>
-  <Edit>DocumentLibraryForm</Edit>
-  <New>DocumentLibraryForm</New>
-</FormTemplates>
-</file>
-
-<file path=customXml/item2.xml><?xml version="1.0" encoding="utf-8"?>
-<p:properties xmlns:p="http://schemas.microsoft.com/office/2006/metadata/properties" xmlns:xsi="http://www.w3.org/2001/XMLSchema-instance" xmlns:pc="http://schemas.microsoft.com/office/infopath/2007/PartnerControls">
-  <documentManagement/>
-</p:properties>
-</file>
-
-<file path=customXml/item3.xml><?xml version="1.0" encoding="utf-8"?>
 <ct:contentTypeSchema xmlns:ct="http://schemas.microsoft.com/office/2006/metadata/contentType" xmlns:ma="http://schemas.microsoft.com/office/2006/metadata/properties/metaAttributes" ct:_="" ma:_="" ma:contentTypeName="Document" ma:contentTypeID="0x010100C6AC36CE053D09459E0FCE29080582CC" ma:contentTypeVersion="12" ma:contentTypeDescription="Create a new document." ma:contentTypeScope="" ma:versionID="437e4ffbe82928c8266c4e10193b2e24">
   <xsd:schema xmlns:xsd="http://www.w3.org/2001/XMLSchema" xmlns:xs="http://www.w3.org/2001/XMLSchema" xmlns:p="http://schemas.microsoft.com/office/2006/metadata/properties" xmlns:ns3="9921668f-0b8d-4fb6-84a9-1fcd7ff4e3fc" xmlns:ns4="da635dff-9ad4-4ded-8eac-2720661aa429" targetNamespace="http://schemas.microsoft.com/office/2006/metadata/properties" ma:root="true" ma:fieldsID="62f858afbdc30ce0d641e68072e7b375" ns3:_="" ns4:_="">
     <xsd:import namespace="9921668f-0b8d-4fb6-84a9-1fcd7ff4e3fc"/>
@@ -19681,10 +19424,36 @@
 </ct:contentTypeSchema>
 </file>
 
+<file path=customXml/item2.xml><?xml version="1.0" encoding="utf-8"?>
+<p:properties xmlns:p="http://schemas.microsoft.com/office/2006/metadata/properties" xmlns:xsi="http://www.w3.org/2001/XMLSchema-instance" xmlns:pc="http://schemas.microsoft.com/office/infopath/2007/PartnerControls">
+  <documentManagement/>
+</p:properties>
+</file>
+
+<file path=customXml/item3.xml><?xml version="1.0" encoding="utf-8"?>
+<?mso-contentType ?>
+<FormTemplates xmlns="http://schemas.microsoft.com/sharepoint/v3/contenttype/forms">
+  <Display>DocumentLibraryForm</Display>
+  <Edit>DocumentLibraryForm</Edit>
+  <New>DocumentLibraryForm</New>
+</FormTemplates>
+</file>
+
 <file path=customXml/itemProps1.xml><?xml version="1.0" encoding="utf-8"?>
-<ds:datastoreItem xmlns:ds="http://schemas.openxmlformats.org/officeDocument/2006/customXml" ds:itemID="{B944D772-9C1B-454C-BE7C-E9E4B9F813B8}">
+<ds:datastoreItem xmlns:ds="http://schemas.openxmlformats.org/officeDocument/2006/customXml" ds:itemID="{C4EA5263-A4CD-472A-AABC-1DF8E26895E4}">
   <ds:schemaRefs>
-    <ds:schemaRef ds:uri="http://schemas.microsoft.com/sharepoint/v3/contenttype/forms"/>
+    <ds:schemaRef ds:uri="http://schemas.microsoft.com/office/2006/metadata/contentType"/>
+    <ds:schemaRef ds:uri="http://schemas.microsoft.com/office/2006/metadata/properties/metaAttributes"/>
+    <ds:schemaRef ds:uri="http://www.w3.org/2001/XMLSchema"/>
+    <ds:schemaRef ds:uri="http://schemas.microsoft.com/office/2006/metadata/properties"/>
+    <ds:schemaRef ds:uri="9921668f-0b8d-4fb6-84a9-1fcd7ff4e3fc"/>
+    <ds:schemaRef ds:uri="da635dff-9ad4-4ded-8eac-2720661aa429"/>
+    <ds:schemaRef ds:uri="http://schemas.microsoft.com/office/2006/documentManagement/types"/>
+    <ds:schemaRef ds:uri="http://schemas.microsoft.com/office/infopath/2007/PartnerControls"/>
+    <ds:schemaRef ds:uri="http://schemas.openxmlformats.org/package/2006/metadata/core-properties"/>
+    <ds:schemaRef ds:uri="http://purl.org/dc/elements/1.1/"/>
+    <ds:schemaRef ds:uri="http://purl.org/dc/terms/"/>
+    <ds:schemaRef ds:uri="http://schemas.microsoft.com/internal/obd"/>
   </ds:schemaRefs>
 </ds:datastoreItem>
 </file>
@@ -19707,20 +19476,9 @@
 </file>
 
 <file path=customXml/itemProps3.xml><?xml version="1.0" encoding="utf-8"?>
-<ds:datastoreItem xmlns:ds="http://schemas.openxmlformats.org/officeDocument/2006/customXml" ds:itemID="{C4EA5263-A4CD-472A-AABC-1DF8E26895E4}">
+<ds:datastoreItem xmlns:ds="http://schemas.openxmlformats.org/officeDocument/2006/customXml" ds:itemID="{B944D772-9C1B-454C-BE7C-E9E4B9F813B8}">
   <ds:schemaRefs>
-    <ds:schemaRef ds:uri="http://schemas.microsoft.com/office/2006/metadata/contentType"/>
-    <ds:schemaRef ds:uri="http://schemas.microsoft.com/office/2006/metadata/properties/metaAttributes"/>
-    <ds:schemaRef ds:uri="http://www.w3.org/2001/XMLSchema"/>
-    <ds:schemaRef ds:uri="http://schemas.microsoft.com/office/2006/metadata/properties"/>
-    <ds:schemaRef ds:uri="9921668f-0b8d-4fb6-84a9-1fcd7ff4e3fc"/>
-    <ds:schemaRef ds:uri="da635dff-9ad4-4ded-8eac-2720661aa429"/>
-    <ds:schemaRef ds:uri="http://schemas.microsoft.com/office/2006/documentManagement/types"/>
-    <ds:schemaRef ds:uri="http://schemas.microsoft.com/office/infopath/2007/PartnerControls"/>
-    <ds:schemaRef ds:uri="http://schemas.openxmlformats.org/package/2006/metadata/core-properties"/>
-    <ds:schemaRef ds:uri="http://purl.org/dc/elements/1.1/"/>
-    <ds:schemaRef ds:uri="http://purl.org/dc/terms/"/>
-    <ds:schemaRef ds:uri="http://schemas.microsoft.com/internal/obd"/>
+    <ds:schemaRef ds:uri="http://schemas.microsoft.com/sharepoint/v3/contenttype/forms"/>
   </ds:schemaRefs>
 </ds:datastoreItem>
 </file>
</xml_diff>